<commit_message>
additional icons, ui update.
</commit_message>
<xml_diff>
--- a/resource/samnt.pptx
+++ b/resource/samnt.pptx
@@ -288,7 +288,7 @@
           <a:p>
             <a:fld id="{5EBFDE7A-2F88-4186-BBAC-CFFB1713D382}" type="datetimeFigureOut">
               <a:rPr lang="en-US" smtClean="0"/>
-              <a:t>7/9/2013</a:t>
+              <a:t>7/10/2013</a:t>
             </a:fld>
             <a:endParaRPr lang="en-US"/>
           </a:p>
@@ -458,7 +458,7 @@
           <a:p>
             <a:fld id="{5EBFDE7A-2F88-4186-BBAC-CFFB1713D382}" type="datetimeFigureOut">
               <a:rPr lang="en-US" smtClean="0"/>
-              <a:t>7/9/2013</a:t>
+              <a:t>7/10/2013</a:t>
             </a:fld>
             <a:endParaRPr lang="en-US"/>
           </a:p>
@@ -638,7 +638,7 @@
           <a:p>
             <a:fld id="{5EBFDE7A-2F88-4186-BBAC-CFFB1713D382}" type="datetimeFigureOut">
               <a:rPr lang="en-US" smtClean="0"/>
-              <a:t>7/9/2013</a:t>
+              <a:t>7/10/2013</a:t>
             </a:fld>
             <a:endParaRPr lang="en-US"/>
           </a:p>
@@ -808,7 +808,7 @@
           <a:p>
             <a:fld id="{5EBFDE7A-2F88-4186-BBAC-CFFB1713D382}" type="datetimeFigureOut">
               <a:rPr lang="en-US" smtClean="0"/>
-              <a:t>7/9/2013</a:t>
+              <a:t>7/10/2013</a:t>
             </a:fld>
             <a:endParaRPr lang="en-US"/>
           </a:p>
@@ -1054,7 +1054,7 @@
           <a:p>
             <a:fld id="{5EBFDE7A-2F88-4186-BBAC-CFFB1713D382}" type="datetimeFigureOut">
               <a:rPr lang="en-US" smtClean="0"/>
-              <a:t>7/9/2013</a:t>
+              <a:t>7/10/2013</a:t>
             </a:fld>
             <a:endParaRPr lang="en-US"/>
           </a:p>
@@ -1342,7 +1342,7 @@
           <a:p>
             <a:fld id="{5EBFDE7A-2F88-4186-BBAC-CFFB1713D382}" type="datetimeFigureOut">
               <a:rPr lang="en-US" smtClean="0"/>
-              <a:t>7/9/2013</a:t>
+              <a:t>7/10/2013</a:t>
             </a:fld>
             <a:endParaRPr lang="en-US"/>
           </a:p>
@@ -1764,7 +1764,7 @@
           <a:p>
             <a:fld id="{5EBFDE7A-2F88-4186-BBAC-CFFB1713D382}" type="datetimeFigureOut">
               <a:rPr lang="en-US" smtClean="0"/>
-              <a:t>7/9/2013</a:t>
+              <a:t>7/10/2013</a:t>
             </a:fld>
             <a:endParaRPr lang="en-US"/>
           </a:p>
@@ -1882,7 +1882,7 @@
           <a:p>
             <a:fld id="{5EBFDE7A-2F88-4186-BBAC-CFFB1713D382}" type="datetimeFigureOut">
               <a:rPr lang="en-US" smtClean="0"/>
-              <a:t>7/9/2013</a:t>
+              <a:t>7/10/2013</a:t>
             </a:fld>
             <a:endParaRPr lang="en-US"/>
           </a:p>
@@ -1977,7 +1977,7 @@
           <a:p>
             <a:fld id="{5EBFDE7A-2F88-4186-BBAC-CFFB1713D382}" type="datetimeFigureOut">
               <a:rPr lang="en-US" smtClean="0"/>
-              <a:t>7/9/2013</a:t>
+              <a:t>7/10/2013</a:t>
             </a:fld>
             <a:endParaRPr lang="en-US"/>
           </a:p>
@@ -2254,7 +2254,7 @@
           <a:p>
             <a:fld id="{5EBFDE7A-2F88-4186-BBAC-CFFB1713D382}" type="datetimeFigureOut">
               <a:rPr lang="en-US" smtClean="0"/>
-              <a:t>7/9/2013</a:t>
+              <a:t>7/10/2013</a:t>
             </a:fld>
             <a:endParaRPr lang="en-US"/>
           </a:p>
@@ -2507,7 +2507,7 @@
           <a:p>
             <a:fld id="{5EBFDE7A-2F88-4186-BBAC-CFFB1713D382}" type="datetimeFigureOut">
               <a:rPr lang="en-US" smtClean="0"/>
-              <a:t>7/9/2013</a:t>
+              <a:t>7/10/2013</a:t>
             </a:fld>
             <a:endParaRPr lang="en-US"/>
           </a:p>
@@ -2720,7 +2720,7 @@
           <a:p>
             <a:fld id="{5EBFDE7A-2F88-4186-BBAC-CFFB1713D382}" type="datetimeFigureOut">
               <a:rPr lang="en-US" smtClean="0"/>
-              <a:t>7/9/2013</a:t>
+              <a:t>7/10/2013</a:t>
             </a:fld>
             <a:endParaRPr lang="en-US"/>
           </a:p>
@@ -3134,7 +3134,7 @@
           <a:lstStyle/>
           <a:p>
             <a:pPr algn="ctr"/>
-            <a:endParaRPr lang="en-US"/>
+            <a:endParaRPr lang="en-US" dirty="0"/>
           </a:p>
         </p:txBody>
       </p:sp>
@@ -3423,6 +3423,232 @@
           <a:p>
             <a:pPr algn="ctr"/>
             <a:endParaRPr lang="en-US"/>
+          </a:p>
+        </p:txBody>
+      </p:sp>
+      <p:sp>
+        <p:nvSpPr>
+          <p:cNvPr id="9" name="Parallelogram 8"/>
+          <p:cNvSpPr/>
+          <p:nvPr/>
+        </p:nvSpPr>
+        <p:spPr>
+          <a:xfrm>
+            <a:off x="5334000" y="3733800"/>
+            <a:ext cx="533400" cy="685800"/>
+          </a:xfrm>
+          <a:prstGeom prst="parallelogram">
+            <a:avLst/>
+          </a:prstGeom>
+          <a:noFill/>
+          <a:ln w="38100">
+            <a:solidFill>
+              <a:schemeClr val="bg1"/>
+            </a:solidFill>
+          </a:ln>
+        </p:spPr>
+        <p:style>
+          <a:lnRef idx="2">
+            <a:schemeClr val="accent1">
+              <a:shade val="50000"/>
+            </a:schemeClr>
+          </a:lnRef>
+          <a:fillRef idx="1">
+            <a:schemeClr val="accent1"/>
+          </a:fillRef>
+          <a:effectRef idx="0">
+            <a:schemeClr val="accent1"/>
+          </a:effectRef>
+          <a:fontRef idx="minor">
+            <a:schemeClr val="lt1"/>
+          </a:fontRef>
+        </p:style>
+        <p:txBody>
+          <a:bodyPr rtlCol="0" anchor="ctr"/>
+          <a:lstStyle/>
+          <a:p>
+            <a:pPr algn="ctr"/>
+            <a:endParaRPr lang="en-US"/>
+          </a:p>
+        </p:txBody>
+      </p:sp>
+      <p:sp>
+        <p:nvSpPr>
+          <p:cNvPr id="10" name="Parallelogram 9"/>
+          <p:cNvSpPr/>
+          <p:nvPr/>
+        </p:nvSpPr>
+        <p:spPr>
+          <a:xfrm>
+            <a:off x="5410200" y="3811657"/>
+            <a:ext cx="533400" cy="685800"/>
+          </a:xfrm>
+          <a:prstGeom prst="parallelogram">
+            <a:avLst/>
+          </a:prstGeom>
+          <a:noFill/>
+          <a:ln w="38100">
+            <a:solidFill>
+              <a:schemeClr val="bg1"/>
+            </a:solidFill>
+          </a:ln>
+        </p:spPr>
+        <p:style>
+          <a:lnRef idx="2">
+            <a:schemeClr val="accent1">
+              <a:shade val="50000"/>
+            </a:schemeClr>
+          </a:lnRef>
+          <a:fillRef idx="1">
+            <a:schemeClr val="accent1"/>
+          </a:fillRef>
+          <a:effectRef idx="0">
+            <a:schemeClr val="accent1"/>
+          </a:effectRef>
+          <a:fontRef idx="minor">
+            <a:schemeClr val="lt1"/>
+          </a:fontRef>
+        </p:style>
+        <p:txBody>
+          <a:bodyPr rtlCol="0" anchor="ctr"/>
+          <a:lstStyle/>
+          <a:p>
+            <a:pPr algn="ctr"/>
+            <a:endParaRPr lang="en-US"/>
+          </a:p>
+        </p:txBody>
+      </p:sp>
+      <p:sp>
+        <p:nvSpPr>
+          <p:cNvPr id="11" name="Flowchart: Connector 10"/>
+          <p:cNvSpPr/>
+          <p:nvPr/>
+        </p:nvSpPr>
+        <p:spPr>
+          <a:xfrm>
+            <a:off x="5229308" y="3886202"/>
+            <a:ext cx="457200" cy="457200"/>
+          </a:xfrm>
+          <a:prstGeom prst="flowChartConnector">
+            <a:avLst/>
+          </a:prstGeom>
+          <a:solidFill>
+            <a:schemeClr val="bg1"/>
+          </a:solidFill>
+          <a:ln w="19050">
+            <a:solidFill>
+              <a:schemeClr val="bg1"/>
+            </a:solidFill>
+          </a:ln>
+        </p:spPr>
+        <p:style>
+          <a:lnRef idx="2">
+            <a:schemeClr val="accent6">
+              <a:shade val="50000"/>
+            </a:schemeClr>
+          </a:lnRef>
+          <a:fillRef idx="1">
+            <a:schemeClr val="accent6"/>
+          </a:fillRef>
+          <a:effectRef idx="0">
+            <a:schemeClr val="accent6"/>
+          </a:effectRef>
+          <a:fontRef idx="minor">
+            <a:schemeClr val="lt1"/>
+          </a:fontRef>
+        </p:style>
+        <p:txBody>
+          <a:bodyPr rtlCol="0" anchor="ctr"/>
+          <a:lstStyle/>
+          <a:p>
+            <a:pPr algn="ctr"/>
+            <a:endParaRPr lang="en-US"/>
+          </a:p>
+        </p:txBody>
+      </p:sp>
+      <p:sp>
+        <p:nvSpPr>
+          <p:cNvPr id="2" name="Chevron 1"/>
+          <p:cNvSpPr/>
+          <p:nvPr/>
+        </p:nvSpPr>
+        <p:spPr>
+          <a:xfrm>
+            <a:off x="2133600" y="3429000"/>
+            <a:ext cx="304800" cy="152400"/>
+          </a:xfrm>
+          <a:prstGeom prst="chevron">
+            <a:avLst/>
+          </a:prstGeom>
+          <a:noFill/>
+          <a:ln>
+            <a:solidFill>
+              <a:schemeClr val="bg1"/>
+            </a:solidFill>
+          </a:ln>
+        </p:spPr>
+        <p:style>
+          <a:lnRef idx="2">
+            <a:schemeClr val="accent1">
+              <a:shade val="50000"/>
+            </a:schemeClr>
+          </a:lnRef>
+          <a:fillRef idx="1">
+            <a:schemeClr val="accent1"/>
+          </a:fillRef>
+          <a:effectRef idx="0">
+            <a:schemeClr val="accent1"/>
+          </a:effectRef>
+          <a:fontRef idx="minor">
+            <a:schemeClr val="lt1"/>
+          </a:fontRef>
+        </p:style>
+        <p:txBody>
+          <a:bodyPr rtlCol="0" anchor="ctr"/>
+          <a:lstStyle/>
+          <a:p>
+            <a:pPr algn="ctr"/>
+            <a:endParaRPr lang="en-US">
+              <a:solidFill>
+                <a:schemeClr val="tx1"/>
+              </a:solidFill>
+            </a:endParaRPr>
+          </a:p>
+        </p:txBody>
+      </p:sp>
+      <p:sp>
+        <p:nvSpPr>
+          <p:cNvPr id="3" name="TextBox 2"/>
+          <p:cNvSpPr txBox="1"/>
+          <p:nvPr/>
+        </p:nvSpPr>
+        <p:spPr>
+          <a:xfrm rot="5400000">
+            <a:off x="2699266" y="3541298"/>
+            <a:ext cx="457200" cy="261610"/>
+          </a:xfrm>
+          <a:prstGeom prst="rect">
+            <a:avLst/>
+          </a:prstGeom>
+          <a:noFill/>
+        </p:spPr>
+        <p:txBody>
+          <a:bodyPr wrap="square" rtlCol="0">
+            <a:spAutoFit/>
+          </a:bodyPr>
+          <a:lstStyle/>
+          <a:p>
+            <a:r>
+              <a:rPr lang="en-US" sz="1100" b="1" dirty="0">
+                <a:solidFill>
+                  <a:schemeClr val="bg1"/>
+                </a:solidFill>
+                <a:latin typeface="Consolas" pitchFamily="49" charset="0"/>
+                <a:ea typeface="Batang" pitchFamily="18" charset="-127"/>
+                <a:cs typeface="Consolas" pitchFamily="49" charset="0"/>
+              </a:rPr>
+              <a:t>&gt;</a:t>
+            </a:r>
           </a:p>
         </p:txBody>
       </p:sp>

</xml_diff>

<commit_message>
removed old runtime dlls. additional icons. menus only on OSX version. updated welcome screen theming API
</commit_message>
<xml_diff>
--- a/resource/samnt.pptx
+++ b/resource/samnt.pptx
@@ -288,7 +288,7 @@
           <a:p>
             <a:fld id="{5EBFDE7A-2F88-4186-BBAC-CFFB1713D382}" type="datetimeFigureOut">
               <a:rPr lang="en-US" smtClean="0"/>
-              <a:t>7/10/2013</a:t>
+              <a:t>7/11/2013</a:t>
             </a:fld>
             <a:endParaRPr lang="en-US"/>
           </a:p>
@@ -458,7 +458,7 @@
           <a:p>
             <a:fld id="{5EBFDE7A-2F88-4186-BBAC-CFFB1713D382}" type="datetimeFigureOut">
               <a:rPr lang="en-US" smtClean="0"/>
-              <a:t>7/10/2013</a:t>
+              <a:t>7/11/2013</a:t>
             </a:fld>
             <a:endParaRPr lang="en-US"/>
           </a:p>
@@ -638,7 +638,7 @@
           <a:p>
             <a:fld id="{5EBFDE7A-2F88-4186-BBAC-CFFB1713D382}" type="datetimeFigureOut">
               <a:rPr lang="en-US" smtClean="0"/>
-              <a:t>7/10/2013</a:t>
+              <a:t>7/11/2013</a:t>
             </a:fld>
             <a:endParaRPr lang="en-US"/>
           </a:p>
@@ -808,7 +808,7 @@
           <a:p>
             <a:fld id="{5EBFDE7A-2F88-4186-BBAC-CFFB1713D382}" type="datetimeFigureOut">
               <a:rPr lang="en-US" smtClean="0"/>
-              <a:t>7/10/2013</a:t>
+              <a:t>7/11/2013</a:t>
             </a:fld>
             <a:endParaRPr lang="en-US"/>
           </a:p>
@@ -1054,7 +1054,7 @@
           <a:p>
             <a:fld id="{5EBFDE7A-2F88-4186-BBAC-CFFB1713D382}" type="datetimeFigureOut">
               <a:rPr lang="en-US" smtClean="0"/>
-              <a:t>7/10/2013</a:t>
+              <a:t>7/11/2013</a:t>
             </a:fld>
             <a:endParaRPr lang="en-US"/>
           </a:p>
@@ -1342,7 +1342,7 @@
           <a:p>
             <a:fld id="{5EBFDE7A-2F88-4186-BBAC-CFFB1713D382}" type="datetimeFigureOut">
               <a:rPr lang="en-US" smtClean="0"/>
-              <a:t>7/10/2013</a:t>
+              <a:t>7/11/2013</a:t>
             </a:fld>
             <a:endParaRPr lang="en-US"/>
           </a:p>
@@ -1764,7 +1764,7 @@
           <a:p>
             <a:fld id="{5EBFDE7A-2F88-4186-BBAC-CFFB1713D382}" type="datetimeFigureOut">
               <a:rPr lang="en-US" smtClean="0"/>
-              <a:t>7/10/2013</a:t>
+              <a:t>7/11/2013</a:t>
             </a:fld>
             <a:endParaRPr lang="en-US"/>
           </a:p>
@@ -1882,7 +1882,7 @@
           <a:p>
             <a:fld id="{5EBFDE7A-2F88-4186-BBAC-CFFB1713D382}" type="datetimeFigureOut">
               <a:rPr lang="en-US" smtClean="0"/>
-              <a:t>7/10/2013</a:t>
+              <a:t>7/11/2013</a:t>
             </a:fld>
             <a:endParaRPr lang="en-US"/>
           </a:p>
@@ -1977,7 +1977,7 @@
           <a:p>
             <a:fld id="{5EBFDE7A-2F88-4186-BBAC-CFFB1713D382}" type="datetimeFigureOut">
               <a:rPr lang="en-US" smtClean="0"/>
-              <a:t>7/10/2013</a:t>
+              <a:t>7/11/2013</a:t>
             </a:fld>
             <a:endParaRPr lang="en-US"/>
           </a:p>
@@ -2254,7 +2254,7 @@
           <a:p>
             <a:fld id="{5EBFDE7A-2F88-4186-BBAC-CFFB1713D382}" type="datetimeFigureOut">
               <a:rPr lang="en-US" smtClean="0"/>
-              <a:t>7/10/2013</a:t>
+              <a:t>7/11/2013</a:t>
             </a:fld>
             <a:endParaRPr lang="en-US"/>
           </a:p>
@@ -2507,7 +2507,7 @@
           <a:p>
             <a:fld id="{5EBFDE7A-2F88-4186-BBAC-CFFB1713D382}" type="datetimeFigureOut">
               <a:rPr lang="en-US" smtClean="0"/>
-              <a:t>7/10/2013</a:t>
+              <a:t>7/11/2013</a:t>
             </a:fld>
             <a:endParaRPr lang="en-US"/>
           </a:p>
@@ -2720,7 +2720,7 @@
           <a:p>
             <a:fld id="{5EBFDE7A-2F88-4186-BBAC-CFFB1713D382}" type="datetimeFigureOut">
               <a:rPr lang="en-US" smtClean="0"/>
-              <a:t>7/10/2013</a:t>
+              <a:t>7/11/2013</a:t>
             </a:fld>
             <a:endParaRPr lang="en-US"/>
           </a:p>
@@ -3103,7 +3103,7 @@
         </p:nvSpPr>
         <p:spPr>
           <a:xfrm>
-            <a:off x="1752600" y="3124200"/>
+            <a:off x="1600200" y="3200402"/>
             <a:ext cx="6019800" cy="2286000"/>
           </a:xfrm>
           <a:prstGeom prst="rect">
@@ -3649,6 +3649,175 @@
               </a:rPr>
               <a:t>&gt;</a:t>
             </a:r>
+          </a:p>
+        </p:txBody>
+      </p:sp>
+      <p:sp>
+        <p:nvSpPr>
+          <p:cNvPr id="4" name="TextBox 3"/>
+          <p:cNvSpPr txBox="1"/>
+          <p:nvPr/>
+        </p:nvSpPr>
+        <p:spPr>
+          <a:xfrm>
+            <a:off x="2133600" y="4648200"/>
+            <a:ext cx="304800" cy="276999"/>
+          </a:xfrm>
+          <a:prstGeom prst="rect">
+            <a:avLst/>
+          </a:prstGeom>
+          <a:noFill/>
+        </p:spPr>
+        <p:txBody>
+          <a:bodyPr wrap="square" rtlCol="0">
+            <a:spAutoFit/>
+          </a:bodyPr>
+          <a:lstStyle/>
+          <a:p>
+            <a:r>
+              <a:rPr lang="en-US" sz="1200" b="1" dirty="0" smtClean="0">
+                <a:solidFill>
+                  <a:schemeClr val="bg1"/>
+                </a:solidFill>
+                <a:latin typeface="Segoe UI Semibold" pitchFamily="34" charset="0"/>
+                <a:ea typeface="Segoe UI" pitchFamily="34" charset="0"/>
+                <a:cs typeface="Segoe UI" pitchFamily="34" charset="0"/>
+              </a:rPr>
+              <a:t>?</a:t>
+            </a:r>
+            <a:endParaRPr lang="en-US" sz="1200" b="1" dirty="0">
+              <a:solidFill>
+                <a:schemeClr val="bg1"/>
+              </a:solidFill>
+              <a:latin typeface="Segoe UI Semibold" pitchFamily="34" charset="0"/>
+              <a:ea typeface="Segoe UI" pitchFamily="34" charset="0"/>
+              <a:cs typeface="Segoe UI" pitchFamily="34" charset="0"/>
+            </a:endParaRPr>
+          </a:p>
+        </p:txBody>
+      </p:sp>
+      <p:sp>
+        <p:nvSpPr>
+          <p:cNvPr id="19" name="TextBox 18"/>
+          <p:cNvSpPr txBox="1"/>
+          <p:nvPr/>
+        </p:nvSpPr>
+        <p:spPr>
+          <a:xfrm>
+            <a:off x="1905000" y="4266424"/>
+            <a:ext cx="304800" cy="276999"/>
+          </a:xfrm>
+          <a:prstGeom prst="rect">
+            <a:avLst/>
+          </a:prstGeom>
+          <a:noFill/>
+        </p:spPr>
+        <p:txBody>
+          <a:bodyPr wrap="square" rtlCol="0">
+            <a:spAutoFit/>
+          </a:bodyPr>
+          <a:lstStyle/>
+          <a:p>
+            <a:r>
+              <a:rPr lang="en-US" sz="1200" b="1" dirty="0">
+                <a:solidFill>
+                  <a:schemeClr val="bg1"/>
+                </a:solidFill>
+                <a:latin typeface="Segoe UI Semibold" pitchFamily="34" charset="0"/>
+                <a:ea typeface="Segoe UI" pitchFamily="34" charset="0"/>
+                <a:cs typeface="Segoe UI" pitchFamily="34" charset="0"/>
+              </a:rPr>
+              <a:t>+</a:t>
+            </a:r>
+          </a:p>
+        </p:txBody>
+      </p:sp>
+      <p:sp>
+        <p:nvSpPr>
+          <p:cNvPr id="5" name="Oval 4"/>
+          <p:cNvSpPr/>
+          <p:nvPr/>
+        </p:nvSpPr>
+        <p:spPr>
+          <a:xfrm>
+            <a:off x="2352714" y="4114800"/>
+            <a:ext cx="152400" cy="152400"/>
+          </a:xfrm>
+          <a:prstGeom prst="ellipse">
+            <a:avLst/>
+          </a:prstGeom>
+          <a:noFill/>
+          <a:ln w="9525">
+            <a:solidFill>
+              <a:schemeClr val="bg1"/>
+            </a:solidFill>
+          </a:ln>
+        </p:spPr>
+        <p:style>
+          <a:lnRef idx="2">
+            <a:schemeClr val="accent1">
+              <a:shade val="50000"/>
+            </a:schemeClr>
+          </a:lnRef>
+          <a:fillRef idx="1">
+            <a:schemeClr val="accent1"/>
+          </a:fillRef>
+          <a:effectRef idx="0">
+            <a:schemeClr val="accent1"/>
+          </a:effectRef>
+          <a:fontRef idx="minor">
+            <a:schemeClr val="lt1"/>
+          </a:fontRef>
+        </p:style>
+        <p:txBody>
+          <a:bodyPr rtlCol="0" anchor="ctr"/>
+          <a:lstStyle/>
+          <a:p>
+            <a:pPr algn="ctr"/>
+            <a:endParaRPr lang="en-US" sz="1200" b="1" dirty="0">
+              <a:latin typeface="+mj-lt"/>
+              <a:cs typeface="Consolas" pitchFamily="49" charset="0"/>
+            </a:endParaRPr>
+          </a:p>
+        </p:txBody>
+      </p:sp>
+      <p:sp>
+        <p:nvSpPr>
+          <p:cNvPr id="6" name="Oval 5"/>
+          <p:cNvSpPr/>
+          <p:nvPr/>
+        </p:nvSpPr>
+        <p:spPr>
+          <a:xfrm>
+            <a:off x="2667000" y="3811657"/>
+            <a:ext cx="152400" cy="150743"/>
+          </a:xfrm>
+          <a:prstGeom prst="ellipse">
+            <a:avLst/>
+          </a:prstGeom>
+        </p:spPr>
+        <p:style>
+          <a:lnRef idx="2">
+            <a:schemeClr val="accent1">
+              <a:shade val="50000"/>
+            </a:schemeClr>
+          </a:lnRef>
+          <a:fillRef idx="1">
+            <a:schemeClr val="accent1"/>
+          </a:fillRef>
+          <a:effectRef idx="0">
+            <a:schemeClr val="accent1"/>
+          </a:effectRef>
+          <a:fontRef idx="minor">
+            <a:schemeClr val="lt1"/>
+          </a:fontRef>
+        </p:style>
+        <p:txBody>
+          <a:bodyPr rtlCol="0" anchor="ctr"/>
+          <a:lstStyle/>
+          <a:p>
+            <a:pPr algn="ctr"/>
+            <a:endParaRPr lang="en-US"/>
           </a:p>
         </p:txBody>
       </p:sp>

</xml_diff>

<commit_message>
added example of SAM 2014 splash screen.
</commit_message>
<xml_diff>
--- a/resource/samnt.pptx
+++ b/resource/samnt.pptx
@@ -3,9 +3,11 @@
 <p:presentation xmlns:a="http://schemas.openxmlformats.org/drawingml/2006/main" xmlns:r="http://schemas.openxmlformats.org/officeDocument/2006/relationships" xmlns:p="http://schemas.openxmlformats.org/presentationml/2006/main" saveSubsetFonts="1">
   <p:sldMasterIdLst>
     <p:sldMasterId id="2147483648" r:id="rId1"/>
+    <p:sldMasterId id="2147483660" r:id="rId2"/>
   </p:sldMasterIdLst>
   <p:sldIdLst>
-    <p:sldId id="256" r:id="rId2"/>
+    <p:sldId id="256" r:id="rId3"/>
+    <p:sldId id="257" r:id="rId4"/>
   </p:sldIdLst>
   <p:sldSz cx="9144000" cy="6858000" type="screen4x3"/>
   <p:notesSz cx="6858000" cy="9144000"/>
@@ -288,7 +290,7 @@
           <a:p>
             <a:fld id="{5EBFDE7A-2F88-4186-BBAC-CFFB1713D382}" type="datetimeFigureOut">
               <a:rPr lang="en-US" smtClean="0"/>
-              <a:t>7/11/2013</a:t>
+              <a:t>9/20/2013</a:t>
             </a:fld>
             <a:endParaRPr lang="en-US"/>
           </a:p>
@@ -458,7 +460,7 @@
           <a:p>
             <a:fld id="{5EBFDE7A-2F88-4186-BBAC-CFFB1713D382}" type="datetimeFigureOut">
               <a:rPr lang="en-US" smtClean="0"/>
-              <a:t>7/11/2013</a:t>
+              <a:t>9/20/2013</a:t>
             </a:fld>
             <a:endParaRPr lang="en-US"/>
           </a:p>
@@ -638,7 +640,7 @@
           <a:p>
             <a:fld id="{5EBFDE7A-2F88-4186-BBAC-CFFB1713D382}" type="datetimeFigureOut">
               <a:rPr lang="en-US" smtClean="0"/>
-              <a:t>7/11/2013</a:t>
+              <a:t>9/20/2013</a:t>
             </a:fld>
             <a:endParaRPr lang="en-US"/>
           </a:p>
@@ -690,6 +692,2120 @@
     <p:extLst>
       <p:ext uri="{BB962C8B-B14F-4D97-AF65-F5344CB8AC3E}">
         <p14:creationId xmlns:p14="http://schemas.microsoft.com/office/powerpoint/2010/main" val="2082181683"/>
+      </p:ext>
+    </p:extLst>
+  </p:cSld>
+  <p:clrMapOvr>
+    <a:masterClrMapping/>
+  </p:clrMapOvr>
+</p:sldLayout>
+</file>
+
+<file path=ppt/slideLayouts/slideLayout12.xml><?xml version="1.0" encoding="utf-8"?>
+<p:sldLayout xmlns:a="http://schemas.openxmlformats.org/drawingml/2006/main" xmlns:r="http://schemas.openxmlformats.org/officeDocument/2006/relationships" xmlns:p="http://schemas.openxmlformats.org/presentationml/2006/main" type="title" preserve="1">
+  <p:cSld name="Title Slide">
+    <p:spTree>
+      <p:nvGrpSpPr>
+        <p:cNvPr id="1" name=""/>
+        <p:cNvGrpSpPr/>
+        <p:nvPr/>
+      </p:nvGrpSpPr>
+      <p:grpSpPr>
+        <a:xfrm>
+          <a:off x="0" y="0"/>
+          <a:ext cx="0" cy="0"/>
+          <a:chOff x="0" y="0"/>
+          <a:chExt cx="0" cy="0"/>
+        </a:xfrm>
+      </p:grpSpPr>
+      <p:sp>
+        <p:nvSpPr>
+          <p:cNvPr id="2" name="Title 1"/>
+          <p:cNvSpPr>
+            <a:spLocks noGrp="1"/>
+          </p:cNvSpPr>
+          <p:nvPr>
+            <p:ph type="ctrTitle"/>
+          </p:nvPr>
+        </p:nvSpPr>
+        <p:spPr>
+          <a:xfrm>
+            <a:off x="685800" y="2130425"/>
+            <a:ext cx="7772400" cy="1470025"/>
+          </a:xfrm>
+        </p:spPr>
+        <p:txBody>
+          <a:bodyPr/>
+          <a:lstStyle/>
+          <a:p>
+            <a:r>
+              <a:rPr lang="en-US" smtClean="0"/>
+              <a:t>Click to edit Master title style</a:t>
+            </a:r>
+            <a:endParaRPr lang="en-US"/>
+          </a:p>
+        </p:txBody>
+      </p:sp>
+      <p:sp>
+        <p:nvSpPr>
+          <p:cNvPr id="3" name="Subtitle 2"/>
+          <p:cNvSpPr>
+            <a:spLocks noGrp="1"/>
+          </p:cNvSpPr>
+          <p:nvPr>
+            <p:ph type="subTitle" idx="1"/>
+          </p:nvPr>
+        </p:nvSpPr>
+        <p:spPr>
+          <a:xfrm>
+            <a:off x="1371600" y="3886200"/>
+            <a:ext cx="6400800" cy="1752600"/>
+          </a:xfrm>
+        </p:spPr>
+        <p:txBody>
+          <a:bodyPr/>
+          <a:lstStyle>
+            <a:lvl1pPr marL="0" indent="0" algn="ctr">
+              <a:buNone/>
+              <a:defRPr>
+                <a:solidFill>
+                  <a:schemeClr val="tx1">
+                    <a:tint val="75000"/>
+                  </a:schemeClr>
+                </a:solidFill>
+              </a:defRPr>
+            </a:lvl1pPr>
+            <a:lvl2pPr marL="457200" indent="0" algn="ctr">
+              <a:buNone/>
+              <a:defRPr>
+                <a:solidFill>
+                  <a:schemeClr val="tx1">
+                    <a:tint val="75000"/>
+                  </a:schemeClr>
+                </a:solidFill>
+              </a:defRPr>
+            </a:lvl2pPr>
+            <a:lvl3pPr marL="914400" indent="0" algn="ctr">
+              <a:buNone/>
+              <a:defRPr>
+                <a:solidFill>
+                  <a:schemeClr val="tx1">
+                    <a:tint val="75000"/>
+                  </a:schemeClr>
+                </a:solidFill>
+              </a:defRPr>
+            </a:lvl3pPr>
+            <a:lvl4pPr marL="1371600" indent="0" algn="ctr">
+              <a:buNone/>
+              <a:defRPr>
+                <a:solidFill>
+                  <a:schemeClr val="tx1">
+                    <a:tint val="75000"/>
+                  </a:schemeClr>
+                </a:solidFill>
+              </a:defRPr>
+            </a:lvl4pPr>
+            <a:lvl5pPr marL="1828800" indent="0" algn="ctr">
+              <a:buNone/>
+              <a:defRPr>
+                <a:solidFill>
+                  <a:schemeClr val="tx1">
+                    <a:tint val="75000"/>
+                  </a:schemeClr>
+                </a:solidFill>
+              </a:defRPr>
+            </a:lvl5pPr>
+            <a:lvl6pPr marL="2286000" indent="0" algn="ctr">
+              <a:buNone/>
+              <a:defRPr>
+                <a:solidFill>
+                  <a:schemeClr val="tx1">
+                    <a:tint val="75000"/>
+                  </a:schemeClr>
+                </a:solidFill>
+              </a:defRPr>
+            </a:lvl6pPr>
+            <a:lvl7pPr marL="2743200" indent="0" algn="ctr">
+              <a:buNone/>
+              <a:defRPr>
+                <a:solidFill>
+                  <a:schemeClr val="tx1">
+                    <a:tint val="75000"/>
+                  </a:schemeClr>
+                </a:solidFill>
+              </a:defRPr>
+            </a:lvl7pPr>
+            <a:lvl8pPr marL="3200400" indent="0" algn="ctr">
+              <a:buNone/>
+              <a:defRPr>
+                <a:solidFill>
+                  <a:schemeClr val="tx1">
+                    <a:tint val="75000"/>
+                  </a:schemeClr>
+                </a:solidFill>
+              </a:defRPr>
+            </a:lvl8pPr>
+            <a:lvl9pPr marL="3657600" indent="0" algn="ctr">
+              <a:buNone/>
+              <a:defRPr>
+                <a:solidFill>
+                  <a:schemeClr val="tx1">
+                    <a:tint val="75000"/>
+                  </a:schemeClr>
+                </a:solidFill>
+              </a:defRPr>
+            </a:lvl9pPr>
+          </a:lstStyle>
+          <a:p>
+            <a:r>
+              <a:rPr lang="en-US" smtClean="0"/>
+              <a:t>Click to edit Master subtitle style</a:t>
+            </a:r>
+            <a:endParaRPr lang="en-US"/>
+          </a:p>
+        </p:txBody>
+      </p:sp>
+      <p:sp>
+        <p:nvSpPr>
+          <p:cNvPr id="4" name="Date Placeholder 3"/>
+          <p:cNvSpPr>
+            <a:spLocks noGrp="1"/>
+          </p:cNvSpPr>
+          <p:nvPr>
+            <p:ph type="dt" sz="half" idx="10"/>
+          </p:nvPr>
+        </p:nvSpPr>
+        <p:spPr/>
+        <p:txBody>
+          <a:bodyPr/>
+          <a:lstStyle/>
+          <a:p>
+            <a:fld id="{752084B5-01C9-41F8-9B3F-DBDC28D03793}" type="datetimeFigureOut">
+              <a:rPr lang="en-US">
+                <a:solidFill>
+                  <a:prstClr val="black">
+                    <a:tint val="75000"/>
+                  </a:prstClr>
+                </a:solidFill>
+              </a:rPr>
+              <a:pPr/>
+              <a:t>9/20/2013</a:t>
+            </a:fld>
+            <a:endParaRPr lang="en-US">
+              <a:solidFill>
+                <a:prstClr val="black">
+                  <a:tint val="75000"/>
+                </a:prstClr>
+              </a:solidFill>
+            </a:endParaRPr>
+          </a:p>
+        </p:txBody>
+      </p:sp>
+      <p:sp>
+        <p:nvSpPr>
+          <p:cNvPr id="5" name="Footer Placeholder 4"/>
+          <p:cNvSpPr>
+            <a:spLocks noGrp="1"/>
+          </p:cNvSpPr>
+          <p:nvPr>
+            <p:ph type="ftr" sz="quarter" idx="11"/>
+          </p:nvPr>
+        </p:nvSpPr>
+        <p:spPr/>
+        <p:txBody>
+          <a:bodyPr/>
+          <a:lstStyle/>
+          <a:p>
+            <a:endParaRPr lang="en-US">
+              <a:solidFill>
+                <a:prstClr val="black">
+                  <a:tint val="75000"/>
+                </a:prstClr>
+              </a:solidFill>
+            </a:endParaRPr>
+          </a:p>
+        </p:txBody>
+      </p:sp>
+      <p:sp>
+        <p:nvSpPr>
+          <p:cNvPr id="6" name="Slide Number Placeholder 5"/>
+          <p:cNvSpPr>
+            <a:spLocks noGrp="1"/>
+          </p:cNvSpPr>
+          <p:nvPr>
+            <p:ph type="sldNum" sz="quarter" idx="12"/>
+          </p:nvPr>
+        </p:nvSpPr>
+        <p:spPr/>
+        <p:txBody>
+          <a:bodyPr/>
+          <a:lstStyle/>
+          <a:p>
+            <a:fld id="{2C9314DB-5B33-4024-AF8F-A8692812E68A}" type="slidenum">
+              <a:rPr lang="en-US">
+                <a:solidFill>
+                  <a:prstClr val="black">
+                    <a:tint val="75000"/>
+                  </a:prstClr>
+                </a:solidFill>
+              </a:rPr>
+              <a:pPr/>
+              <a:t>‹#›</a:t>
+            </a:fld>
+            <a:endParaRPr lang="en-US">
+              <a:solidFill>
+                <a:prstClr val="black">
+                  <a:tint val="75000"/>
+                </a:prstClr>
+              </a:solidFill>
+            </a:endParaRPr>
+          </a:p>
+        </p:txBody>
+      </p:sp>
+    </p:spTree>
+    <p:extLst>
+      <p:ext uri="{BB962C8B-B14F-4D97-AF65-F5344CB8AC3E}">
+        <p14:creationId xmlns:p14="http://schemas.microsoft.com/office/powerpoint/2010/main" val="872862564"/>
+      </p:ext>
+    </p:extLst>
+  </p:cSld>
+  <p:clrMapOvr>
+    <a:masterClrMapping/>
+  </p:clrMapOvr>
+</p:sldLayout>
+</file>
+
+<file path=ppt/slideLayouts/slideLayout13.xml><?xml version="1.0" encoding="utf-8"?>
+<p:sldLayout xmlns:a="http://schemas.openxmlformats.org/drawingml/2006/main" xmlns:r="http://schemas.openxmlformats.org/officeDocument/2006/relationships" xmlns:p="http://schemas.openxmlformats.org/presentationml/2006/main" type="obj" preserve="1">
+  <p:cSld name="Title and Content">
+    <p:spTree>
+      <p:nvGrpSpPr>
+        <p:cNvPr id="1" name=""/>
+        <p:cNvGrpSpPr/>
+        <p:nvPr/>
+      </p:nvGrpSpPr>
+      <p:grpSpPr>
+        <a:xfrm>
+          <a:off x="0" y="0"/>
+          <a:ext cx="0" cy="0"/>
+          <a:chOff x="0" y="0"/>
+          <a:chExt cx="0" cy="0"/>
+        </a:xfrm>
+      </p:grpSpPr>
+      <p:sp>
+        <p:nvSpPr>
+          <p:cNvPr id="2" name="Title 1"/>
+          <p:cNvSpPr>
+            <a:spLocks noGrp="1"/>
+          </p:cNvSpPr>
+          <p:nvPr>
+            <p:ph type="title"/>
+          </p:nvPr>
+        </p:nvSpPr>
+        <p:spPr/>
+        <p:txBody>
+          <a:bodyPr/>
+          <a:lstStyle/>
+          <a:p>
+            <a:r>
+              <a:rPr lang="en-US" smtClean="0"/>
+              <a:t>Click to edit Master title style</a:t>
+            </a:r>
+            <a:endParaRPr lang="en-US"/>
+          </a:p>
+        </p:txBody>
+      </p:sp>
+      <p:sp>
+        <p:nvSpPr>
+          <p:cNvPr id="3" name="Content Placeholder 2"/>
+          <p:cNvSpPr>
+            <a:spLocks noGrp="1"/>
+          </p:cNvSpPr>
+          <p:nvPr>
+            <p:ph idx="1"/>
+          </p:nvPr>
+        </p:nvSpPr>
+        <p:spPr/>
+        <p:txBody>
+          <a:bodyPr/>
+          <a:lstStyle/>
+          <a:p>
+            <a:pPr lvl="0"/>
+            <a:r>
+              <a:rPr lang="en-US" smtClean="0"/>
+              <a:t>Click to edit Master text styles</a:t>
+            </a:r>
+          </a:p>
+          <a:p>
+            <a:pPr lvl="1"/>
+            <a:r>
+              <a:rPr lang="en-US" smtClean="0"/>
+              <a:t>Second level</a:t>
+            </a:r>
+          </a:p>
+          <a:p>
+            <a:pPr lvl="2"/>
+            <a:r>
+              <a:rPr lang="en-US" smtClean="0"/>
+              <a:t>Third level</a:t>
+            </a:r>
+          </a:p>
+          <a:p>
+            <a:pPr lvl="3"/>
+            <a:r>
+              <a:rPr lang="en-US" smtClean="0"/>
+              <a:t>Fourth level</a:t>
+            </a:r>
+          </a:p>
+          <a:p>
+            <a:pPr lvl="4"/>
+            <a:r>
+              <a:rPr lang="en-US" smtClean="0"/>
+              <a:t>Fifth level</a:t>
+            </a:r>
+            <a:endParaRPr lang="en-US"/>
+          </a:p>
+        </p:txBody>
+      </p:sp>
+      <p:sp>
+        <p:nvSpPr>
+          <p:cNvPr id="4" name="Date Placeholder 3"/>
+          <p:cNvSpPr>
+            <a:spLocks noGrp="1"/>
+          </p:cNvSpPr>
+          <p:nvPr>
+            <p:ph type="dt" sz="half" idx="10"/>
+          </p:nvPr>
+        </p:nvSpPr>
+        <p:spPr/>
+        <p:txBody>
+          <a:bodyPr/>
+          <a:lstStyle/>
+          <a:p>
+            <a:fld id="{752084B5-01C9-41F8-9B3F-DBDC28D03793}" type="datetimeFigureOut">
+              <a:rPr lang="en-US">
+                <a:solidFill>
+                  <a:prstClr val="black">
+                    <a:tint val="75000"/>
+                  </a:prstClr>
+                </a:solidFill>
+              </a:rPr>
+              <a:pPr/>
+              <a:t>9/20/2013</a:t>
+            </a:fld>
+            <a:endParaRPr lang="en-US">
+              <a:solidFill>
+                <a:prstClr val="black">
+                  <a:tint val="75000"/>
+                </a:prstClr>
+              </a:solidFill>
+            </a:endParaRPr>
+          </a:p>
+        </p:txBody>
+      </p:sp>
+      <p:sp>
+        <p:nvSpPr>
+          <p:cNvPr id="5" name="Footer Placeholder 4"/>
+          <p:cNvSpPr>
+            <a:spLocks noGrp="1"/>
+          </p:cNvSpPr>
+          <p:nvPr>
+            <p:ph type="ftr" sz="quarter" idx="11"/>
+          </p:nvPr>
+        </p:nvSpPr>
+        <p:spPr/>
+        <p:txBody>
+          <a:bodyPr/>
+          <a:lstStyle/>
+          <a:p>
+            <a:endParaRPr lang="en-US">
+              <a:solidFill>
+                <a:prstClr val="black">
+                  <a:tint val="75000"/>
+                </a:prstClr>
+              </a:solidFill>
+            </a:endParaRPr>
+          </a:p>
+        </p:txBody>
+      </p:sp>
+      <p:sp>
+        <p:nvSpPr>
+          <p:cNvPr id="6" name="Slide Number Placeholder 5"/>
+          <p:cNvSpPr>
+            <a:spLocks noGrp="1"/>
+          </p:cNvSpPr>
+          <p:nvPr>
+            <p:ph type="sldNum" sz="quarter" idx="12"/>
+          </p:nvPr>
+        </p:nvSpPr>
+        <p:spPr/>
+        <p:txBody>
+          <a:bodyPr/>
+          <a:lstStyle/>
+          <a:p>
+            <a:fld id="{2C9314DB-5B33-4024-AF8F-A8692812E68A}" type="slidenum">
+              <a:rPr lang="en-US">
+                <a:solidFill>
+                  <a:prstClr val="black">
+                    <a:tint val="75000"/>
+                  </a:prstClr>
+                </a:solidFill>
+              </a:rPr>
+              <a:pPr/>
+              <a:t>‹#›</a:t>
+            </a:fld>
+            <a:endParaRPr lang="en-US">
+              <a:solidFill>
+                <a:prstClr val="black">
+                  <a:tint val="75000"/>
+                </a:prstClr>
+              </a:solidFill>
+            </a:endParaRPr>
+          </a:p>
+        </p:txBody>
+      </p:sp>
+    </p:spTree>
+    <p:extLst>
+      <p:ext uri="{BB962C8B-B14F-4D97-AF65-F5344CB8AC3E}">
+        <p14:creationId xmlns:p14="http://schemas.microsoft.com/office/powerpoint/2010/main" val="1895330324"/>
+      </p:ext>
+    </p:extLst>
+  </p:cSld>
+  <p:clrMapOvr>
+    <a:masterClrMapping/>
+  </p:clrMapOvr>
+</p:sldLayout>
+</file>
+
+<file path=ppt/slideLayouts/slideLayout14.xml><?xml version="1.0" encoding="utf-8"?>
+<p:sldLayout xmlns:a="http://schemas.openxmlformats.org/drawingml/2006/main" xmlns:r="http://schemas.openxmlformats.org/officeDocument/2006/relationships" xmlns:p="http://schemas.openxmlformats.org/presentationml/2006/main" type="secHead" preserve="1">
+  <p:cSld name="Section Header">
+    <p:spTree>
+      <p:nvGrpSpPr>
+        <p:cNvPr id="1" name=""/>
+        <p:cNvGrpSpPr/>
+        <p:nvPr/>
+      </p:nvGrpSpPr>
+      <p:grpSpPr>
+        <a:xfrm>
+          <a:off x="0" y="0"/>
+          <a:ext cx="0" cy="0"/>
+          <a:chOff x="0" y="0"/>
+          <a:chExt cx="0" cy="0"/>
+        </a:xfrm>
+      </p:grpSpPr>
+      <p:sp>
+        <p:nvSpPr>
+          <p:cNvPr id="2" name="Title 1"/>
+          <p:cNvSpPr>
+            <a:spLocks noGrp="1"/>
+          </p:cNvSpPr>
+          <p:nvPr>
+            <p:ph type="title"/>
+          </p:nvPr>
+        </p:nvSpPr>
+        <p:spPr>
+          <a:xfrm>
+            <a:off x="722313" y="4406900"/>
+            <a:ext cx="7772400" cy="1362075"/>
+          </a:xfrm>
+        </p:spPr>
+        <p:txBody>
+          <a:bodyPr anchor="t"/>
+          <a:lstStyle>
+            <a:lvl1pPr algn="l">
+              <a:defRPr sz="4000" b="1" cap="all"/>
+            </a:lvl1pPr>
+          </a:lstStyle>
+          <a:p>
+            <a:r>
+              <a:rPr lang="en-US" smtClean="0"/>
+              <a:t>Click to edit Master title style</a:t>
+            </a:r>
+            <a:endParaRPr lang="en-US"/>
+          </a:p>
+        </p:txBody>
+      </p:sp>
+      <p:sp>
+        <p:nvSpPr>
+          <p:cNvPr id="3" name="Text Placeholder 2"/>
+          <p:cNvSpPr>
+            <a:spLocks noGrp="1"/>
+          </p:cNvSpPr>
+          <p:nvPr>
+            <p:ph type="body" idx="1"/>
+          </p:nvPr>
+        </p:nvSpPr>
+        <p:spPr>
+          <a:xfrm>
+            <a:off x="722313" y="2906713"/>
+            <a:ext cx="7772400" cy="1500187"/>
+          </a:xfrm>
+        </p:spPr>
+        <p:txBody>
+          <a:bodyPr anchor="b"/>
+          <a:lstStyle>
+            <a:lvl1pPr marL="0" indent="0">
+              <a:buNone/>
+              <a:defRPr sz="2000">
+                <a:solidFill>
+                  <a:schemeClr val="tx1">
+                    <a:tint val="75000"/>
+                  </a:schemeClr>
+                </a:solidFill>
+              </a:defRPr>
+            </a:lvl1pPr>
+            <a:lvl2pPr marL="457200" indent="0">
+              <a:buNone/>
+              <a:defRPr sz="1800">
+                <a:solidFill>
+                  <a:schemeClr val="tx1">
+                    <a:tint val="75000"/>
+                  </a:schemeClr>
+                </a:solidFill>
+              </a:defRPr>
+            </a:lvl2pPr>
+            <a:lvl3pPr marL="914400" indent="0">
+              <a:buNone/>
+              <a:defRPr sz="1600">
+                <a:solidFill>
+                  <a:schemeClr val="tx1">
+                    <a:tint val="75000"/>
+                  </a:schemeClr>
+                </a:solidFill>
+              </a:defRPr>
+            </a:lvl3pPr>
+            <a:lvl4pPr marL="1371600" indent="0">
+              <a:buNone/>
+              <a:defRPr sz="1400">
+                <a:solidFill>
+                  <a:schemeClr val="tx1">
+                    <a:tint val="75000"/>
+                  </a:schemeClr>
+                </a:solidFill>
+              </a:defRPr>
+            </a:lvl4pPr>
+            <a:lvl5pPr marL="1828800" indent="0">
+              <a:buNone/>
+              <a:defRPr sz="1400">
+                <a:solidFill>
+                  <a:schemeClr val="tx1">
+                    <a:tint val="75000"/>
+                  </a:schemeClr>
+                </a:solidFill>
+              </a:defRPr>
+            </a:lvl5pPr>
+            <a:lvl6pPr marL="2286000" indent="0">
+              <a:buNone/>
+              <a:defRPr sz="1400">
+                <a:solidFill>
+                  <a:schemeClr val="tx1">
+                    <a:tint val="75000"/>
+                  </a:schemeClr>
+                </a:solidFill>
+              </a:defRPr>
+            </a:lvl6pPr>
+            <a:lvl7pPr marL="2743200" indent="0">
+              <a:buNone/>
+              <a:defRPr sz="1400">
+                <a:solidFill>
+                  <a:schemeClr val="tx1">
+                    <a:tint val="75000"/>
+                  </a:schemeClr>
+                </a:solidFill>
+              </a:defRPr>
+            </a:lvl7pPr>
+            <a:lvl8pPr marL="3200400" indent="0">
+              <a:buNone/>
+              <a:defRPr sz="1400">
+                <a:solidFill>
+                  <a:schemeClr val="tx1">
+                    <a:tint val="75000"/>
+                  </a:schemeClr>
+                </a:solidFill>
+              </a:defRPr>
+            </a:lvl8pPr>
+            <a:lvl9pPr marL="3657600" indent="0">
+              <a:buNone/>
+              <a:defRPr sz="1400">
+                <a:solidFill>
+                  <a:schemeClr val="tx1">
+                    <a:tint val="75000"/>
+                  </a:schemeClr>
+                </a:solidFill>
+              </a:defRPr>
+            </a:lvl9pPr>
+          </a:lstStyle>
+          <a:p>
+            <a:pPr lvl="0"/>
+            <a:r>
+              <a:rPr lang="en-US" smtClean="0"/>
+              <a:t>Click to edit Master text styles</a:t>
+            </a:r>
+          </a:p>
+        </p:txBody>
+      </p:sp>
+      <p:sp>
+        <p:nvSpPr>
+          <p:cNvPr id="4" name="Date Placeholder 3"/>
+          <p:cNvSpPr>
+            <a:spLocks noGrp="1"/>
+          </p:cNvSpPr>
+          <p:nvPr>
+            <p:ph type="dt" sz="half" idx="10"/>
+          </p:nvPr>
+        </p:nvSpPr>
+        <p:spPr/>
+        <p:txBody>
+          <a:bodyPr/>
+          <a:lstStyle/>
+          <a:p>
+            <a:fld id="{752084B5-01C9-41F8-9B3F-DBDC28D03793}" type="datetimeFigureOut">
+              <a:rPr lang="en-US">
+                <a:solidFill>
+                  <a:prstClr val="black">
+                    <a:tint val="75000"/>
+                  </a:prstClr>
+                </a:solidFill>
+              </a:rPr>
+              <a:pPr/>
+              <a:t>9/20/2013</a:t>
+            </a:fld>
+            <a:endParaRPr lang="en-US">
+              <a:solidFill>
+                <a:prstClr val="black">
+                  <a:tint val="75000"/>
+                </a:prstClr>
+              </a:solidFill>
+            </a:endParaRPr>
+          </a:p>
+        </p:txBody>
+      </p:sp>
+      <p:sp>
+        <p:nvSpPr>
+          <p:cNvPr id="5" name="Footer Placeholder 4"/>
+          <p:cNvSpPr>
+            <a:spLocks noGrp="1"/>
+          </p:cNvSpPr>
+          <p:nvPr>
+            <p:ph type="ftr" sz="quarter" idx="11"/>
+          </p:nvPr>
+        </p:nvSpPr>
+        <p:spPr/>
+        <p:txBody>
+          <a:bodyPr/>
+          <a:lstStyle/>
+          <a:p>
+            <a:endParaRPr lang="en-US">
+              <a:solidFill>
+                <a:prstClr val="black">
+                  <a:tint val="75000"/>
+                </a:prstClr>
+              </a:solidFill>
+            </a:endParaRPr>
+          </a:p>
+        </p:txBody>
+      </p:sp>
+      <p:sp>
+        <p:nvSpPr>
+          <p:cNvPr id="6" name="Slide Number Placeholder 5"/>
+          <p:cNvSpPr>
+            <a:spLocks noGrp="1"/>
+          </p:cNvSpPr>
+          <p:nvPr>
+            <p:ph type="sldNum" sz="quarter" idx="12"/>
+          </p:nvPr>
+        </p:nvSpPr>
+        <p:spPr/>
+        <p:txBody>
+          <a:bodyPr/>
+          <a:lstStyle/>
+          <a:p>
+            <a:fld id="{2C9314DB-5B33-4024-AF8F-A8692812E68A}" type="slidenum">
+              <a:rPr lang="en-US">
+                <a:solidFill>
+                  <a:prstClr val="black">
+                    <a:tint val="75000"/>
+                  </a:prstClr>
+                </a:solidFill>
+              </a:rPr>
+              <a:pPr/>
+              <a:t>‹#›</a:t>
+            </a:fld>
+            <a:endParaRPr lang="en-US">
+              <a:solidFill>
+                <a:prstClr val="black">
+                  <a:tint val="75000"/>
+                </a:prstClr>
+              </a:solidFill>
+            </a:endParaRPr>
+          </a:p>
+        </p:txBody>
+      </p:sp>
+    </p:spTree>
+    <p:extLst>
+      <p:ext uri="{BB962C8B-B14F-4D97-AF65-F5344CB8AC3E}">
+        <p14:creationId xmlns:p14="http://schemas.microsoft.com/office/powerpoint/2010/main" val="2990769623"/>
+      </p:ext>
+    </p:extLst>
+  </p:cSld>
+  <p:clrMapOvr>
+    <a:masterClrMapping/>
+  </p:clrMapOvr>
+</p:sldLayout>
+</file>
+
+<file path=ppt/slideLayouts/slideLayout15.xml><?xml version="1.0" encoding="utf-8"?>
+<p:sldLayout xmlns:a="http://schemas.openxmlformats.org/drawingml/2006/main" xmlns:r="http://schemas.openxmlformats.org/officeDocument/2006/relationships" xmlns:p="http://schemas.openxmlformats.org/presentationml/2006/main" type="twoObj" preserve="1">
+  <p:cSld name="Two Content">
+    <p:spTree>
+      <p:nvGrpSpPr>
+        <p:cNvPr id="1" name=""/>
+        <p:cNvGrpSpPr/>
+        <p:nvPr/>
+      </p:nvGrpSpPr>
+      <p:grpSpPr>
+        <a:xfrm>
+          <a:off x="0" y="0"/>
+          <a:ext cx="0" cy="0"/>
+          <a:chOff x="0" y="0"/>
+          <a:chExt cx="0" cy="0"/>
+        </a:xfrm>
+      </p:grpSpPr>
+      <p:sp>
+        <p:nvSpPr>
+          <p:cNvPr id="2" name="Title 1"/>
+          <p:cNvSpPr>
+            <a:spLocks noGrp="1"/>
+          </p:cNvSpPr>
+          <p:nvPr>
+            <p:ph type="title"/>
+          </p:nvPr>
+        </p:nvSpPr>
+        <p:spPr/>
+        <p:txBody>
+          <a:bodyPr/>
+          <a:lstStyle/>
+          <a:p>
+            <a:r>
+              <a:rPr lang="en-US" smtClean="0"/>
+              <a:t>Click to edit Master title style</a:t>
+            </a:r>
+            <a:endParaRPr lang="en-US"/>
+          </a:p>
+        </p:txBody>
+      </p:sp>
+      <p:sp>
+        <p:nvSpPr>
+          <p:cNvPr id="3" name="Content Placeholder 2"/>
+          <p:cNvSpPr>
+            <a:spLocks noGrp="1"/>
+          </p:cNvSpPr>
+          <p:nvPr>
+            <p:ph sz="half" idx="1"/>
+          </p:nvPr>
+        </p:nvSpPr>
+        <p:spPr>
+          <a:xfrm>
+            <a:off x="457200" y="1600200"/>
+            <a:ext cx="4038600" cy="4525963"/>
+          </a:xfrm>
+        </p:spPr>
+        <p:txBody>
+          <a:bodyPr/>
+          <a:lstStyle>
+            <a:lvl1pPr>
+              <a:defRPr sz="2800"/>
+            </a:lvl1pPr>
+            <a:lvl2pPr>
+              <a:defRPr sz="2400"/>
+            </a:lvl2pPr>
+            <a:lvl3pPr>
+              <a:defRPr sz="2000"/>
+            </a:lvl3pPr>
+            <a:lvl4pPr>
+              <a:defRPr sz="1800"/>
+            </a:lvl4pPr>
+            <a:lvl5pPr>
+              <a:defRPr sz="1800"/>
+            </a:lvl5pPr>
+            <a:lvl6pPr>
+              <a:defRPr sz="1800"/>
+            </a:lvl6pPr>
+            <a:lvl7pPr>
+              <a:defRPr sz="1800"/>
+            </a:lvl7pPr>
+            <a:lvl8pPr>
+              <a:defRPr sz="1800"/>
+            </a:lvl8pPr>
+            <a:lvl9pPr>
+              <a:defRPr sz="1800"/>
+            </a:lvl9pPr>
+          </a:lstStyle>
+          <a:p>
+            <a:pPr lvl="0"/>
+            <a:r>
+              <a:rPr lang="en-US" smtClean="0"/>
+              <a:t>Click to edit Master text styles</a:t>
+            </a:r>
+          </a:p>
+          <a:p>
+            <a:pPr lvl="1"/>
+            <a:r>
+              <a:rPr lang="en-US" smtClean="0"/>
+              <a:t>Second level</a:t>
+            </a:r>
+          </a:p>
+          <a:p>
+            <a:pPr lvl="2"/>
+            <a:r>
+              <a:rPr lang="en-US" smtClean="0"/>
+              <a:t>Third level</a:t>
+            </a:r>
+          </a:p>
+          <a:p>
+            <a:pPr lvl="3"/>
+            <a:r>
+              <a:rPr lang="en-US" smtClean="0"/>
+              <a:t>Fourth level</a:t>
+            </a:r>
+          </a:p>
+          <a:p>
+            <a:pPr lvl="4"/>
+            <a:r>
+              <a:rPr lang="en-US" smtClean="0"/>
+              <a:t>Fifth level</a:t>
+            </a:r>
+            <a:endParaRPr lang="en-US"/>
+          </a:p>
+        </p:txBody>
+      </p:sp>
+      <p:sp>
+        <p:nvSpPr>
+          <p:cNvPr id="4" name="Content Placeholder 3"/>
+          <p:cNvSpPr>
+            <a:spLocks noGrp="1"/>
+          </p:cNvSpPr>
+          <p:nvPr>
+            <p:ph sz="half" idx="2"/>
+          </p:nvPr>
+        </p:nvSpPr>
+        <p:spPr>
+          <a:xfrm>
+            <a:off x="4648200" y="1600200"/>
+            <a:ext cx="4038600" cy="4525963"/>
+          </a:xfrm>
+        </p:spPr>
+        <p:txBody>
+          <a:bodyPr/>
+          <a:lstStyle>
+            <a:lvl1pPr>
+              <a:defRPr sz="2800"/>
+            </a:lvl1pPr>
+            <a:lvl2pPr>
+              <a:defRPr sz="2400"/>
+            </a:lvl2pPr>
+            <a:lvl3pPr>
+              <a:defRPr sz="2000"/>
+            </a:lvl3pPr>
+            <a:lvl4pPr>
+              <a:defRPr sz="1800"/>
+            </a:lvl4pPr>
+            <a:lvl5pPr>
+              <a:defRPr sz="1800"/>
+            </a:lvl5pPr>
+            <a:lvl6pPr>
+              <a:defRPr sz="1800"/>
+            </a:lvl6pPr>
+            <a:lvl7pPr>
+              <a:defRPr sz="1800"/>
+            </a:lvl7pPr>
+            <a:lvl8pPr>
+              <a:defRPr sz="1800"/>
+            </a:lvl8pPr>
+            <a:lvl9pPr>
+              <a:defRPr sz="1800"/>
+            </a:lvl9pPr>
+          </a:lstStyle>
+          <a:p>
+            <a:pPr lvl="0"/>
+            <a:r>
+              <a:rPr lang="en-US" smtClean="0"/>
+              <a:t>Click to edit Master text styles</a:t>
+            </a:r>
+          </a:p>
+          <a:p>
+            <a:pPr lvl="1"/>
+            <a:r>
+              <a:rPr lang="en-US" smtClean="0"/>
+              <a:t>Second level</a:t>
+            </a:r>
+          </a:p>
+          <a:p>
+            <a:pPr lvl="2"/>
+            <a:r>
+              <a:rPr lang="en-US" smtClean="0"/>
+              <a:t>Third level</a:t>
+            </a:r>
+          </a:p>
+          <a:p>
+            <a:pPr lvl="3"/>
+            <a:r>
+              <a:rPr lang="en-US" smtClean="0"/>
+              <a:t>Fourth level</a:t>
+            </a:r>
+          </a:p>
+          <a:p>
+            <a:pPr lvl="4"/>
+            <a:r>
+              <a:rPr lang="en-US" smtClean="0"/>
+              <a:t>Fifth level</a:t>
+            </a:r>
+            <a:endParaRPr lang="en-US"/>
+          </a:p>
+        </p:txBody>
+      </p:sp>
+      <p:sp>
+        <p:nvSpPr>
+          <p:cNvPr id="5" name="Date Placeholder 4"/>
+          <p:cNvSpPr>
+            <a:spLocks noGrp="1"/>
+          </p:cNvSpPr>
+          <p:nvPr>
+            <p:ph type="dt" sz="half" idx="10"/>
+          </p:nvPr>
+        </p:nvSpPr>
+        <p:spPr/>
+        <p:txBody>
+          <a:bodyPr/>
+          <a:lstStyle/>
+          <a:p>
+            <a:fld id="{752084B5-01C9-41F8-9B3F-DBDC28D03793}" type="datetimeFigureOut">
+              <a:rPr lang="en-US">
+                <a:solidFill>
+                  <a:prstClr val="black">
+                    <a:tint val="75000"/>
+                  </a:prstClr>
+                </a:solidFill>
+              </a:rPr>
+              <a:pPr/>
+              <a:t>9/20/2013</a:t>
+            </a:fld>
+            <a:endParaRPr lang="en-US">
+              <a:solidFill>
+                <a:prstClr val="black">
+                  <a:tint val="75000"/>
+                </a:prstClr>
+              </a:solidFill>
+            </a:endParaRPr>
+          </a:p>
+        </p:txBody>
+      </p:sp>
+      <p:sp>
+        <p:nvSpPr>
+          <p:cNvPr id="6" name="Footer Placeholder 5"/>
+          <p:cNvSpPr>
+            <a:spLocks noGrp="1"/>
+          </p:cNvSpPr>
+          <p:nvPr>
+            <p:ph type="ftr" sz="quarter" idx="11"/>
+          </p:nvPr>
+        </p:nvSpPr>
+        <p:spPr/>
+        <p:txBody>
+          <a:bodyPr/>
+          <a:lstStyle/>
+          <a:p>
+            <a:endParaRPr lang="en-US">
+              <a:solidFill>
+                <a:prstClr val="black">
+                  <a:tint val="75000"/>
+                </a:prstClr>
+              </a:solidFill>
+            </a:endParaRPr>
+          </a:p>
+        </p:txBody>
+      </p:sp>
+      <p:sp>
+        <p:nvSpPr>
+          <p:cNvPr id="7" name="Slide Number Placeholder 6"/>
+          <p:cNvSpPr>
+            <a:spLocks noGrp="1"/>
+          </p:cNvSpPr>
+          <p:nvPr>
+            <p:ph type="sldNum" sz="quarter" idx="12"/>
+          </p:nvPr>
+        </p:nvSpPr>
+        <p:spPr/>
+        <p:txBody>
+          <a:bodyPr/>
+          <a:lstStyle/>
+          <a:p>
+            <a:fld id="{2C9314DB-5B33-4024-AF8F-A8692812E68A}" type="slidenum">
+              <a:rPr lang="en-US">
+                <a:solidFill>
+                  <a:prstClr val="black">
+                    <a:tint val="75000"/>
+                  </a:prstClr>
+                </a:solidFill>
+              </a:rPr>
+              <a:pPr/>
+              <a:t>‹#›</a:t>
+            </a:fld>
+            <a:endParaRPr lang="en-US">
+              <a:solidFill>
+                <a:prstClr val="black">
+                  <a:tint val="75000"/>
+                </a:prstClr>
+              </a:solidFill>
+            </a:endParaRPr>
+          </a:p>
+        </p:txBody>
+      </p:sp>
+    </p:spTree>
+    <p:extLst>
+      <p:ext uri="{BB962C8B-B14F-4D97-AF65-F5344CB8AC3E}">
+        <p14:creationId xmlns:p14="http://schemas.microsoft.com/office/powerpoint/2010/main" val="2881429832"/>
+      </p:ext>
+    </p:extLst>
+  </p:cSld>
+  <p:clrMapOvr>
+    <a:masterClrMapping/>
+  </p:clrMapOvr>
+</p:sldLayout>
+</file>
+
+<file path=ppt/slideLayouts/slideLayout16.xml><?xml version="1.0" encoding="utf-8"?>
+<p:sldLayout xmlns:a="http://schemas.openxmlformats.org/drawingml/2006/main" xmlns:r="http://schemas.openxmlformats.org/officeDocument/2006/relationships" xmlns:p="http://schemas.openxmlformats.org/presentationml/2006/main" type="twoTxTwoObj" preserve="1">
+  <p:cSld name="Comparison">
+    <p:spTree>
+      <p:nvGrpSpPr>
+        <p:cNvPr id="1" name=""/>
+        <p:cNvGrpSpPr/>
+        <p:nvPr/>
+      </p:nvGrpSpPr>
+      <p:grpSpPr>
+        <a:xfrm>
+          <a:off x="0" y="0"/>
+          <a:ext cx="0" cy="0"/>
+          <a:chOff x="0" y="0"/>
+          <a:chExt cx="0" cy="0"/>
+        </a:xfrm>
+      </p:grpSpPr>
+      <p:sp>
+        <p:nvSpPr>
+          <p:cNvPr id="2" name="Title 1"/>
+          <p:cNvSpPr>
+            <a:spLocks noGrp="1"/>
+          </p:cNvSpPr>
+          <p:nvPr>
+            <p:ph type="title"/>
+          </p:nvPr>
+        </p:nvSpPr>
+        <p:spPr/>
+        <p:txBody>
+          <a:bodyPr/>
+          <a:lstStyle>
+            <a:lvl1pPr>
+              <a:defRPr/>
+            </a:lvl1pPr>
+          </a:lstStyle>
+          <a:p>
+            <a:r>
+              <a:rPr lang="en-US" smtClean="0"/>
+              <a:t>Click to edit Master title style</a:t>
+            </a:r>
+            <a:endParaRPr lang="en-US"/>
+          </a:p>
+        </p:txBody>
+      </p:sp>
+      <p:sp>
+        <p:nvSpPr>
+          <p:cNvPr id="3" name="Text Placeholder 2"/>
+          <p:cNvSpPr>
+            <a:spLocks noGrp="1"/>
+          </p:cNvSpPr>
+          <p:nvPr>
+            <p:ph type="body" idx="1"/>
+          </p:nvPr>
+        </p:nvSpPr>
+        <p:spPr>
+          <a:xfrm>
+            <a:off x="457200" y="1535113"/>
+            <a:ext cx="4040188" cy="639762"/>
+          </a:xfrm>
+        </p:spPr>
+        <p:txBody>
+          <a:bodyPr anchor="b"/>
+          <a:lstStyle>
+            <a:lvl1pPr marL="0" indent="0">
+              <a:buNone/>
+              <a:defRPr sz="2400" b="1"/>
+            </a:lvl1pPr>
+            <a:lvl2pPr marL="457200" indent="0">
+              <a:buNone/>
+              <a:defRPr sz="2000" b="1"/>
+            </a:lvl2pPr>
+            <a:lvl3pPr marL="914400" indent="0">
+              <a:buNone/>
+              <a:defRPr sz="1800" b="1"/>
+            </a:lvl3pPr>
+            <a:lvl4pPr marL="1371600" indent="0">
+              <a:buNone/>
+              <a:defRPr sz="1600" b="1"/>
+            </a:lvl4pPr>
+            <a:lvl5pPr marL="1828800" indent="0">
+              <a:buNone/>
+              <a:defRPr sz="1600" b="1"/>
+            </a:lvl5pPr>
+            <a:lvl6pPr marL="2286000" indent="0">
+              <a:buNone/>
+              <a:defRPr sz="1600" b="1"/>
+            </a:lvl6pPr>
+            <a:lvl7pPr marL="2743200" indent="0">
+              <a:buNone/>
+              <a:defRPr sz="1600" b="1"/>
+            </a:lvl7pPr>
+            <a:lvl8pPr marL="3200400" indent="0">
+              <a:buNone/>
+              <a:defRPr sz="1600" b="1"/>
+            </a:lvl8pPr>
+            <a:lvl9pPr marL="3657600" indent="0">
+              <a:buNone/>
+              <a:defRPr sz="1600" b="1"/>
+            </a:lvl9pPr>
+          </a:lstStyle>
+          <a:p>
+            <a:pPr lvl="0"/>
+            <a:r>
+              <a:rPr lang="en-US" smtClean="0"/>
+              <a:t>Click to edit Master text styles</a:t>
+            </a:r>
+          </a:p>
+        </p:txBody>
+      </p:sp>
+      <p:sp>
+        <p:nvSpPr>
+          <p:cNvPr id="4" name="Content Placeholder 3"/>
+          <p:cNvSpPr>
+            <a:spLocks noGrp="1"/>
+          </p:cNvSpPr>
+          <p:nvPr>
+            <p:ph sz="half" idx="2"/>
+          </p:nvPr>
+        </p:nvSpPr>
+        <p:spPr>
+          <a:xfrm>
+            <a:off x="457200" y="2174875"/>
+            <a:ext cx="4040188" cy="3951288"/>
+          </a:xfrm>
+        </p:spPr>
+        <p:txBody>
+          <a:bodyPr/>
+          <a:lstStyle>
+            <a:lvl1pPr>
+              <a:defRPr sz="2400"/>
+            </a:lvl1pPr>
+            <a:lvl2pPr>
+              <a:defRPr sz="2000"/>
+            </a:lvl2pPr>
+            <a:lvl3pPr>
+              <a:defRPr sz="1800"/>
+            </a:lvl3pPr>
+            <a:lvl4pPr>
+              <a:defRPr sz="1600"/>
+            </a:lvl4pPr>
+            <a:lvl5pPr>
+              <a:defRPr sz="1600"/>
+            </a:lvl5pPr>
+            <a:lvl6pPr>
+              <a:defRPr sz="1600"/>
+            </a:lvl6pPr>
+            <a:lvl7pPr>
+              <a:defRPr sz="1600"/>
+            </a:lvl7pPr>
+            <a:lvl8pPr>
+              <a:defRPr sz="1600"/>
+            </a:lvl8pPr>
+            <a:lvl9pPr>
+              <a:defRPr sz="1600"/>
+            </a:lvl9pPr>
+          </a:lstStyle>
+          <a:p>
+            <a:pPr lvl="0"/>
+            <a:r>
+              <a:rPr lang="en-US" smtClean="0"/>
+              <a:t>Click to edit Master text styles</a:t>
+            </a:r>
+          </a:p>
+          <a:p>
+            <a:pPr lvl="1"/>
+            <a:r>
+              <a:rPr lang="en-US" smtClean="0"/>
+              <a:t>Second level</a:t>
+            </a:r>
+          </a:p>
+          <a:p>
+            <a:pPr lvl="2"/>
+            <a:r>
+              <a:rPr lang="en-US" smtClean="0"/>
+              <a:t>Third level</a:t>
+            </a:r>
+          </a:p>
+          <a:p>
+            <a:pPr lvl="3"/>
+            <a:r>
+              <a:rPr lang="en-US" smtClean="0"/>
+              <a:t>Fourth level</a:t>
+            </a:r>
+          </a:p>
+          <a:p>
+            <a:pPr lvl="4"/>
+            <a:r>
+              <a:rPr lang="en-US" smtClean="0"/>
+              <a:t>Fifth level</a:t>
+            </a:r>
+            <a:endParaRPr lang="en-US"/>
+          </a:p>
+        </p:txBody>
+      </p:sp>
+      <p:sp>
+        <p:nvSpPr>
+          <p:cNvPr id="5" name="Text Placeholder 4"/>
+          <p:cNvSpPr>
+            <a:spLocks noGrp="1"/>
+          </p:cNvSpPr>
+          <p:nvPr>
+            <p:ph type="body" sz="quarter" idx="3"/>
+          </p:nvPr>
+        </p:nvSpPr>
+        <p:spPr>
+          <a:xfrm>
+            <a:off x="4645025" y="1535113"/>
+            <a:ext cx="4041775" cy="639762"/>
+          </a:xfrm>
+        </p:spPr>
+        <p:txBody>
+          <a:bodyPr anchor="b"/>
+          <a:lstStyle>
+            <a:lvl1pPr marL="0" indent="0">
+              <a:buNone/>
+              <a:defRPr sz="2400" b="1"/>
+            </a:lvl1pPr>
+            <a:lvl2pPr marL="457200" indent="0">
+              <a:buNone/>
+              <a:defRPr sz="2000" b="1"/>
+            </a:lvl2pPr>
+            <a:lvl3pPr marL="914400" indent="0">
+              <a:buNone/>
+              <a:defRPr sz="1800" b="1"/>
+            </a:lvl3pPr>
+            <a:lvl4pPr marL="1371600" indent="0">
+              <a:buNone/>
+              <a:defRPr sz="1600" b="1"/>
+            </a:lvl4pPr>
+            <a:lvl5pPr marL="1828800" indent="0">
+              <a:buNone/>
+              <a:defRPr sz="1600" b="1"/>
+            </a:lvl5pPr>
+            <a:lvl6pPr marL="2286000" indent="0">
+              <a:buNone/>
+              <a:defRPr sz="1600" b="1"/>
+            </a:lvl6pPr>
+            <a:lvl7pPr marL="2743200" indent="0">
+              <a:buNone/>
+              <a:defRPr sz="1600" b="1"/>
+            </a:lvl7pPr>
+            <a:lvl8pPr marL="3200400" indent="0">
+              <a:buNone/>
+              <a:defRPr sz="1600" b="1"/>
+            </a:lvl8pPr>
+            <a:lvl9pPr marL="3657600" indent="0">
+              <a:buNone/>
+              <a:defRPr sz="1600" b="1"/>
+            </a:lvl9pPr>
+          </a:lstStyle>
+          <a:p>
+            <a:pPr lvl="0"/>
+            <a:r>
+              <a:rPr lang="en-US" smtClean="0"/>
+              <a:t>Click to edit Master text styles</a:t>
+            </a:r>
+          </a:p>
+        </p:txBody>
+      </p:sp>
+      <p:sp>
+        <p:nvSpPr>
+          <p:cNvPr id="6" name="Content Placeholder 5"/>
+          <p:cNvSpPr>
+            <a:spLocks noGrp="1"/>
+          </p:cNvSpPr>
+          <p:nvPr>
+            <p:ph sz="quarter" idx="4"/>
+          </p:nvPr>
+        </p:nvSpPr>
+        <p:spPr>
+          <a:xfrm>
+            <a:off x="4645025" y="2174875"/>
+            <a:ext cx="4041775" cy="3951288"/>
+          </a:xfrm>
+        </p:spPr>
+        <p:txBody>
+          <a:bodyPr/>
+          <a:lstStyle>
+            <a:lvl1pPr>
+              <a:defRPr sz="2400"/>
+            </a:lvl1pPr>
+            <a:lvl2pPr>
+              <a:defRPr sz="2000"/>
+            </a:lvl2pPr>
+            <a:lvl3pPr>
+              <a:defRPr sz="1800"/>
+            </a:lvl3pPr>
+            <a:lvl4pPr>
+              <a:defRPr sz="1600"/>
+            </a:lvl4pPr>
+            <a:lvl5pPr>
+              <a:defRPr sz="1600"/>
+            </a:lvl5pPr>
+            <a:lvl6pPr>
+              <a:defRPr sz="1600"/>
+            </a:lvl6pPr>
+            <a:lvl7pPr>
+              <a:defRPr sz="1600"/>
+            </a:lvl7pPr>
+            <a:lvl8pPr>
+              <a:defRPr sz="1600"/>
+            </a:lvl8pPr>
+            <a:lvl9pPr>
+              <a:defRPr sz="1600"/>
+            </a:lvl9pPr>
+          </a:lstStyle>
+          <a:p>
+            <a:pPr lvl="0"/>
+            <a:r>
+              <a:rPr lang="en-US" smtClean="0"/>
+              <a:t>Click to edit Master text styles</a:t>
+            </a:r>
+          </a:p>
+          <a:p>
+            <a:pPr lvl="1"/>
+            <a:r>
+              <a:rPr lang="en-US" smtClean="0"/>
+              <a:t>Second level</a:t>
+            </a:r>
+          </a:p>
+          <a:p>
+            <a:pPr lvl="2"/>
+            <a:r>
+              <a:rPr lang="en-US" smtClean="0"/>
+              <a:t>Third level</a:t>
+            </a:r>
+          </a:p>
+          <a:p>
+            <a:pPr lvl="3"/>
+            <a:r>
+              <a:rPr lang="en-US" smtClean="0"/>
+              <a:t>Fourth level</a:t>
+            </a:r>
+          </a:p>
+          <a:p>
+            <a:pPr lvl="4"/>
+            <a:r>
+              <a:rPr lang="en-US" smtClean="0"/>
+              <a:t>Fifth level</a:t>
+            </a:r>
+            <a:endParaRPr lang="en-US"/>
+          </a:p>
+        </p:txBody>
+      </p:sp>
+      <p:sp>
+        <p:nvSpPr>
+          <p:cNvPr id="7" name="Date Placeholder 6"/>
+          <p:cNvSpPr>
+            <a:spLocks noGrp="1"/>
+          </p:cNvSpPr>
+          <p:nvPr>
+            <p:ph type="dt" sz="half" idx="10"/>
+          </p:nvPr>
+        </p:nvSpPr>
+        <p:spPr/>
+        <p:txBody>
+          <a:bodyPr/>
+          <a:lstStyle/>
+          <a:p>
+            <a:fld id="{752084B5-01C9-41F8-9B3F-DBDC28D03793}" type="datetimeFigureOut">
+              <a:rPr lang="en-US">
+                <a:solidFill>
+                  <a:prstClr val="black">
+                    <a:tint val="75000"/>
+                  </a:prstClr>
+                </a:solidFill>
+              </a:rPr>
+              <a:pPr/>
+              <a:t>9/20/2013</a:t>
+            </a:fld>
+            <a:endParaRPr lang="en-US">
+              <a:solidFill>
+                <a:prstClr val="black">
+                  <a:tint val="75000"/>
+                </a:prstClr>
+              </a:solidFill>
+            </a:endParaRPr>
+          </a:p>
+        </p:txBody>
+      </p:sp>
+      <p:sp>
+        <p:nvSpPr>
+          <p:cNvPr id="8" name="Footer Placeholder 7"/>
+          <p:cNvSpPr>
+            <a:spLocks noGrp="1"/>
+          </p:cNvSpPr>
+          <p:nvPr>
+            <p:ph type="ftr" sz="quarter" idx="11"/>
+          </p:nvPr>
+        </p:nvSpPr>
+        <p:spPr/>
+        <p:txBody>
+          <a:bodyPr/>
+          <a:lstStyle/>
+          <a:p>
+            <a:endParaRPr lang="en-US">
+              <a:solidFill>
+                <a:prstClr val="black">
+                  <a:tint val="75000"/>
+                </a:prstClr>
+              </a:solidFill>
+            </a:endParaRPr>
+          </a:p>
+        </p:txBody>
+      </p:sp>
+      <p:sp>
+        <p:nvSpPr>
+          <p:cNvPr id="9" name="Slide Number Placeholder 8"/>
+          <p:cNvSpPr>
+            <a:spLocks noGrp="1"/>
+          </p:cNvSpPr>
+          <p:nvPr>
+            <p:ph type="sldNum" sz="quarter" idx="12"/>
+          </p:nvPr>
+        </p:nvSpPr>
+        <p:spPr/>
+        <p:txBody>
+          <a:bodyPr/>
+          <a:lstStyle/>
+          <a:p>
+            <a:fld id="{2C9314DB-5B33-4024-AF8F-A8692812E68A}" type="slidenum">
+              <a:rPr lang="en-US">
+                <a:solidFill>
+                  <a:prstClr val="black">
+                    <a:tint val="75000"/>
+                  </a:prstClr>
+                </a:solidFill>
+              </a:rPr>
+              <a:pPr/>
+              <a:t>‹#›</a:t>
+            </a:fld>
+            <a:endParaRPr lang="en-US">
+              <a:solidFill>
+                <a:prstClr val="black">
+                  <a:tint val="75000"/>
+                </a:prstClr>
+              </a:solidFill>
+            </a:endParaRPr>
+          </a:p>
+        </p:txBody>
+      </p:sp>
+    </p:spTree>
+    <p:extLst>
+      <p:ext uri="{BB962C8B-B14F-4D97-AF65-F5344CB8AC3E}">
+        <p14:creationId xmlns:p14="http://schemas.microsoft.com/office/powerpoint/2010/main" val="4242287961"/>
+      </p:ext>
+    </p:extLst>
+  </p:cSld>
+  <p:clrMapOvr>
+    <a:masterClrMapping/>
+  </p:clrMapOvr>
+</p:sldLayout>
+</file>
+
+<file path=ppt/slideLayouts/slideLayout17.xml><?xml version="1.0" encoding="utf-8"?>
+<p:sldLayout xmlns:a="http://schemas.openxmlformats.org/drawingml/2006/main" xmlns:r="http://schemas.openxmlformats.org/officeDocument/2006/relationships" xmlns:p="http://schemas.openxmlformats.org/presentationml/2006/main" type="titleOnly" preserve="1">
+  <p:cSld name="Title Only">
+    <p:spTree>
+      <p:nvGrpSpPr>
+        <p:cNvPr id="1" name=""/>
+        <p:cNvGrpSpPr/>
+        <p:nvPr/>
+      </p:nvGrpSpPr>
+      <p:grpSpPr>
+        <a:xfrm>
+          <a:off x="0" y="0"/>
+          <a:ext cx="0" cy="0"/>
+          <a:chOff x="0" y="0"/>
+          <a:chExt cx="0" cy="0"/>
+        </a:xfrm>
+      </p:grpSpPr>
+      <p:sp>
+        <p:nvSpPr>
+          <p:cNvPr id="2" name="Title 1"/>
+          <p:cNvSpPr>
+            <a:spLocks noGrp="1"/>
+          </p:cNvSpPr>
+          <p:nvPr>
+            <p:ph type="title"/>
+          </p:nvPr>
+        </p:nvSpPr>
+        <p:spPr/>
+        <p:txBody>
+          <a:bodyPr/>
+          <a:lstStyle/>
+          <a:p>
+            <a:r>
+              <a:rPr lang="en-US" smtClean="0"/>
+              <a:t>Click to edit Master title style</a:t>
+            </a:r>
+            <a:endParaRPr lang="en-US"/>
+          </a:p>
+        </p:txBody>
+      </p:sp>
+      <p:sp>
+        <p:nvSpPr>
+          <p:cNvPr id="3" name="Date Placeholder 2"/>
+          <p:cNvSpPr>
+            <a:spLocks noGrp="1"/>
+          </p:cNvSpPr>
+          <p:nvPr>
+            <p:ph type="dt" sz="half" idx="10"/>
+          </p:nvPr>
+        </p:nvSpPr>
+        <p:spPr/>
+        <p:txBody>
+          <a:bodyPr/>
+          <a:lstStyle/>
+          <a:p>
+            <a:fld id="{752084B5-01C9-41F8-9B3F-DBDC28D03793}" type="datetimeFigureOut">
+              <a:rPr lang="en-US">
+                <a:solidFill>
+                  <a:prstClr val="black">
+                    <a:tint val="75000"/>
+                  </a:prstClr>
+                </a:solidFill>
+              </a:rPr>
+              <a:pPr/>
+              <a:t>9/20/2013</a:t>
+            </a:fld>
+            <a:endParaRPr lang="en-US">
+              <a:solidFill>
+                <a:prstClr val="black">
+                  <a:tint val="75000"/>
+                </a:prstClr>
+              </a:solidFill>
+            </a:endParaRPr>
+          </a:p>
+        </p:txBody>
+      </p:sp>
+      <p:sp>
+        <p:nvSpPr>
+          <p:cNvPr id="4" name="Footer Placeholder 3"/>
+          <p:cNvSpPr>
+            <a:spLocks noGrp="1"/>
+          </p:cNvSpPr>
+          <p:nvPr>
+            <p:ph type="ftr" sz="quarter" idx="11"/>
+          </p:nvPr>
+        </p:nvSpPr>
+        <p:spPr/>
+        <p:txBody>
+          <a:bodyPr/>
+          <a:lstStyle/>
+          <a:p>
+            <a:endParaRPr lang="en-US">
+              <a:solidFill>
+                <a:prstClr val="black">
+                  <a:tint val="75000"/>
+                </a:prstClr>
+              </a:solidFill>
+            </a:endParaRPr>
+          </a:p>
+        </p:txBody>
+      </p:sp>
+      <p:sp>
+        <p:nvSpPr>
+          <p:cNvPr id="5" name="Slide Number Placeholder 4"/>
+          <p:cNvSpPr>
+            <a:spLocks noGrp="1"/>
+          </p:cNvSpPr>
+          <p:nvPr>
+            <p:ph type="sldNum" sz="quarter" idx="12"/>
+          </p:nvPr>
+        </p:nvSpPr>
+        <p:spPr/>
+        <p:txBody>
+          <a:bodyPr/>
+          <a:lstStyle/>
+          <a:p>
+            <a:fld id="{2C9314DB-5B33-4024-AF8F-A8692812E68A}" type="slidenum">
+              <a:rPr lang="en-US">
+                <a:solidFill>
+                  <a:prstClr val="black">
+                    <a:tint val="75000"/>
+                  </a:prstClr>
+                </a:solidFill>
+              </a:rPr>
+              <a:pPr/>
+              <a:t>‹#›</a:t>
+            </a:fld>
+            <a:endParaRPr lang="en-US">
+              <a:solidFill>
+                <a:prstClr val="black">
+                  <a:tint val="75000"/>
+                </a:prstClr>
+              </a:solidFill>
+            </a:endParaRPr>
+          </a:p>
+        </p:txBody>
+      </p:sp>
+    </p:spTree>
+    <p:extLst>
+      <p:ext uri="{BB962C8B-B14F-4D97-AF65-F5344CB8AC3E}">
+        <p14:creationId xmlns:p14="http://schemas.microsoft.com/office/powerpoint/2010/main" val="458534367"/>
+      </p:ext>
+    </p:extLst>
+  </p:cSld>
+  <p:clrMapOvr>
+    <a:masterClrMapping/>
+  </p:clrMapOvr>
+</p:sldLayout>
+</file>
+
+<file path=ppt/slideLayouts/slideLayout18.xml><?xml version="1.0" encoding="utf-8"?>
+<p:sldLayout xmlns:a="http://schemas.openxmlformats.org/drawingml/2006/main" xmlns:r="http://schemas.openxmlformats.org/officeDocument/2006/relationships" xmlns:p="http://schemas.openxmlformats.org/presentationml/2006/main" type="blank" preserve="1">
+  <p:cSld name="Blank">
+    <p:spTree>
+      <p:nvGrpSpPr>
+        <p:cNvPr id="1" name=""/>
+        <p:cNvGrpSpPr/>
+        <p:nvPr/>
+      </p:nvGrpSpPr>
+      <p:grpSpPr>
+        <a:xfrm>
+          <a:off x="0" y="0"/>
+          <a:ext cx="0" cy="0"/>
+          <a:chOff x="0" y="0"/>
+          <a:chExt cx="0" cy="0"/>
+        </a:xfrm>
+      </p:grpSpPr>
+      <p:sp>
+        <p:nvSpPr>
+          <p:cNvPr id="2" name="Date Placeholder 1"/>
+          <p:cNvSpPr>
+            <a:spLocks noGrp="1"/>
+          </p:cNvSpPr>
+          <p:nvPr>
+            <p:ph type="dt" sz="half" idx="10"/>
+          </p:nvPr>
+        </p:nvSpPr>
+        <p:spPr/>
+        <p:txBody>
+          <a:bodyPr/>
+          <a:lstStyle/>
+          <a:p>
+            <a:fld id="{752084B5-01C9-41F8-9B3F-DBDC28D03793}" type="datetimeFigureOut">
+              <a:rPr lang="en-US">
+                <a:solidFill>
+                  <a:prstClr val="black">
+                    <a:tint val="75000"/>
+                  </a:prstClr>
+                </a:solidFill>
+              </a:rPr>
+              <a:pPr/>
+              <a:t>9/20/2013</a:t>
+            </a:fld>
+            <a:endParaRPr lang="en-US">
+              <a:solidFill>
+                <a:prstClr val="black">
+                  <a:tint val="75000"/>
+                </a:prstClr>
+              </a:solidFill>
+            </a:endParaRPr>
+          </a:p>
+        </p:txBody>
+      </p:sp>
+      <p:sp>
+        <p:nvSpPr>
+          <p:cNvPr id="3" name="Footer Placeholder 2"/>
+          <p:cNvSpPr>
+            <a:spLocks noGrp="1"/>
+          </p:cNvSpPr>
+          <p:nvPr>
+            <p:ph type="ftr" sz="quarter" idx="11"/>
+          </p:nvPr>
+        </p:nvSpPr>
+        <p:spPr/>
+        <p:txBody>
+          <a:bodyPr/>
+          <a:lstStyle/>
+          <a:p>
+            <a:endParaRPr lang="en-US">
+              <a:solidFill>
+                <a:prstClr val="black">
+                  <a:tint val="75000"/>
+                </a:prstClr>
+              </a:solidFill>
+            </a:endParaRPr>
+          </a:p>
+        </p:txBody>
+      </p:sp>
+      <p:sp>
+        <p:nvSpPr>
+          <p:cNvPr id="4" name="Slide Number Placeholder 3"/>
+          <p:cNvSpPr>
+            <a:spLocks noGrp="1"/>
+          </p:cNvSpPr>
+          <p:nvPr>
+            <p:ph type="sldNum" sz="quarter" idx="12"/>
+          </p:nvPr>
+        </p:nvSpPr>
+        <p:spPr/>
+        <p:txBody>
+          <a:bodyPr/>
+          <a:lstStyle/>
+          <a:p>
+            <a:fld id="{2C9314DB-5B33-4024-AF8F-A8692812E68A}" type="slidenum">
+              <a:rPr lang="en-US">
+                <a:solidFill>
+                  <a:prstClr val="black">
+                    <a:tint val="75000"/>
+                  </a:prstClr>
+                </a:solidFill>
+              </a:rPr>
+              <a:pPr/>
+              <a:t>‹#›</a:t>
+            </a:fld>
+            <a:endParaRPr lang="en-US">
+              <a:solidFill>
+                <a:prstClr val="black">
+                  <a:tint val="75000"/>
+                </a:prstClr>
+              </a:solidFill>
+            </a:endParaRPr>
+          </a:p>
+        </p:txBody>
+      </p:sp>
+    </p:spTree>
+    <p:extLst>
+      <p:ext uri="{BB962C8B-B14F-4D97-AF65-F5344CB8AC3E}">
+        <p14:creationId xmlns:p14="http://schemas.microsoft.com/office/powerpoint/2010/main" val="2532157510"/>
+      </p:ext>
+    </p:extLst>
+  </p:cSld>
+  <p:clrMapOvr>
+    <a:masterClrMapping/>
+  </p:clrMapOvr>
+</p:sldLayout>
+</file>
+
+<file path=ppt/slideLayouts/slideLayout19.xml><?xml version="1.0" encoding="utf-8"?>
+<p:sldLayout xmlns:a="http://schemas.openxmlformats.org/drawingml/2006/main" xmlns:r="http://schemas.openxmlformats.org/officeDocument/2006/relationships" xmlns:p="http://schemas.openxmlformats.org/presentationml/2006/main" type="objTx" preserve="1">
+  <p:cSld name="Content with Caption">
+    <p:spTree>
+      <p:nvGrpSpPr>
+        <p:cNvPr id="1" name=""/>
+        <p:cNvGrpSpPr/>
+        <p:nvPr/>
+      </p:nvGrpSpPr>
+      <p:grpSpPr>
+        <a:xfrm>
+          <a:off x="0" y="0"/>
+          <a:ext cx="0" cy="0"/>
+          <a:chOff x="0" y="0"/>
+          <a:chExt cx="0" cy="0"/>
+        </a:xfrm>
+      </p:grpSpPr>
+      <p:sp>
+        <p:nvSpPr>
+          <p:cNvPr id="2" name="Title 1"/>
+          <p:cNvSpPr>
+            <a:spLocks noGrp="1"/>
+          </p:cNvSpPr>
+          <p:nvPr>
+            <p:ph type="title"/>
+          </p:nvPr>
+        </p:nvSpPr>
+        <p:spPr>
+          <a:xfrm>
+            <a:off x="457200" y="273050"/>
+            <a:ext cx="3008313" cy="1162050"/>
+          </a:xfrm>
+        </p:spPr>
+        <p:txBody>
+          <a:bodyPr anchor="b"/>
+          <a:lstStyle>
+            <a:lvl1pPr algn="l">
+              <a:defRPr sz="2000" b="1"/>
+            </a:lvl1pPr>
+          </a:lstStyle>
+          <a:p>
+            <a:r>
+              <a:rPr lang="en-US" smtClean="0"/>
+              <a:t>Click to edit Master title style</a:t>
+            </a:r>
+            <a:endParaRPr lang="en-US"/>
+          </a:p>
+        </p:txBody>
+      </p:sp>
+      <p:sp>
+        <p:nvSpPr>
+          <p:cNvPr id="3" name="Content Placeholder 2"/>
+          <p:cNvSpPr>
+            <a:spLocks noGrp="1"/>
+          </p:cNvSpPr>
+          <p:nvPr>
+            <p:ph idx="1"/>
+          </p:nvPr>
+        </p:nvSpPr>
+        <p:spPr>
+          <a:xfrm>
+            <a:off x="3575050" y="273050"/>
+            <a:ext cx="5111750" cy="5853113"/>
+          </a:xfrm>
+        </p:spPr>
+        <p:txBody>
+          <a:bodyPr/>
+          <a:lstStyle>
+            <a:lvl1pPr>
+              <a:defRPr sz="3200"/>
+            </a:lvl1pPr>
+            <a:lvl2pPr>
+              <a:defRPr sz="2800"/>
+            </a:lvl2pPr>
+            <a:lvl3pPr>
+              <a:defRPr sz="2400"/>
+            </a:lvl3pPr>
+            <a:lvl4pPr>
+              <a:defRPr sz="2000"/>
+            </a:lvl4pPr>
+            <a:lvl5pPr>
+              <a:defRPr sz="2000"/>
+            </a:lvl5pPr>
+            <a:lvl6pPr>
+              <a:defRPr sz="2000"/>
+            </a:lvl6pPr>
+            <a:lvl7pPr>
+              <a:defRPr sz="2000"/>
+            </a:lvl7pPr>
+            <a:lvl8pPr>
+              <a:defRPr sz="2000"/>
+            </a:lvl8pPr>
+            <a:lvl9pPr>
+              <a:defRPr sz="2000"/>
+            </a:lvl9pPr>
+          </a:lstStyle>
+          <a:p>
+            <a:pPr lvl="0"/>
+            <a:r>
+              <a:rPr lang="en-US" smtClean="0"/>
+              <a:t>Click to edit Master text styles</a:t>
+            </a:r>
+          </a:p>
+          <a:p>
+            <a:pPr lvl="1"/>
+            <a:r>
+              <a:rPr lang="en-US" smtClean="0"/>
+              <a:t>Second level</a:t>
+            </a:r>
+          </a:p>
+          <a:p>
+            <a:pPr lvl="2"/>
+            <a:r>
+              <a:rPr lang="en-US" smtClean="0"/>
+              <a:t>Third level</a:t>
+            </a:r>
+          </a:p>
+          <a:p>
+            <a:pPr lvl="3"/>
+            <a:r>
+              <a:rPr lang="en-US" smtClean="0"/>
+              <a:t>Fourth level</a:t>
+            </a:r>
+          </a:p>
+          <a:p>
+            <a:pPr lvl="4"/>
+            <a:r>
+              <a:rPr lang="en-US" smtClean="0"/>
+              <a:t>Fifth level</a:t>
+            </a:r>
+            <a:endParaRPr lang="en-US"/>
+          </a:p>
+        </p:txBody>
+      </p:sp>
+      <p:sp>
+        <p:nvSpPr>
+          <p:cNvPr id="4" name="Text Placeholder 3"/>
+          <p:cNvSpPr>
+            <a:spLocks noGrp="1"/>
+          </p:cNvSpPr>
+          <p:nvPr>
+            <p:ph type="body" sz="half" idx="2"/>
+          </p:nvPr>
+        </p:nvSpPr>
+        <p:spPr>
+          <a:xfrm>
+            <a:off x="457200" y="1435100"/>
+            <a:ext cx="3008313" cy="4691063"/>
+          </a:xfrm>
+        </p:spPr>
+        <p:txBody>
+          <a:bodyPr/>
+          <a:lstStyle>
+            <a:lvl1pPr marL="0" indent="0">
+              <a:buNone/>
+              <a:defRPr sz="1400"/>
+            </a:lvl1pPr>
+            <a:lvl2pPr marL="457200" indent="0">
+              <a:buNone/>
+              <a:defRPr sz="1200"/>
+            </a:lvl2pPr>
+            <a:lvl3pPr marL="914400" indent="0">
+              <a:buNone/>
+              <a:defRPr sz="1000"/>
+            </a:lvl3pPr>
+            <a:lvl4pPr marL="1371600" indent="0">
+              <a:buNone/>
+              <a:defRPr sz="900"/>
+            </a:lvl4pPr>
+            <a:lvl5pPr marL="1828800" indent="0">
+              <a:buNone/>
+              <a:defRPr sz="900"/>
+            </a:lvl5pPr>
+            <a:lvl6pPr marL="2286000" indent="0">
+              <a:buNone/>
+              <a:defRPr sz="900"/>
+            </a:lvl6pPr>
+            <a:lvl7pPr marL="2743200" indent="0">
+              <a:buNone/>
+              <a:defRPr sz="900"/>
+            </a:lvl7pPr>
+            <a:lvl8pPr marL="3200400" indent="0">
+              <a:buNone/>
+              <a:defRPr sz="900"/>
+            </a:lvl8pPr>
+            <a:lvl9pPr marL="3657600" indent="0">
+              <a:buNone/>
+              <a:defRPr sz="900"/>
+            </a:lvl9pPr>
+          </a:lstStyle>
+          <a:p>
+            <a:pPr lvl="0"/>
+            <a:r>
+              <a:rPr lang="en-US" smtClean="0"/>
+              <a:t>Click to edit Master text styles</a:t>
+            </a:r>
+          </a:p>
+        </p:txBody>
+      </p:sp>
+      <p:sp>
+        <p:nvSpPr>
+          <p:cNvPr id="5" name="Date Placeholder 4"/>
+          <p:cNvSpPr>
+            <a:spLocks noGrp="1"/>
+          </p:cNvSpPr>
+          <p:nvPr>
+            <p:ph type="dt" sz="half" idx="10"/>
+          </p:nvPr>
+        </p:nvSpPr>
+        <p:spPr/>
+        <p:txBody>
+          <a:bodyPr/>
+          <a:lstStyle/>
+          <a:p>
+            <a:fld id="{752084B5-01C9-41F8-9B3F-DBDC28D03793}" type="datetimeFigureOut">
+              <a:rPr lang="en-US">
+                <a:solidFill>
+                  <a:prstClr val="black">
+                    <a:tint val="75000"/>
+                  </a:prstClr>
+                </a:solidFill>
+              </a:rPr>
+              <a:pPr/>
+              <a:t>9/20/2013</a:t>
+            </a:fld>
+            <a:endParaRPr lang="en-US">
+              <a:solidFill>
+                <a:prstClr val="black">
+                  <a:tint val="75000"/>
+                </a:prstClr>
+              </a:solidFill>
+            </a:endParaRPr>
+          </a:p>
+        </p:txBody>
+      </p:sp>
+      <p:sp>
+        <p:nvSpPr>
+          <p:cNvPr id="6" name="Footer Placeholder 5"/>
+          <p:cNvSpPr>
+            <a:spLocks noGrp="1"/>
+          </p:cNvSpPr>
+          <p:nvPr>
+            <p:ph type="ftr" sz="quarter" idx="11"/>
+          </p:nvPr>
+        </p:nvSpPr>
+        <p:spPr/>
+        <p:txBody>
+          <a:bodyPr/>
+          <a:lstStyle/>
+          <a:p>
+            <a:endParaRPr lang="en-US">
+              <a:solidFill>
+                <a:prstClr val="black">
+                  <a:tint val="75000"/>
+                </a:prstClr>
+              </a:solidFill>
+            </a:endParaRPr>
+          </a:p>
+        </p:txBody>
+      </p:sp>
+      <p:sp>
+        <p:nvSpPr>
+          <p:cNvPr id="7" name="Slide Number Placeholder 6"/>
+          <p:cNvSpPr>
+            <a:spLocks noGrp="1"/>
+          </p:cNvSpPr>
+          <p:nvPr>
+            <p:ph type="sldNum" sz="quarter" idx="12"/>
+          </p:nvPr>
+        </p:nvSpPr>
+        <p:spPr/>
+        <p:txBody>
+          <a:bodyPr/>
+          <a:lstStyle/>
+          <a:p>
+            <a:fld id="{2C9314DB-5B33-4024-AF8F-A8692812E68A}" type="slidenum">
+              <a:rPr lang="en-US">
+                <a:solidFill>
+                  <a:prstClr val="black">
+                    <a:tint val="75000"/>
+                  </a:prstClr>
+                </a:solidFill>
+              </a:rPr>
+              <a:pPr/>
+              <a:t>‹#›</a:t>
+            </a:fld>
+            <a:endParaRPr lang="en-US">
+              <a:solidFill>
+                <a:prstClr val="black">
+                  <a:tint val="75000"/>
+                </a:prstClr>
+              </a:solidFill>
+            </a:endParaRPr>
+          </a:p>
+        </p:txBody>
+      </p:sp>
+    </p:spTree>
+    <p:extLst>
+      <p:ext uri="{BB962C8B-B14F-4D97-AF65-F5344CB8AC3E}">
+        <p14:creationId xmlns:p14="http://schemas.microsoft.com/office/powerpoint/2010/main" val="324273418"/>
       </p:ext>
     </p:extLst>
   </p:cSld>
@@ -808,7 +2924,7 @@
           <a:p>
             <a:fld id="{5EBFDE7A-2F88-4186-BBAC-CFFB1713D382}" type="datetimeFigureOut">
               <a:rPr lang="en-US" smtClean="0"/>
-              <a:t>7/11/2013</a:t>
+              <a:t>9/20/2013</a:t>
             </a:fld>
             <a:endParaRPr lang="en-US"/>
           </a:p>
@@ -860,6 +2976,705 @@
     <p:extLst>
       <p:ext uri="{BB962C8B-B14F-4D97-AF65-F5344CB8AC3E}">
         <p14:creationId xmlns:p14="http://schemas.microsoft.com/office/powerpoint/2010/main" val="363164378"/>
+      </p:ext>
+    </p:extLst>
+  </p:cSld>
+  <p:clrMapOvr>
+    <a:masterClrMapping/>
+  </p:clrMapOvr>
+</p:sldLayout>
+</file>
+
+<file path=ppt/slideLayouts/slideLayout20.xml><?xml version="1.0" encoding="utf-8"?>
+<p:sldLayout xmlns:a="http://schemas.openxmlformats.org/drawingml/2006/main" xmlns:r="http://schemas.openxmlformats.org/officeDocument/2006/relationships" xmlns:p="http://schemas.openxmlformats.org/presentationml/2006/main" type="picTx" preserve="1">
+  <p:cSld name="Picture with Caption">
+    <p:spTree>
+      <p:nvGrpSpPr>
+        <p:cNvPr id="1" name=""/>
+        <p:cNvGrpSpPr/>
+        <p:nvPr/>
+      </p:nvGrpSpPr>
+      <p:grpSpPr>
+        <a:xfrm>
+          <a:off x="0" y="0"/>
+          <a:ext cx="0" cy="0"/>
+          <a:chOff x="0" y="0"/>
+          <a:chExt cx="0" cy="0"/>
+        </a:xfrm>
+      </p:grpSpPr>
+      <p:sp>
+        <p:nvSpPr>
+          <p:cNvPr id="2" name="Title 1"/>
+          <p:cNvSpPr>
+            <a:spLocks noGrp="1"/>
+          </p:cNvSpPr>
+          <p:nvPr>
+            <p:ph type="title"/>
+          </p:nvPr>
+        </p:nvSpPr>
+        <p:spPr>
+          <a:xfrm>
+            <a:off x="1792288" y="4800600"/>
+            <a:ext cx="5486400" cy="566738"/>
+          </a:xfrm>
+        </p:spPr>
+        <p:txBody>
+          <a:bodyPr anchor="b"/>
+          <a:lstStyle>
+            <a:lvl1pPr algn="l">
+              <a:defRPr sz="2000" b="1"/>
+            </a:lvl1pPr>
+          </a:lstStyle>
+          <a:p>
+            <a:r>
+              <a:rPr lang="en-US" smtClean="0"/>
+              <a:t>Click to edit Master title style</a:t>
+            </a:r>
+            <a:endParaRPr lang="en-US"/>
+          </a:p>
+        </p:txBody>
+      </p:sp>
+      <p:sp>
+        <p:nvSpPr>
+          <p:cNvPr id="3" name="Picture Placeholder 2"/>
+          <p:cNvSpPr>
+            <a:spLocks noGrp="1"/>
+          </p:cNvSpPr>
+          <p:nvPr>
+            <p:ph type="pic" idx="1"/>
+          </p:nvPr>
+        </p:nvSpPr>
+        <p:spPr>
+          <a:xfrm>
+            <a:off x="1792288" y="612775"/>
+            <a:ext cx="5486400" cy="4114800"/>
+          </a:xfrm>
+        </p:spPr>
+        <p:txBody>
+          <a:bodyPr/>
+          <a:lstStyle>
+            <a:lvl1pPr marL="0" indent="0">
+              <a:buNone/>
+              <a:defRPr sz="3200"/>
+            </a:lvl1pPr>
+            <a:lvl2pPr marL="457200" indent="0">
+              <a:buNone/>
+              <a:defRPr sz="2800"/>
+            </a:lvl2pPr>
+            <a:lvl3pPr marL="914400" indent="0">
+              <a:buNone/>
+              <a:defRPr sz="2400"/>
+            </a:lvl3pPr>
+            <a:lvl4pPr marL="1371600" indent="0">
+              <a:buNone/>
+              <a:defRPr sz="2000"/>
+            </a:lvl4pPr>
+            <a:lvl5pPr marL="1828800" indent="0">
+              <a:buNone/>
+              <a:defRPr sz="2000"/>
+            </a:lvl5pPr>
+            <a:lvl6pPr marL="2286000" indent="0">
+              <a:buNone/>
+              <a:defRPr sz="2000"/>
+            </a:lvl6pPr>
+            <a:lvl7pPr marL="2743200" indent="0">
+              <a:buNone/>
+              <a:defRPr sz="2000"/>
+            </a:lvl7pPr>
+            <a:lvl8pPr marL="3200400" indent="0">
+              <a:buNone/>
+              <a:defRPr sz="2000"/>
+            </a:lvl8pPr>
+            <a:lvl9pPr marL="3657600" indent="0">
+              <a:buNone/>
+              <a:defRPr sz="2000"/>
+            </a:lvl9pPr>
+          </a:lstStyle>
+          <a:p>
+            <a:endParaRPr lang="en-US"/>
+          </a:p>
+        </p:txBody>
+      </p:sp>
+      <p:sp>
+        <p:nvSpPr>
+          <p:cNvPr id="4" name="Text Placeholder 3"/>
+          <p:cNvSpPr>
+            <a:spLocks noGrp="1"/>
+          </p:cNvSpPr>
+          <p:nvPr>
+            <p:ph type="body" sz="half" idx="2"/>
+          </p:nvPr>
+        </p:nvSpPr>
+        <p:spPr>
+          <a:xfrm>
+            <a:off x="1792288" y="5367338"/>
+            <a:ext cx="5486400" cy="804862"/>
+          </a:xfrm>
+        </p:spPr>
+        <p:txBody>
+          <a:bodyPr/>
+          <a:lstStyle>
+            <a:lvl1pPr marL="0" indent="0">
+              <a:buNone/>
+              <a:defRPr sz="1400"/>
+            </a:lvl1pPr>
+            <a:lvl2pPr marL="457200" indent="0">
+              <a:buNone/>
+              <a:defRPr sz="1200"/>
+            </a:lvl2pPr>
+            <a:lvl3pPr marL="914400" indent="0">
+              <a:buNone/>
+              <a:defRPr sz="1000"/>
+            </a:lvl3pPr>
+            <a:lvl4pPr marL="1371600" indent="0">
+              <a:buNone/>
+              <a:defRPr sz="900"/>
+            </a:lvl4pPr>
+            <a:lvl5pPr marL="1828800" indent="0">
+              <a:buNone/>
+              <a:defRPr sz="900"/>
+            </a:lvl5pPr>
+            <a:lvl6pPr marL="2286000" indent="0">
+              <a:buNone/>
+              <a:defRPr sz="900"/>
+            </a:lvl6pPr>
+            <a:lvl7pPr marL="2743200" indent="0">
+              <a:buNone/>
+              <a:defRPr sz="900"/>
+            </a:lvl7pPr>
+            <a:lvl8pPr marL="3200400" indent="0">
+              <a:buNone/>
+              <a:defRPr sz="900"/>
+            </a:lvl8pPr>
+            <a:lvl9pPr marL="3657600" indent="0">
+              <a:buNone/>
+              <a:defRPr sz="900"/>
+            </a:lvl9pPr>
+          </a:lstStyle>
+          <a:p>
+            <a:pPr lvl="0"/>
+            <a:r>
+              <a:rPr lang="en-US" smtClean="0"/>
+              <a:t>Click to edit Master text styles</a:t>
+            </a:r>
+          </a:p>
+        </p:txBody>
+      </p:sp>
+      <p:sp>
+        <p:nvSpPr>
+          <p:cNvPr id="5" name="Date Placeholder 4"/>
+          <p:cNvSpPr>
+            <a:spLocks noGrp="1"/>
+          </p:cNvSpPr>
+          <p:nvPr>
+            <p:ph type="dt" sz="half" idx="10"/>
+          </p:nvPr>
+        </p:nvSpPr>
+        <p:spPr/>
+        <p:txBody>
+          <a:bodyPr/>
+          <a:lstStyle/>
+          <a:p>
+            <a:fld id="{752084B5-01C9-41F8-9B3F-DBDC28D03793}" type="datetimeFigureOut">
+              <a:rPr lang="en-US">
+                <a:solidFill>
+                  <a:prstClr val="black">
+                    <a:tint val="75000"/>
+                  </a:prstClr>
+                </a:solidFill>
+              </a:rPr>
+              <a:pPr/>
+              <a:t>9/20/2013</a:t>
+            </a:fld>
+            <a:endParaRPr lang="en-US">
+              <a:solidFill>
+                <a:prstClr val="black">
+                  <a:tint val="75000"/>
+                </a:prstClr>
+              </a:solidFill>
+            </a:endParaRPr>
+          </a:p>
+        </p:txBody>
+      </p:sp>
+      <p:sp>
+        <p:nvSpPr>
+          <p:cNvPr id="6" name="Footer Placeholder 5"/>
+          <p:cNvSpPr>
+            <a:spLocks noGrp="1"/>
+          </p:cNvSpPr>
+          <p:nvPr>
+            <p:ph type="ftr" sz="quarter" idx="11"/>
+          </p:nvPr>
+        </p:nvSpPr>
+        <p:spPr/>
+        <p:txBody>
+          <a:bodyPr/>
+          <a:lstStyle/>
+          <a:p>
+            <a:endParaRPr lang="en-US">
+              <a:solidFill>
+                <a:prstClr val="black">
+                  <a:tint val="75000"/>
+                </a:prstClr>
+              </a:solidFill>
+            </a:endParaRPr>
+          </a:p>
+        </p:txBody>
+      </p:sp>
+      <p:sp>
+        <p:nvSpPr>
+          <p:cNvPr id="7" name="Slide Number Placeholder 6"/>
+          <p:cNvSpPr>
+            <a:spLocks noGrp="1"/>
+          </p:cNvSpPr>
+          <p:nvPr>
+            <p:ph type="sldNum" sz="quarter" idx="12"/>
+          </p:nvPr>
+        </p:nvSpPr>
+        <p:spPr/>
+        <p:txBody>
+          <a:bodyPr/>
+          <a:lstStyle/>
+          <a:p>
+            <a:fld id="{2C9314DB-5B33-4024-AF8F-A8692812E68A}" type="slidenum">
+              <a:rPr lang="en-US">
+                <a:solidFill>
+                  <a:prstClr val="black">
+                    <a:tint val="75000"/>
+                  </a:prstClr>
+                </a:solidFill>
+              </a:rPr>
+              <a:pPr/>
+              <a:t>‹#›</a:t>
+            </a:fld>
+            <a:endParaRPr lang="en-US">
+              <a:solidFill>
+                <a:prstClr val="black">
+                  <a:tint val="75000"/>
+                </a:prstClr>
+              </a:solidFill>
+            </a:endParaRPr>
+          </a:p>
+        </p:txBody>
+      </p:sp>
+    </p:spTree>
+    <p:extLst>
+      <p:ext uri="{BB962C8B-B14F-4D97-AF65-F5344CB8AC3E}">
+        <p14:creationId xmlns:p14="http://schemas.microsoft.com/office/powerpoint/2010/main" val="2380563591"/>
+      </p:ext>
+    </p:extLst>
+  </p:cSld>
+  <p:clrMapOvr>
+    <a:masterClrMapping/>
+  </p:clrMapOvr>
+</p:sldLayout>
+</file>
+
+<file path=ppt/slideLayouts/slideLayout21.xml><?xml version="1.0" encoding="utf-8"?>
+<p:sldLayout xmlns:a="http://schemas.openxmlformats.org/drawingml/2006/main" xmlns:r="http://schemas.openxmlformats.org/officeDocument/2006/relationships" xmlns:p="http://schemas.openxmlformats.org/presentationml/2006/main" type="vertTx" preserve="1">
+  <p:cSld name="Title and Vertical Text">
+    <p:spTree>
+      <p:nvGrpSpPr>
+        <p:cNvPr id="1" name=""/>
+        <p:cNvGrpSpPr/>
+        <p:nvPr/>
+      </p:nvGrpSpPr>
+      <p:grpSpPr>
+        <a:xfrm>
+          <a:off x="0" y="0"/>
+          <a:ext cx="0" cy="0"/>
+          <a:chOff x="0" y="0"/>
+          <a:chExt cx="0" cy="0"/>
+        </a:xfrm>
+      </p:grpSpPr>
+      <p:sp>
+        <p:nvSpPr>
+          <p:cNvPr id="2" name="Title 1"/>
+          <p:cNvSpPr>
+            <a:spLocks noGrp="1"/>
+          </p:cNvSpPr>
+          <p:nvPr>
+            <p:ph type="title"/>
+          </p:nvPr>
+        </p:nvSpPr>
+        <p:spPr/>
+        <p:txBody>
+          <a:bodyPr/>
+          <a:lstStyle/>
+          <a:p>
+            <a:r>
+              <a:rPr lang="en-US" smtClean="0"/>
+              <a:t>Click to edit Master title style</a:t>
+            </a:r>
+            <a:endParaRPr lang="en-US"/>
+          </a:p>
+        </p:txBody>
+      </p:sp>
+      <p:sp>
+        <p:nvSpPr>
+          <p:cNvPr id="3" name="Vertical Text Placeholder 2"/>
+          <p:cNvSpPr>
+            <a:spLocks noGrp="1"/>
+          </p:cNvSpPr>
+          <p:nvPr>
+            <p:ph type="body" orient="vert" idx="1"/>
+          </p:nvPr>
+        </p:nvSpPr>
+        <p:spPr/>
+        <p:txBody>
+          <a:bodyPr vert="eaVert"/>
+          <a:lstStyle/>
+          <a:p>
+            <a:pPr lvl="0"/>
+            <a:r>
+              <a:rPr lang="en-US" smtClean="0"/>
+              <a:t>Click to edit Master text styles</a:t>
+            </a:r>
+          </a:p>
+          <a:p>
+            <a:pPr lvl="1"/>
+            <a:r>
+              <a:rPr lang="en-US" smtClean="0"/>
+              <a:t>Second level</a:t>
+            </a:r>
+          </a:p>
+          <a:p>
+            <a:pPr lvl="2"/>
+            <a:r>
+              <a:rPr lang="en-US" smtClean="0"/>
+              <a:t>Third level</a:t>
+            </a:r>
+          </a:p>
+          <a:p>
+            <a:pPr lvl="3"/>
+            <a:r>
+              <a:rPr lang="en-US" smtClean="0"/>
+              <a:t>Fourth level</a:t>
+            </a:r>
+          </a:p>
+          <a:p>
+            <a:pPr lvl="4"/>
+            <a:r>
+              <a:rPr lang="en-US" smtClean="0"/>
+              <a:t>Fifth level</a:t>
+            </a:r>
+            <a:endParaRPr lang="en-US"/>
+          </a:p>
+        </p:txBody>
+      </p:sp>
+      <p:sp>
+        <p:nvSpPr>
+          <p:cNvPr id="4" name="Date Placeholder 3"/>
+          <p:cNvSpPr>
+            <a:spLocks noGrp="1"/>
+          </p:cNvSpPr>
+          <p:nvPr>
+            <p:ph type="dt" sz="half" idx="10"/>
+          </p:nvPr>
+        </p:nvSpPr>
+        <p:spPr/>
+        <p:txBody>
+          <a:bodyPr/>
+          <a:lstStyle/>
+          <a:p>
+            <a:fld id="{752084B5-01C9-41F8-9B3F-DBDC28D03793}" type="datetimeFigureOut">
+              <a:rPr lang="en-US">
+                <a:solidFill>
+                  <a:prstClr val="black">
+                    <a:tint val="75000"/>
+                  </a:prstClr>
+                </a:solidFill>
+              </a:rPr>
+              <a:pPr/>
+              <a:t>9/20/2013</a:t>
+            </a:fld>
+            <a:endParaRPr lang="en-US">
+              <a:solidFill>
+                <a:prstClr val="black">
+                  <a:tint val="75000"/>
+                </a:prstClr>
+              </a:solidFill>
+            </a:endParaRPr>
+          </a:p>
+        </p:txBody>
+      </p:sp>
+      <p:sp>
+        <p:nvSpPr>
+          <p:cNvPr id="5" name="Footer Placeholder 4"/>
+          <p:cNvSpPr>
+            <a:spLocks noGrp="1"/>
+          </p:cNvSpPr>
+          <p:nvPr>
+            <p:ph type="ftr" sz="quarter" idx="11"/>
+          </p:nvPr>
+        </p:nvSpPr>
+        <p:spPr/>
+        <p:txBody>
+          <a:bodyPr/>
+          <a:lstStyle/>
+          <a:p>
+            <a:endParaRPr lang="en-US">
+              <a:solidFill>
+                <a:prstClr val="black">
+                  <a:tint val="75000"/>
+                </a:prstClr>
+              </a:solidFill>
+            </a:endParaRPr>
+          </a:p>
+        </p:txBody>
+      </p:sp>
+      <p:sp>
+        <p:nvSpPr>
+          <p:cNvPr id="6" name="Slide Number Placeholder 5"/>
+          <p:cNvSpPr>
+            <a:spLocks noGrp="1"/>
+          </p:cNvSpPr>
+          <p:nvPr>
+            <p:ph type="sldNum" sz="quarter" idx="12"/>
+          </p:nvPr>
+        </p:nvSpPr>
+        <p:spPr/>
+        <p:txBody>
+          <a:bodyPr/>
+          <a:lstStyle/>
+          <a:p>
+            <a:fld id="{2C9314DB-5B33-4024-AF8F-A8692812E68A}" type="slidenum">
+              <a:rPr lang="en-US">
+                <a:solidFill>
+                  <a:prstClr val="black">
+                    <a:tint val="75000"/>
+                  </a:prstClr>
+                </a:solidFill>
+              </a:rPr>
+              <a:pPr/>
+              <a:t>‹#›</a:t>
+            </a:fld>
+            <a:endParaRPr lang="en-US">
+              <a:solidFill>
+                <a:prstClr val="black">
+                  <a:tint val="75000"/>
+                </a:prstClr>
+              </a:solidFill>
+            </a:endParaRPr>
+          </a:p>
+        </p:txBody>
+      </p:sp>
+    </p:spTree>
+    <p:extLst>
+      <p:ext uri="{BB962C8B-B14F-4D97-AF65-F5344CB8AC3E}">
+        <p14:creationId xmlns:p14="http://schemas.microsoft.com/office/powerpoint/2010/main" val="2456777775"/>
+      </p:ext>
+    </p:extLst>
+  </p:cSld>
+  <p:clrMapOvr>
+    <a:masterClrMapping/>
+  </p:clrMapOvr>
+</p:sldLayout>
+</file>
+
+<file path=ppt/slideLayouts/slideLayout22.xml><?xml version="1.0" encoding="utf-8"?>
+<p:sldLayout xmlns:a="http://schemas.openxmlformats.org/drawingml/2006/main" xmlns:r="http://schemas.openxmlformats.org/officeDocument/2006/relationships" xmlns:p="http://schemas.openxmlformats.org/presentationml/2006/main" type="vertTitleAndTx" preserve="1">
+  <p:cSld name="Vertical Title and Text">
+    <p:spTree>
+      <p:nvGrpSpPr>
+        <p:cNvPr id="1" name=""/>
+        <p:cNvGrpSpPr/>
+        <p:nvPr/>
+      </p:nvGrpSpPr>
+      <p:grpSpPr>
+        <a:xfrm>
+          <a:off x="0" y="0"/>
+          <a:ext cx="0" cy="0"/>
+          <a:chOff x="0" y="0"/>
+          <a:chExt cx="0" cy="0"/>
+        </a:xfrm>
+      </p:grpSpPr>
+      <p:sp>
+        <p:nvSpPr>
+          <p:cNvPr id="2" name="Vertical Title 1"/>
+          <p:cNvSpPr>
+            <a:spLocks noGrp="1"/>
+          </p:cNvSpPr>
+          <p:nvPr>
+            <p:ph type="title" orient="vert"/>
+          </p:nvPr>
+        </p:nvSpPr>
+        <p:spPr>
+          <a:xfrm>
+            <a:off x="6629400" y="274638"/>
+            <a:ext cx="2057400" cy="5851525"/>
+          </a:xfrm>
+        </p:spPr>
+        <p:txBody>
+          <a:bodyPr vert="eaVert"/>
+          <a:lstStyle/>
+          <a:p>
+            <a:r>
+              <a:rPr lang="en-US" smtClean="0"/>
+              <a:t>Click to edit Master title style</a:t>
+            </a:r>
+            <a:endParaRPr lang="en-US"/>
+          </a:p>
+        </p:txBody>
+      </p:sp>
+      <p:sp>
+        <p:nvSpPr>
+          <p:cNvPr id="3" name="Vertical Text Placeholder 2"/>
+          <p:cNvSpPr>
+            <a:spLocks noGrp="1"/>
+          </p:cNvSpPr>
+          <p:nvPr>
+            <p:ph type="body" orient="vert" idx="1"/>
+          </p:nvPr>
+        </p:nvSpPr>
+        <p:spPr>
+          <a:xfrm>
+            <a:off x="457200" y="274638"/>
+            <a:ext cx="6019800" cy="5851525"/>
+          </a:xfrm>
+        </p:spPr>
+        <p:txBody>
+          <a:bodyPr vert="eaVert"/>
+          <a:lstStyle/>
+          <a:p>
+            <a:pPr lvl="0"/>
+            <a:r>
+              <a:rPr lang="en-US" smtClean="0"/>
+              <a:t>Click to edit Master text styles</a:t>
+            </a:r>
+          </a:p>
+          <a:p>
+            <a:pPr lvl="1"/>
+            <a:r>
+              <a:rPr lang="en-US" smtClean="0"/>
+              <a:t>Second level</a:t>
+            </a:r>
+          </a:p>
+          <a:p>
+            <a:pPr lvl="2"/>
+            <a:r>
+              <a:rPr lang="en-US" smtClean="0"/>
+              <a:t>Third level</a:t>
+            </a:r>
+          </a:p>
+          <a:p>
+            <a:pPr lvl="3"/>
+            <a:r>
+              <a:rPr lang="en-US" smtClean="0"/>
+              <a:t>Fourth level</a:t>
+            </a:r>
+          </a:p>
+          <a:p>
+            <a:pPr lvl="4"/>
+            <a:r>
+              <a:rPr lang="en-US" smtClean="0"/>
+              <a:t>Fifth level</a:t>
+            </a:r>
+            <a:endParaRPr lang="en-US"/>
+          </a:p>
+        </p:txBody>
+      </p:sp>
+      <p:sp>
+        <p:nvSpPr>
+          <p:cNvPr id="4" name="Date Placeholder 3"/>
+          <p:cNvSpPr>
+            <a:spLocks noGrp="1"/>
+          </p:cNvSpPr>
+          <p:nvPr>
+            <p:ph type="dt" sz="half" idx="10"/>
+          </p:nvPr>
+        </p:nvSpPr>
+        <p:spPr/>
+        <p:txBody>
+          <a:bodyPr/>
+          <a:lstStyle/>
+          <a:p>
+            <a:fld id="{752084B5-01C9-41F8-9B3F-DBDC28D03793}" type="datetimeFigureOut">
+              <a:rPr lang="en-US">
+                <a:solidFill>
+                  <a:prstClr val="black">
+                    <a:tint val="75000"/>
+                  </a:prstClr>
+                </a:solidFill>
+              </a:rPr>
+              <a:pPr/>
+              <a:t>9/20/2013</a:t>
+            </a:fld>
+            <a:endParaRPr lang="en-US">
+              <a:solidFill>
+                <a:prstClr val="black">
+                  <a:tint val="75000"/>
+                </a:prstClr>
+              </a:solidFill>
+            </a:endParaRPr>
+          </a:p>
+        </p:txBody>
+      </p:sp>
+      <p:sp>
+        <p:nvSpPr>
+          <p:cNvPr id="5" name="Footer Placeholder 4"/>
+          <p:cNvSpPr>
+            <a:spLocks noGrp="1"/>
+          </p:cNvSpPr>
+          <p:nvPr>
+            <p:ph type="ftr" sz="quarter" idx="11"/>
+          </p:nvPr>
+        </p:nvSpPr>
+        <p:spPr/>
+        <p:txBody>
+          <a:bodyPr/>
+          <a:lstStyle/>
+          <a:p>
+            <a:endParaRPr lang="en-US">
+              <a:solidFill>
+                <a:prstClr val="black">
+                  <a:tint val="75000"/>
+                </a:prstClr>
+              </a:solidFill>
+            </a:endParaRPr>
+          </a:p>
+        </p:txBody>
+      </p:sp>
+      <p:sp>
+        <p:nvSpPr>
+          <p:cNvPr id="6" name="Slide Number Placeholder 5"/>
+          <p:cNvSpPr>
+            <a:spLocks noGrp="1"/>
+          </p:cNvSpPr>
+          <p:nvPr>
+            <p:ph type="sldNum" sz="quarter" idx="12"/>
+          </p:nvPr>
+        </p:nvSpPr>
+        <p:spPr/>
+        <p:txBody>
+          <a:bodyPr/>
+          <a:lstStyle/>
+          <a:p>
+            <a:fld id="{2C9314DB-5B33-4024-AF8F-A8692812E68A}" type="slidenum">
+              <a:rPr lang="en-US">
+                <a:solidFill>
+                  <a:prstClr val="black">
+                    <a:tint val="75000"/>
+                  </a:prstClr>
+                </a:solidFill>
+              </a:rPr>
+              <a:pPr/>
+              <a:t>‹#›</a:t>
+            </a:fld>
+            <a:endParaRPr lang="en-US">
+              <a:solidFill>
+                <a:prstClr val="black">
+                  <a:tint val="75000"/>
+                </a:prstClr>
+              </a:solidFill>
+            </a:endParaRPr>
+          </a:p>
+        </p:txBody>
+      </p:sp>
+    </p:spTree>
+    <p:extLst>
+      <p:ext uri="{BB962C8B-B14F-4D97-AF65-F5344CB8AC3E}">
+        <p14:creationId xmlns:p14="http://schemas.microsoft.com/office/powerpoint/2010/main" val="2458657309"/>
       </p:ext>
     </p:extLst>
   </p:cSld>
@@ -1054,7 +3869,7 @@
           <a:p>
             <a:fld id="{5EBFDE7A-2F88-4186-BBAC-CFFB1713D382}" type="datetimeFigureOut">
               <a:rPr lang="en-US" smtClean="0"/>
-              <a:t>7/11/2013</a:t>
+              <a:t>9/20/2013</a:t>
             </a:fld>
             <a:endParaRPr lang="en-US"/>
           </a:p>
@@ -1342,7 +4157,7 @@
           <a:p>
             <a:fld id="{5EBFDE7A-2F88-4186-BBAC-CFFB1713D382}" type="datetimeFigureOut">
               <a:rPr lang="en-US" smtClean="0"/>
-              <a:t>7/11/2013</a:t>
+              <a:t>9/20/2013</a:t>
             </a:fld>
             <a:endParaRPr lang="en-US"/>
           </a:p>
@@ -1764,7 +4579,7 @@
           <a:p>
             <a:fld id="{5EBFDE7A-2F88-4186-BBAC-CFFB1713D382}" type="datetimeFigureOut">
               <a:rPr lang="en-US" smtClean="0"/>
-              <a:t>7/11/2013</a:t>
+              <a:t>9/20/2013</a:t>
             </a:fld>
             <a:endParaRPr lang="en-US"/>
           </a:p>
@@ -1882,7 +4697,7 @@
           <a:p>
             <a:fld id="{5EBFDE7A-2F88-4186-BBAC-CFFB1713D382}" type="datetimeFigureOut">
               <a:rPr lang="en-US" smtClean="0"/>
-              <a:t>7/11/2013</a:t>
+              <a:t>9/20/2013</a:t>
             </a:fld>
             <a:endParaRPr lang="en-US"/>
           </a:p>
@@ -1977,7 +4792,7 @@
           <a:p>
             <a:fld id="{5EBFDE7A-2F88-4186-BBAC-CFFB1713D382}" type="datetimeFigureOut">
               <a:rPr lang="en-US" smtClean="0"/>
-              <a:t>7/11/2013</a:t>
+              <a:t>9/20/2013</a:t>
             </a:fld>
             <a:endParaRPr lang="en-US"/>
           </a:p>
@@ -2254,7 +5069,7 @@
           <a:p>
             <a:fld id="{5EBFDE7A-2F88-4186-BBAC-CFFB1713D382}" type="datetimeFigureOut">
               <a:rPr lang="en-US" smtClean="0"/>
-              <a:t>7/11/2013</a:t>
+              <a:t>9/20/2013</a:t>
             </a:fld>
             <a:endParaRPr lang="en-US"/>
           </a:p>
@@ -2507,7 +5322,7 @@
           <a:p>
             <a:fld id="{5EBFDE7A-2F88-4186-BBAC-CFFB1713D382}" type="datetimeFigureOut">
               <a:rPr lang="en-US" smtClean="0"/>
-              <a:t>7/11/2013</a:t>
+              <a:t>9/20/2013</a:t>
             </a:fld>
             <a:endParaRPr lang="en-US"/>
           </a:p>
@@ -2720,7 +5535,7 @@
           <a:p>
             <a:fld id="{5EBFDE7A-2F88-4186-BBAC-CFFB1713D382}" type="datetimeFigureOut">
               <a:rPr lang="en-US" smtClean="0"/>
-              <a:t>7/11/2013</a:t>
+              <a:t>9/20/2013</a:t>
             </a:fld>
             <a:endParaRPr lang="en-US"/>
           </a:p>
@@ -3078,6 +5893,548 @@
 </p:sldMaster>
 </file>
 
+<file path=ppt/slideMasters/slideMaster2.xml><?xml version="1.0" encoding="utf-8"?>
+<p:sldMaster xmlns:a="http://schemas.openxmlformats.org/drawingml/2006/main" xmlns:r="http://schemas.openxmlformats.org/officeDocument/2006/relationships" xmlns:p="http://schemas.openxmlformats.org/presentationml/2006/main">
+  <p:cSld>
+    <p:bg>
+      <p:bgRef idx="1001">
+        <a:schemeClr val="bg1"/>
+      </p:bgRef>
+    </p:bg>
+    <p:spTree>
+      <p:nvGrpSpPr>
+        <p:cNvPr id="1" name=""/>
+        <p:cNvGrpSpPr/>
+        <p:nvPr/>
+      </p:nvGrpSpPr>
+      <p:grpSpPr>
+        <a:xfrm>
+          <a:off x="0" y="0"/>
+          <a:ext cx="0" cy="0"/>
+          <a:chOff x="0" y="0"/>
+          <a:chExt cx="0" cy="0"/>
+        </a:xfrm>
+      </p:grpSpPr>
+      <p:sp>
+        <p:nvSpPr>
+          <p:cNvPr id="2" name="Title Placeholder 1"/>
+          <p:cNvSpPr>
+            <a:spLocks noGrp="1"/>
+          </p:cNvSpPr>
+          <p:nvPr>
+            <p:ph type="title"/>
+          </p:nvPr>
+        </p:nvSpPr>
+        <p:spPr>
+          <a:xfrm>
+            <a:off x="457200" y="274638"/>
+            <a:ext cx="8229600" cy="1143000"/>
+          </a:xfrm>
+          <a:prstGeom prst="rect">
+            <a:avLst/>
+          </a:prstGeom>
+        </p:spPr>
+        <p:txBody>
+          <a:bodyPr vert="horz" lIns="91440" tIns="45720" rIns="91440" bIns="45720" rtlCol="0" anchor="ctr">
+            <a:normAutofit/>
+          </a:bodyPr>
+          <a:lstStyle/>
+          <a:p>
+            <a:r>
+              <a:rPr lang="en-US" smtClean="0"/>
+              <a:t>Click to edit Master title style</a:t>
+            </a:r>
+            <a:endParaRPr lang="en-US"/>
+          </a:p>
+        </p:txBody>
+      </p:sp>
+      <p:sp>
+        <p:nvSpPr>
+          <p:cNvPr id="3" name="Text Placeholder 2"/>
+          <p:cNvSpPr>
+            <a:spLocks noGrp="1"/>
+          </p:cNvSpPr>
+          <p:nvPr>
+            <p:ph type="body" idx="1"/>
+          </p:nvPr>
+        </p:nvSpPr>
+        <p:spPr>
+          <a:xfrm>
+            <a:off x="457200" y="1600200"/>
+            <a:ext cx="8229600" cy="4525963"/>
+          </a:xfrm>
+          <a:prstGeom prst="rect">
+            <a:avLst/>
+          </a:prstGeom>
+        </p:spPr>
+        <p:txBody>
+          <a:bodyPr vert="horz" lIns="91440" tIns="45720" rIns="91440" bIns="45720" rtlCol="0">
+            <a:normAutofit/>
+          </a:bodyPr>
+          <a:lstStyle/>
+          <a:p>
+            <a:pPr lvl="0"/>
+            <a:r>
+              <a:rPr lang="en-US" smtClean="0"/>
+              <a:t>Click to edit Master text styles</a:t>
+            </a:r>
+          </a:p>
+          <a:p>
+            <a:pPr lvl="1"/>
+            <a:r>
+              <a:rPr lang="en-US" smtClean="0"/>
+              <a:t>Second level</a:t>
+            </a:r>
+          </a:p>
+          <a:p>
+            <a:pPr lvl="2"/>
+            <a:r>
+              <a:rPr lang="en-US" smtClean="0"/>
+              <a:t>Third level</a:t>
+            </a:r>
+          </a:p>
+          <a:p>
+            <a:pPr lvl="3"/>
+            <a:r>
+              <a:rPr lang="en-US" smtClean="0"/>
+              <a:t>Fourth level</a:t>
+            </a:r>
+          </a:p>
+          <a:p>
+            <a:pPr lvl="4"/>
+            <a:r>
+              <a:rPr lang="en-US" smtClean="0"/>
+              <a:t>Fifth level</a:t>
+            </a:r>
+            <a:endParaRPr lang="en-US"/>
+          </a:p>
+        </p:txBody>
+      </p:sp>
+      <p:sp>
+        <p:nvSpPr>
+          <p:cNvPr id="4" name="Date Placeholder 3"/>
+          <p:cNvSpPr>
+            <a:spLocks noGrp="1"/>
+          </p:cNvSpPr>
+          <p:nvPr>
+            <p:ph type="dt" sz="half" idx="2"/>
+          </p:nvPr>
+        </p:nvSpPr>
+        <p:spPr>
+          <a:xfrm>
+            <a:off x="457200" y="6356350"/>
+            <a:ext cx="2133600" cy="365125"/>
+          </a:xfrm>
+          <a:prstGeom prst="rect">
+            <a:avLst/>
+          </a:prstGeom>
+        </p:spPr>
+        <p:txBody>
+          <a:bodyPr vert="horz" lIns="91440" tIns="45720" rIns="91440" bIns="45720" rtlCol="0" anchor="ctr"/>
+          <a:lstStyle>
+            <a:lvl1pPr algn="l">
+              <a:defRPr sz="1200">
+                <a:solidFill>
+                  <a:schemeClr val="tx1">
+                    <a:tint val="75000"/>
+                  </a:schemeClr>
+                </a:solidFill>
+              </a:defRPr>
+            </a:lvl1pPr>
+          </a:lstStyle>
+          <a:p>
+            <a:fld id="{752084B5-01C9-41F8-9B3F-DBDC28D03793}" type="datetimeFigureOut">
+              <a:rPr lang="en-US" smtClean="0">
+                <a:solidFill>
+                  <a:prstClr val="black">
+                    <a:tint val="75000"/>
+                  </a:prstClr>
+                </a:solidFill>
+              </a:rPr>
+              <a:pPr/>
+              <a:t>9/20/2013</a:t>
+            </a:fld>
+            <a:endParaRPr lang="en-US" smtClean="0">
+              <a:solidFill>
+                <a:prstClr val="black">
+                  <a:tint val="75000"/>
+                </a:prstClr>
+              </a:solidFill>
+            </a:endParaRPr>
+          </a:p>
+        </p:txBody>
+      </p:sp>
+      <p:sp>
+        <p:nvSpPr>
+          <p:cNvPr id="5" name="Footer Placeholder 4"/>
+          <p:cNvSpPr>
+            <a:spLocks noGrp="1"/>
+          </p:cNvSpPr>
+          <p:nvPr>
+            <p:ph type="ftr" sz="quarter" idx="3"/>
+          </p:nvPr>
+        </p:nvSpPr>
+        <p:spPr>
+          <a:xfrm>
+            <a:off x="3124200" y="6356350"/>
+            <a:ext cx="2895600" cy="365125"/>
+          </a:xfrm>
+          <a:prstGeom prst="rect">
+            <a:avLst/>
+          </a:prstGeom>
+        </p:spPr>
+        <p:txBody>
+          <a:bodyPr vert="horz" lIns="91440" tIns="45720" rIns="91440" bIns="45720" rtlCol="0" anchor="ctr"/>
+          <a:lstStyle>
+            <a:lvl1pPr algn="ctr">
+              <a:defRPr sz="1200">
+                <a:solidFill>
+                  <a:schemeClr val="tx1">
+                    <a:tint val="75000"/>
+                  </a:schemeClr>
+                </a:solidFill>
+              </a:defRPr>
+            </a:lvl1pPr>
+          </a:lstStyle>
+          <a:p>
+            <a:endParaRPr lang="en-US" smtClean="0">
+              <a:solidFill>
+                <a:prstClr val="black">
+                  <a:tint val="75000"/>
+                </a:prstClr>
+              </a:solidFill>
+            </a:endParaRPr>
+          </a:p>
+        </p:txBody>
+      </p:sp>
+      <p:sp>
+        <p:nvSpPr>
+          <p:cNvPr id="6" name="Slide Number Placeholder 5"/>
+          <p:cNvSpPr>
+            <a:spLocks noGrp="1"/>
+          </p:cNvSpPr>
+          <p:nvPr>
+            <p:ph type="sldNum" sz="quarter" idx="4"/>
+          </p:nvPr>
+        </p:nvSpPr>
+        <p:spPr>
+          <a:xfrm>
+            <a:off x="6553200" y="6356350"/>
+            <a:ext cx="2133600" cy="365125"/>
+          </a:xfrm>
+          <a:prstGeom prst="rect">
+            <a:avLst/>
+          </a:prstGeom>
+        </p:spPr>
+        <p:txBody>
+          <a:bodyPr vert="horz" lIns="91440" tIns="45720" rIns="91440" bIns="45720" rtlCol="0" anchor="ctr"/>
+          <a:lstStyle>
+            <a:lvl1pPr algn="r">
+              <a:defRPr sz="1200">
+                <a:solidFill>
+                  <a:schemeClr val="tx1">
+                    <a:tint val="75000"/>
+                  </a:schemeClr>
+                </a:solidFill>
+              </a:defRPr>
+            </a:lvl1pPr>
+          </a:lstStyle>
+          <a:p>
+            <a:fld id="{2C9314DB-5B33-4024-AF8F-A8692812E68A}" type="slidenum">
+              <a:rPr lang="en-US" smtClean="0">
+                <a:solidFill>
+                  <a:prstClr val="black">
+                    <a:tint val="75000"/>
+                  </a:prstClr>
+                </a:solidFill>
+              </a:rPr>
+              <a:pPr/>
+              <a:t>‹#›</a:t>
+            </a:fld>
+            <a:endParaRPr lang="en-US" smtClean="0">
+              <a:solidFill>
+                <a:prstClr val="black">
+                  <a:tint val="75000"/>
+                </a:prstClr>
+              </a:solidFill>
+            </a:endParaRPr>
+          </a:p>
+        </p:txBody>
+      </p:sp>
+    </p:spTree>
+    <p:extLst>
+      <p:ext uri="{BB962C8B-B14F-4D97-AF65-F5344CB8AC3E}">
+        <p14:creationId xmlns:p14="http://schemas.microsoft.com/office/powerpoint/2010/main" val="4023827504"/>
+      </p:ext>
+    </p:extLst>
+  </p:cSld>
+  <p:clrMap bg1="lt1" tx1="dk1" bg2="lt2" tx2="dk2" accent1="accent1" accent2="accent2" accent3="accent3" accent4="accent4" accent5="accent5" accent6="accent6" hlink="hlink" folHlink="folHlink"/>
+  <p:sldLayoutIdLst>
+    <p:sldLayoutId id="2147483661" r:id="rId1"/>
+    <p:sldLayoutId id="2147483662" r:id="rId2"/>
+    <p:sldLayoutId id="2147483663" r:id="rId3"/>
+    <p:sldLayoutId id="2147483664" r:id="rId4"/>
+    <p:sldLayoutId id="2147483665" r:id="rId5"/>
+    <p:sldLayoutId id="2147483666" r:id="rId6"/>
+    <p:sldLayoutId id="2147483667" r:id="rId7"/>
+    <p:sldLayoutId id="2147483668" r:id="rId8"/>
+    <p:sldLayoutId id="2147483669" r:id="rId9"/>
+    <p:sldLayoutId id="2147483670" r:id="rId10"/>
+    <p:sldLayoutId id="2147483671" r:id="rId11"/>
+  </p:sldLayoutIdLst>
+  <p:txStyles>
+    <p:titleStyle>
+      <a:lvl1pPr algn="ctr" defTabSz="914400" rtl="0" eaLnBrk="1" latinLnBrk="0" hangingPunct="1">
+        <a:spcBef>
+          <a:spcPct val="0"/>
+        </a:spcBef>
+        <a:buNone/>
+        <a:defRPr sz="4400" kern="1200">
+          <a:solidFill>
+            <a:schemeClr val="tx1"/>
+          </a:solidFill>
+          <a:latin typeface="+mj-lt"/>
+          <a:ea typeface="+mj-ea"/>
+          <a:cs typeface="+mj-cs"/>
+        </a:defRPr>
+      </a:lvl1pPr>
+    </p:titleStyle>
+    <p:bodyStyle>
+      <a:lvl1pPr marL="342900" indent="-342900" algn="l" defTabSz="914400" rtl="0" eaLnBrk="1" latinLnBrk="0" hangingPunct="1">
+        <a:spcBef>
+          <a:spcPct val="20000"/>
+        </a:spcBef>
+        <a:buFont typeface="Arial" panose="020B0604020202020204" pitchFamily="34" charset="0"/>
+        <a:buChar char="•"/>
+        <a:defRPr sz="3200" kern="1200">
+          <a:solidFill>
+            <a:schemeClr val="tx1"/>
+          </a:solidFill>
+          <a:latin typeface="+mn-lt"/>
+          <a:ea typeface="+mn-ea"/>
+          <a:cs typeface="+mn-cs"/>
+        </a:defRPr>
+      </a:lvl1pPr>
+      <a:lvl2pPr marL="742950" indent="-285750" algn="l" defTabSz="914400" rtl="0" eaLnBrk="1" latinLnBrk="0" hangingPunct="1">
+        <a:spcBef>
+          <a:spcPct val="20000"/>
+        </a:spcBef>
+        <a:buFont typeface="Arial" panose="020B0604020202020204" pitchFamily="34" charset="0"/>
+        <a:buChar char="–"/>
+        <a:defRPr sz="2800" kern="1200">
+          <a:solidFill>
+            <a:schemeClr val="tx1"/>
+          </a:solidFill>
+          <a:latin typeface="+mn-lt"/>
+          <a:ea typeface="+mn-ea"/>
+          <a:cs typeface="+mn-cs"/>
+        </a:defRPr>
+      </a:lvl2pPr>
+      <a:lvl3pPr marL="1143000" indent="-228600" algn="l" defTabSz="914400" rtl="0" eaLnBrk="1" latinLnBrk="0" hangingPunct="1">
+        <a:spcBef>
+          <a:spcPct val="20000"/>
+        </a:spcBef>
+        <a:buFont typeface="Arial" panose="020B0604020202020204" pitchFamily="34" charset="0"/>
+        <a:buChar char="•"/>
+        <a:defRPr sz="2400" kern="1200">
+          <a:solidFill>
+            <a:schemeClr val="tx1"/>
+          </a:solidFill>
+          <a:latin typeface="+mn-lt"/>
+          <a:ea typeface="+mn-ea"/>
+          <a:cs typeface="+mn-cs"/>
+        </a:defRPr>
+      </a:lvl3pPr>
+      <a:lvl4pPr marL="1600200" indent="-228600" algn="l" defTabSz="914400" rtl="0" eaLnBrk="1" latinLnBrk="0" hangingPunct="1">
+        <a:spcBef>
+          <a:spcPct val="20000"/>
+        </a:spcBef>
+        <a:buFont typeface="Arial" panose="020B0604020202020204" pitchFamily="34" charset="0"/>
+        <a:buChar char="–"/>
+        <a:defRPr sz="2000" kern="1200">
+          <a:solidFill>
+            <a:schemeClr val="tx1"/>
+          </a:solidFill>
+          <a:latin typeface="+mn-lt"/>
+          <a:ea typeface="+mn-ea"/>
+          <a:cs typeface="+mn-cs"/>
+        </a:defRPr>
+      </a:lvl4pPr>
+      <a:lvl5pPr marL="2057400" indent="-228600" algn="l" defTabSz="914400" rtl="0" eaLnBrk="1" latinLnBrk="0" hangingPunct="1">
+        <a:spcBef>
+          <a:spcPct val="20000"/>
+        </a:spcBef>
+        <a:buFont typeface="Arial" panose="020B0604020202020204" pitchFamily="34" charset="0"/>
+        <a:buChar char="»"/>
+        <a:defRPr sz="2000" kern="1200">
+          <a:solidFill>
+            <a:schemeClr val="tx1"/>
+          </a:solidFill>
+          <a:latin typeface="+mn-lt"/>
+          <a:ea typeface="+mn-ea"/>
+          <a:cs typeface="+mn-cs"/>
+        </a:defRPr>
+      </a:lvl5pPr>
+      <a:lvl6pPr marL="2514600" indent="-228600" algn="l" defTabSz="914400" rtl="0" eaLnBrk="1" latinLnBrk="0" hangingPunct="1">
+        <a:spcBef>
+          <a:spcPct val="20000"/>
+        </a:spcBef>
+        <a:buFont typeface="Arial" panose="020B0604020202020204" pitchFamily="34" charset="0"/>
+        <a:buChar char="•"/>
+        <a:defRPr sz="2000" kern="1200">
+          <a:solidFill>
+            <a:schemeClr val="tx1"/>
+          </a:solidFill>
+          <a:latin typeface="+mn-lt"/>
+          <a:ea typeface="+mn-ea"/>
+          <a:cs typeface="+mn-cs"/>
+        </a:defRPr>
+      </a:lvl6pPr>
+      <a:lvl7pPr marL="2971800" indent="-228600" algn="l" defTabSz="914400" rtl="0" eaLnBrk="1" latinLnBrk="0" hangingPunct="1">
+        <a:spcBef>
+          <a:spcPct val="20000"/>
+        </a:spcBef>
+        <a:buFont typeface="Arial" panose="020B0604020202020204" pitchFamily="34" charset="0"/>
+        <a:buChar char="•"/>
+        <a:defRPr sz="2000" kern="1200">
+          <a:solidFill>
+            <a:schemeClr val="tx1"/>
+          </a:solidFill>
+          <a:latin typeface="+mn-lt"/>
+          <a:ea typeface="+mn-ea"/>
+          <a:cs typeface="+mn-cs"/>
+        </a:defRPr>
+      </a:lvl7pPr>
+      <a:lvl8pPr marL="3429000" indent="-228600" algn="l" defTabSz="914400" rtl="0" eaLnBrk="1" latinLnBrk="0" hangingPunct="1">
+        <a:spcBef>
+          <a:spcPct val="20000"/>
+        </a:spcBef>
+        <a:buFont typeface="Arial" panose="020B0604020202020204" pitchFamily="34" charset="0"/>
+        <a:buChar char="•"/>
+        <a:defRPr sz="2000" kern="1200">
+          <a:solidFill>
+            <a:schemeClr val="tx1"/>
+          </a:solidFill>
+          <a:latin typeface="+mn-lt"/>
+          <a:ea typeface="+mn-ea"/>
+          <a:cs typeface="+mn-cs"/>
+        </a:defRPr>
+      </a:lvl8pPr>
+      <a:lvl9pPr marL="3886200" indent="-228600" algn="l" defTabSz="914400" rtl="0" eaLnBrk="1" latinLnBrk="0" hangingPunct="1">
+        <a:spcBef>
+          <a:spcPct val="20000"/>
+        </a:spcBef>
+        <a:buFont typeface="Arial" panose="020B0604020202020204" pitchFamily="34" charset="0"/>
+        <a:buChar char="•"/>
+        <a:defRPr sz="2000" kern="1200">
+          <a:solidFill>
+            <a:schemeClr val="tx1"/>
+          </a:solidFill>
+          <a:latin typeface="+mn-lt"/>
+          <a:ea typeface="+mn-ea"/>
+          <a:cs typeface="+mn-cs"/>
+        </a:defRPr>
+      </a:lvl9pPr>
+    </p:bodyStyle>
+    <p:otherStyle>
+      <a:defPPr>
+        <a:defRPr lang="en-US"/>
+      </a:defPPr>
+      <a:lvl1pPr marL="0" algn="l" defTabSz="914400" rtl="0" eaLnBrk="1" latinLnBrk="0" hangingPunct="1">
+        <a:defRPr sz="1800" kern="1200">
+          <a:solidFill>
+            <a:schemeClr val="tx1"/>
+          </a:solidFill>
+          <a:latin typeface="+mn-lt"/>
+          <a:ea typeface="+mn-ea"/>
+          <a:cs typeface="+mn-cs"/>
+        </a:defRPr>
+      </a:lvl1pPr>
+      <a:lvl2pPr marL="457200" algn="l" defTabSz="914400" rtl="0" eaLnBrk="1" latinLnBrk="0" hangingPunct="1">
+        <a:defRPr sz="1800" kern="1200">
+          <a:solidFill>
+            <a:schemeClr val="tx1"/>
+          </a:solidFill>
+          <a:latin typeface="+mn-lt"/>
+          <a:ea typeface="+mn-ea"/>
+          <a:cs typeface="+mn-cs"/>
+        </a:defRPr>
+      </a:lvl2pPr>
+      <a:lvl3pPr marL="914400" algn="l" defTabSz="914400" rtl="0" eaLnBrk="1" latinLnBrk="0" hangingPunct="1">
+        <a:defRPr sz="1800" kern="1200">
+          <a:solidFill>
+            <a:schemeClr val="tx1"/>
+          </a:solidFill>
+          <a:latin typeface="+mn-lt"/>
+          <a:ea typeface="+mn-ea"/>
+          <a:cs typeface="+mn-cs"/>
+        </a:defRPr>
+      </a:lvl3pPr>
+      <a:lvl4pPr marL="1371600" algn="l" defTabSz="914400" rtl="0" eaLnBrk="1" latinLnBrk="0" hangingPunct="1">
+        <a:defRPr sz="1800" kern="1200">
+          <a:solidFill>
+            <a:schemeClr val="tx1"/>
+          </a:solidFill>
+          <a:latin typeface="+mn-lt"/>
+          <a:ea typeface="+mn-ea"/>
+          <a:cs typeface="+mn-cs"/>
+        </a:defRPr>
+      </a:lvl4pPr>
+      <a:lvl5pPr marL="1828800" algn="l" defTabSz="914400" rtl="0" eaLnBrk="1" latinLnBrk="0" hangingPunct="1">
+        <a:defRPr sz="1800" kern="1200">
+          <a:solidFill>
+            <a:schemeClr val="tx1"/>
+          </a:solidFill>
+          <a:latin typeface="+mn-lt"/>
+          <a:ea typeface="+mn-ea"/>
+          <a:cs typeface="+mn-cs"/>
+        </a:defRPr>
+      </a:lvl5pPr>
+      <a:lvl6pPr marL="2286000" algn="l" defTabSz="914400" rtl="0" eaLnBrk="1" latinLnBrk="0" hangingPunct="1">
+        <a:defRPr sz="1800" kern="1200">
+          <a:solidFill>
+            <a:schemeClr val="tx1"/>
+          </a:solidFill>
+          <a:latin typeface="+mn-lt"/>
+          <a:ea typeface="+mn-ea"/>
+          <a:cs typeface="+mn-cs"/>
+        </a:defRPr>
+      </a:lvl6pPr>
+      <a:lvl7pPr marL="2743200" algn="l" defTabSz="914400" rtl="0" eaLnBrk="1" latinLnBrk="0" hangingPunct="1">
+        <a:defRPr sz="1800" kern="1200">
+          <a:solidFill>
+            <a:schemeClr val="tx1"/>
+          </a:solidFill>
+          <a:latin typeface="+mn-lt"/>
+          <a:ea typeface="+mn-ea"/>
+          <a:cs typeface="+mn-cs"/>
+        </a:defRPr>
+      </a:lvl7pPr>
+      <a:lvl8pPr marL="3200400" algn="l" defTabSz="914400" rtl="0" eaLnBrk="1" latinLnBrk="0" hangingPunct="1">
+        <a:defRPr sz="1800" kern="1200">
+          <a:solidFill>
+            <a:schemeClr val="tx1"/>
+          </a:solidFill>
+          <a:latin typeface="+mn-lt"/>
+          <a:ea typeface="+mn-ea"/>
+          <a:cs typeface="+mn-cs"/>
+        </a:defRPr>
+      </a:lvl8pPr>
+      <a:lvl9pPr marL="3657600" algn="l" defTabSz="914400" rtl="0" eaLnBrk="1" latinLnBrk="0" hangingPunct="1">
+        <a:defRPr sz="1800" kern="1200">
+          <a:solidFill>
+            <a:schemeClr val="tx1"/>
+          </a:solidFill>
+          <a:latin typeface="+mn-lt"/>
+          <a:ea typeface="+mn-ea"/>
+          <a:cs typeface="+mn-cs"/>
+        </a:defRPr>
+      </a:lvl9pPr>
+    </p:otherStyle>
+  </p:txStyles>
+</p:sldMaster>
+</file>
+
 <file path=ppt/slides/slide1.xml><?xml version="1.0" encoding="utf-8"?>
 <p:sld xmlns:a="http://schemas.openxmlformats.org/drawingml/2006/main" xmlns:r="http://schemas.openxmlformats.org/officeDocument/2006/relationships" xmlns:p="http://schemas.openxmlformats.org/presentationml/2006/main">
   <p:cSld>
@@ -3825,6 +7182,239 @@
     <p:extLst>
       <p:ext uri="{BB962C8B-B14F-4D97-AF65-F5344CB8AC3E}">
         <p14:creationId xmlns:p14="http://schemas.microsoft.com/office/powerpoint/2010/main" val="2956049095"/>
+      </p:ext>
+    </p:extLst>
+  </p:cSld>
+  <p:clrMapOvr>
+    <a:masterClrMapping/>
+  </p:clrMapOvr>
+</p:sld>
+</file>
+
+<file path=ppt/slides/slide2.xml><?xml version="1.0" encoding="utf-8"?>
+<p:sld xmlns:a="http://schemas.openxmlformats.org/drawingml/2006/main" xmlns:r="http://schemas.openxmlformats.org/officeDocument/2006/relationships" xmlns:p="http://schemas.openxmlformats.org/presentationml/2006/main">
+  <p:cSld>
+    <p:bg>
+      <p:bgPr>
+        <a:solidFill>
+          <a:srgbClr val="FF8F32"/>
+        </a:solidFill>
+        <a:effectLst/>
+      </p:bgPr>
+    </p:bg>
+    <p:spTree>
+      <p:nvGrpSpPr>
+        <p:cNvPr id="1" name=""/>
+        <p:cNvGrpSpPr/>
+        <p:nvPr/>
+      </p:nvGrpSpPr>
+      <p:grpSpPr>
+        <a:xfrm>
+          <a:off x="0" y="0"/>
+          <a:ext cx="0" cy="0"/>
+          <a:chOff x="0" y="0"/>
+          <a:chExt cx="0" cy="0"/>
+        </a:xfrm>
+      </p:grpSpPr>
+      <p:sp>
+        <p:nvSpPr>
+          <p:cNvPr id="4" name="TextBox 3"/>
+          <p:cNvSpPr txBox="1"/>
+          <p:nvPr/>
+        </p:nvSpPr>
+        <p:spPr>
+          <a:xfrm>
+            <a:off x="533400" y="1134070"/>
+            <a:ext cx="7924800" cy="4370427"/>
+          </a:xfrm>
+          <a:prstGeom prst="rect">
+            <a:avLst/>
+          </a:prstGeom>
+          <a:noFill/>
+        </p:spPr>
+        <p:txBody>
+          <a:bodyPr wrap="square" rtlCol="0">
+            <a:spAutoFit/>
+          </a:bodyPr>
+          <a:lstStyle/>
+          <a:p>
+            <a:r>
+              <a:rPr lang="en-US" sz="5400" dirty="0" smtClean="0">
+                <a:solidFill>
+                  <a:prstClr val="white"/>
+                </a:solidFill>
+                <a:latin typeface="Segoe UI Light" panose="020B0502040204020203" pitchFamily="34" charset="0"/>
+              </a:rPr>
+              <a:t>System Advisor Model</a:t>
+            </a:r>
+          </a:p>
+          <a:p>
+            <a:endParaRPr lang="en-US" sz="3200" dirty="0" smtClean="0">
+              <a:solidFill>
+                <a:prstClr val="white"/>
+              </a:solidFill>
+              <a:latin typeface="Segoe UI Light" panose="020B0502040204020203" pitchFamily="34" charset="0"/>
+            </a:endParaRPr>
+          </a:p>
+          <a:p>
+            <a:r>
+              <a:rPr lang="en-US" sz="3200" dirty="0" smtClean="0">
+                <a:solidFill>
+                  <a:prstClr val="white"/>
+                </a:solidFill>
+                <a:latin typeface="Segoe UI Light" panose="020B0502040204020203" pitchFamily="34" charset="0"/>
+              </a:rPr>
+              <a:t>Version 2014.9.10</a:t>
+            </a:r>
+          </a:p>
+          <a:p>
+            <a:endParaRPr lang="en-US" sz="3200" dirty="0" smtClean="0">
+              <a:solidFill>
+                <a:prstClr val="white"/>
+              </a:solidFill>
+              <a:latin typeface="Segoe UI Light" panose="020B0502040204020203" pitchFamily="34" charset="0"/>
+            </a:endParaRPr>
+          </a:p>
+          <a:p>
+            <a:endParaRPr lang="en-US" sz="3200" dirty="0" smtClean="0">
+              <a:solidFill>
+                <a:prstClr val="white"/>
+              </a:solidFill>
+              <a:latin typeface="Segoe UI Light" panose="020B0502040204020203" pitchFamily="34" charset="0"/>
+            </a:endParaRPr>
+          </a:p>
+          <a:p>
+            <a:endParaRPr lang="en-US" sz="3200" dirty="0" smtClean="0">
+              <a:solidFill>
+                <a:prstClr val="white"/>
+              </a:solidFill>
+              <a:latin typeface="Segoe UI Light" panose="020B0502040204020203" pitchFamily="34" charset="0"/>
+            </a:endParaRPr>
+          </a:p>
+          <a:p>
+            <a:endParaRPr lang="en-US" sz="3200" dirty="0" smtClean="0">
+              <a:solidFill>
+                <a:prstClr val="white"/>
+              </a:solidFill>
+              <a:latin typeface="Segoe UI Light" panose="020B0502040204020203" pitchFamily="34" charset="0"/>
+            </a:endParaRPr>
+          </a:p>
+          <a:p>
+            <a:r>
+              <a:rPr lang="en-US" sz="3200" dirty="0" smtClean="0">
+                <a:solidFill>
+                  <a:prstClr val="white"/>
+                </a:solidFill>
+                <a:latin typeface="Segoe UI Light" panose="020B0502040204020203" pitchFamily="34" charset="0"/>
+              </a:rPr>
+              <a:t>Starting up… please wait</a:t>
+            </a:r>
+          </a:p>
+        </p:txBody>
+      </p:sp>
+      <p:sp>
+        <p:nvSpPr>
+          <p:cNvPr id="5" name="TextBox 4"/>
+          <p:cNvSpPr txBox="1"/>
+          <p:nvPr/>
+        </p:nvSpPr>
+        <p:spPr>
+          <a:xfrm>
+            <a:off x="0" y="5934670"/>
+            <a:ext cx="9144000" cy="923330"/>
+          </a:xfrm>
+          <a:prstGeom prst="rect">
+            <a:avLst/>
+          </a:prstGeom>
+          <a:solidFill>
+            <a:schemeClr val="bg1"/>
+          </a:solidFill>
+        </p:spPr>
+        <p:txBody>
+          <a:bodyPr wrap="square" rtlCol="0">
+            <a:spAutoFit/>
+          </a:bodyPr>
+          <a:lstStyle/>
+          <a:p>
+            <a:endParaRPr lang="en-US" dirty="0" smtClean="0">
+              <a:solidFill>
+                <a:prstClr val="white">
+                  <a:lumMod val="65000"/>
+                </a:prstClr>
+              </a:solidFill>
+              <a:latin typeface="Segoe UI Light" panose="020B0502040204020203" pitchFamily="34" charset="0"/>
+            </a:endParaRPr>
+          </a:p>
+          <a:p>
+            <a:r>
+              <a:rPr lang="en-US" dirty="0" smtClean="0">
+                <a:solidFill>
+                  <a:prstClr val="white">
+                    <a:lumMod val="65000"/>
+                  </a:prstClr>
+                </a:solidFill>
+                <a:latin typeface="Segoe UI Light" panose="020B0502040204020203" pitchFamily="34" charset="0"/>
+              </a:rPr>
+              <a:t>         Copyright 2014, National Renewable Energy Laboratory</a:t>
+            </a:r>
+          </a:p>
+          <a:p>
+            <a:endParaRPr lang="en-US" dirty="0" smtClean="0">
+              <a:solidFill>
+                <a:prstClr val="white">
+                  <a:lumMod val="65000"/>
+                </a:prstClr>
+              </a:solidFill>
+              <a:latin typeface="Segoe UI Light" panose="020B0502040204020203" pitchFamily="34" charset="0"/>
+            </a:endParaRPr>
+          </a:p>
+        </p:txBody>
+      </p:sp>
+      <p:pic>
+        <p:nvPicPr>
+          <p:cNvPr id="1029" name="Picture 5" descr="C:\Users\adobos\Projects\SAMnt\resource\nrel.png"/>
+          <p:cNvPicPr>
+            <a:picLocks noChangeAspect="1" noChangeArrowheads="1"/>
+          </p:cNvPicPr>
+          <p:nvPr/>
+        </p:nvPicPr>
+        <p:blipFill>
+          <a:blip r:embed="rId2">
+            <a:extLst>
+              <a:ext uri="{28A0092B-C50C-407E-A947-70E740481C1C}">
+                <a14:useLocalDpi xmlns:a14="http://schemas.microsoft.com/office/drawing/2010/main" val="0"/>
+              </a:ext>
+            </a:extLst>
+          </a:blip>
+          <a:srcRect/>
+          <a:stretch>
+            <a:fillRect/>
+          </a:stretch>
+        </p:blipFill>
+        <p:spPr bwMode="auto">
+          <a:xfrm>
+            <a:off x="7315200" y="6172466"/>
+            <a:ext cx="1533739" cy="447738"/>
+          </a:xfrm>
+          <a:prstGeom prst="rect">
+            <a:avLst/>
+          </a:prstGeom>
+          <a:noFill/>
+          <a:extLst>
+            <a:ext uri="{909E8E84-426E-40DD-AFC4-6F175D3DCCD1}">
+              <a14:hiddenFill xmlns:a14="http://schemas.microsoft.com/office/drawing/2010/main">
+                <a:solidFill>
+                  <a:srgbClr val="FFFFFF"/>
+                </a:solidFill>
+              </a14:hiddenFill>
+            </a:ext>
+          </a:extLst>
+        </p:spPr>
+      </p:pic>
+    </p:spTree>
+    <p:extLst>
+      <p:ext uri="{BB962C8B-B14F-4D97-AF65-F5344CB8AC3E}">
+        <p14:creationId xmlns:p14="http://schemas.microsoft.com/office/powerpoint/2010/main" val="4073414272"/>
       </p:ext>
     </p:extLst>
   </p:cSld>
@@ -4117,4 +7707,289 @@
   <a:objectDefaults/>
   <a:extraClrSchemeLst/>
 </a:theme>
+</file>
+
+<file path=ppt/theme/theme2.xml><?xml version="1.0" encoding="utf-8"?>
+<a:theme xmlns:a="http://schemas.openxmlformats.org/drawingml/2006/main" name="1_Office Theme">
+  <a:themeElements>
+    <a:clrScheme name="Office">
+      <a:dk1>
+        <a:sysClr val="windowText" lastClr="000000"/>
+      </a:dk1>
+      <a:lt1>
+        <a:sysClr val="window" lastClr="FFFFFF"/>
+      </a:lt1>
+      <a:dk2>
+        <a:srgbClr val="1F497D"/>
+      </a:dk2>
+      <a:lt2>
+        <a:srgbClr val="EEECE1"/>
+      </a:lt2>
+      <a:accent1>
+        <a:srgbClr val="4F81BD"/>
+      </a:accent1>
+      <a:accent2>
+        <a:srgbClr val="C0504D"/>
+      </a:accent2>
+      <a:accent3>
+        <a:srgbClr val="9BBB59"/>
+      </a:accent3>
+      <a:accent4>
+        <a:srgbClr val="8064A2"/>
+      </a:accent4>
+      <a:accent5>
+        <a:srgbClr val="4BACC6"/>
+      </a:accent5>
+      <a:accent6>
+        <a:srgbClr val="F79646"/>
+      </a:accent6>
+      <a:hlink>
+        <a:srgbClr val="0000FF"/>
+      </a:hlink>
+      <a:folHlink>
+        <a:srgbClr val="800080"/>
+      </a:folHlink>
+    </a:clrScheme>
+    <a:fontScheme name="Office">
+      <a:majorFont>
+        <a:latin typeface="Calibri"/>
+        <a:ea typeface=""/>
+        <a:cs typeface=""/>
+        <a:font script="Jpan" typeface="ＭＳ Ｐゴシック"/>
+        <a:font script="Hang" typeface="맑은 고딕"/>
+        <a:font script="Hans" typeface="宋体"/>
+        <a:font script="Hant" typeface="新細明體"/>
+        <a:font script="Arab" typeface="Times New Roman"/>
+        <a:font script="Hebr" typeface="Times New Roman"/>
+        <a:font script="Thai" typeface="Angsana New"/>
+        <a:font script="Ethi" typeface="Nyala"/>
+        <a:font script="Beng" typeface="Vrinda"/>
+        <a:font script="Gujr" typeface="Shruti"/>
+        <a:font script="Khmr" typeface="MoolBoran"/>
+        <a:font script="Knda" typeface="Tunga"/>
+        <a:font script="Guru" typeface="Raavi"/>
+        <a:font script="Cans" typeface="Euphemia"/>
+        <a:font script="Cher" typeface="Plantagenet Cherokee"/>
+        <a:font script="Yiii" typeface="Microsoft Yi Baiti"/>
+        <a:font script="Tibt" typeface="Microsoft Himalaya"/>
+        <a:font script="Thaa" typeface="MV Boli"/>
+        <a:font script="Deva" typeface="Mangal"/>
+        <a:font script="Telu" typeface="Gautami"/>
+        <a:font script="Taml" typeface="Latha"/>
+        <a:font script="Syrc" typeface="Estrangelo Edessa"/>
+        <a:font script="Orya" typeface="Kalinga"/>
+        <a:font script="Mlym" typeface="Kartika"/>
+        <a:font script="Laoo" typeface="DokChampa"/>
+        <a:font script="Sinh" typeface="Iskoola Pota"/>
+        <a:font script="Mong" typeface="Mongolian Baiti"/>
+        <a:font script="Viet" typeface="Times New Roman"/>
+        <a:font script="Uigh" typeface="Microsoft Uighur"/>
+        <a:font script="Geor" typeface="Sylfaen"/>
+      </a:majorFont>
+      <a:minorFont>
+        <a:latin typeface="Calibri"/>
+        <a:ea typeface=""/>
+        <a:cs typeface=""/>
+        <a:font script="Jpan" typeface="ＭＳ Ｐゴシック"/>
+        <a:font script="Hang" typeface="맑은 고딕"/>
+        <a:font script="Hans" typeface="宋体"/>
+        <a:font script="Hant" typeface="新細明體"/>
+        <a:font script="Arab" typeface="Arial"/>
+        <a:font script="Hebr" typeface="Arial"/>
+        <a:font script="Thai" typeface="Cordia New"/>
+        <a:font script="Ethi" typeface="Nyala"/>
+        <a:font script="Beng" typeface="Vrinda"/>
+        <a:font script="Gujr" typeface="Shruti"/>
+        <a:font script="Khmr" typeface="DaunPenh"/>
+        <a:font script="Knda" typeface="Tunga"/>
+        <a:font script="Guru" typeface="Raavi"/>
+        <a:font script="Cans" typeface="Euphemia"/>
+        <a:font script="Cher" typeface="Plantagenet Cherokee"/>
+        <a:font script="Yiii" typeface="Microsoft Yi Baiti"/>
+        <a:font script="Tibt" typeface="Microsoft Himalaya"/>
+        <a:font script="Thaa" typeface="MV Boli"/>
+        <a:font script="Deva" typeface="Mangal"/>
+        <a:font script="Telu" typeface="Gautami"/>
+        <a:font script="Taml" typeface="Latha"/>
+        <a:font script="Syrc" typeface="Estrangelo Edessa"/>
+        <a:font script="Orya" typeface="Kalinga"/>
+        <a:font script="Mlym" typeface="Kartika"/>
+        <a:font script="Laoo" typeface="DokChampa"/>
+        <a:font script="Sinh" typeface="Iskoola Pota"/>
+        <a:font script="Mong" typeface="Mongolian Baiti"/>
+        <a:font script="Viet" typeface="Arial"/>
+        <a:font script="Uigh" typeface="Microsoft Uighur"/>
+        <a:font script="Geor" typeface="Sylfaen"/>
+      </a:minorFont>
+    </a:fontScheme>
+    <a:fmtScheme name="Office">
+      <a:fillStyleLst>
+        <a:solidFill>
+          <a:schemeClr val="phClr"/>
+        </a:solidFill>
+        <a:gradFill rotWithShape="1">
+          <a:gsLst>
+            <a:gs pos="0">
+              <a:schemeClr val="phClr">
+                <a:tint val="50000"/>
+                <a:satMod val="300000"/>
+              </a:schemeClr>
+            </a:gs>
+            <a:gs pos="35000">
+              <a:schemeClr val="phClr">
+                <a:tint val="37000"/>
+                <a:satMod val="300000"/>
+              </a:schemeClr>
+            </a:gs>
+            <a:gs pos="100000">
+              <a:schemeClr val="phClr">
+                <a:tint val="15000"/>
+                <a:satMod val="350000"/>
+              </a:schemeClr>
+            </a:gs>
+          </a:gsLst>
+          <a:lin ang="16200000" scaled="1"/>
+        </a:gradFill>
+        <a:gradFill rotWithShape="1">
+          <a:gsLst>
+            <a:gs pos="0">
+              <a:schemeClr val="phClr">
+                <a:shade val="51000"/>
+                <a:satMod val="130000"/>
+              </a:schemeClr>
+            </a:gs>
+            <a:gs pos="80000">
+              <a:schemeClr val="phClr">
+                <a:shade val="93000"/>
+                <a:satMod val="130000"/>
+              </a:schemeClr>
+            </a:gs>
+            <a:gs pos="100000">
+              <a:schemeClr val="phClr">
+                <a:shade val="94000"/>
+                <a:satMod val="135000"/>
+              </a:schemeClr>
+            </a:gs>
+          </a:gsLst>
+          <a:lin ang="16200000" scaled="0"/>
+        </a:gradFill>
+      </a:fillStyleLst>
+      <a:lnStyleLst>
+        <a:ln w="9525" cap="flat" cmpd="sng" algn="ctr">
+          <a:solidFill>
+            <a:schemeClr val="phClr">
+              <a:shade val="95000"/>
+              <a:satMod val="105000"/>
+            </a:schemeClr>
+          </a:solidFill>
+          <a:prstDash val="solid"/>
+        </a:ln>
+        <a:ln w="25400" cap="flat" cmpd="sng" algn="ctr">
+          <a:solidFill>
+            <a:schemeClr val="phClr"/>
+          </a:solidFill>
+          <a:prstDash val="solid"/>
+        </a:ln>
+        <a:ln w="38100" cap="flat" cmpd="sng" algn="ctr">
+          <a:solidFill>
+            <a:schemeClr val="phClr"/>
+          </a:solidFill>
+          <a:prstDash val="solid"/>
+        </a:ln>
+      </a:lnStyleLst>
+      <a:effectStyleLst>
+        <a:effectStyle>
+          <a:effectLst>
+            <a:outerShdw blurRad="40000" dist="20000" dir="5400000" rotWithShape="0">
+              <a:srgbClr val="000000">
+                <a:alpha val="38000"/>
+              </a:srgbClr>
+            </a:outerShdw>
+          </a:effectLst>
+        </a:effectStyle>
+        <a:effectStyle>
+          <a:effectLst>
+            <a:outerShdw blurRad="40000" dist="23000" dir="5400000" rotWithShape="0">
+              <a:srgbClr val="000000">
+                <a:alpha val="35000"/>
+              </a:srgbClr>
+            </a:outerShdw>
+          </a:effectLst>
+        </a:effectStyle>
+        <a:effectStyle>
+          <a:effectLst>
+            <a:outerShdw blurRad="40000" dist="23000" dir="5400000" rotWithShape="0">
+              <a:srgbClr val="000000">
+                <a:alpha val="35000"/>
+              </a:srgbClr>
+            </a:outerShdw>
+          </a:effectLst>
+          <a:scene3d>
+            <a:camera prst="orthographicFront">
+              <a:rot lat="0" lon="0" rev="0"/>
+            </a:camera>
+            <a:lightRig rig="threePt" dir="t">
+              <a:rot lat="0" lon="0" rev="1200000"/>
+            </a:lightRig>
+          </a:scene3d>
+          <a:sp3d>
+            <a:bevelT w="63500" h="25400"/>
+          </a:sp3d>
+        </a:effectStyle>
+      </a:effectStyleLst>
+      <a:bgFillStyleLst>
+        <a:solidFill>
+          <a:schemeClr val="phClr"/>
+        </a:solidFill>
+        <a:gradFill rotWithShape="1">
+          <a:gsLst>
+            <a:gs pos="0">
+              <a:schemeClr val="phClr">
+                <a:tint val="40000"/>
+                <a:satMod val="350000"/>
+              </a:schemeClr>
+            </a:gs>
+            <a:gs pos="40000">
+              <a:schemeClr val="phClr">
+                <a:tint val="45000"/>
+                <a:shade val="99000"/>
+                <a:satMod val="350000"/>
+              </a:schemeClr>
+            </a:gs>
+            <a:gs pos="100000">
+              <a:schemeClr val="phClr">
+                <a:shade val="20000"/>
+                <a:satMod val="255000"/>
+              </a:schemeClr>
+            </a:gs>
+          </a:gsLst>
+          <a:path path="circle">
+            <a:fillToRect l="50000" t="-80000" r="50000" b="180000"/>
+          </a:path>
+        </a:gradFill>
+        <a:gradFill rotWithShape="1">
+          <a:gsLst>
+            <a:gs pos="0">
+              <a:schemeClr val="phClr">
+                <a:tint val="80000"/>
+                <a:satMod val="300000"/>
+              </a:schemeClr>
+            </a:gs>
+            <a:gs pos="100000">
+              <a:schemeClr val="phClr">
+                <a:shade val="30000"/>
+                <a:satMod val="200000"/>
+              </a:schemeClr>
+            </a:gs>
+          </a:gsLst>
+          <a:path path="circle">
+            <a:fillToRect l="50000" t="50000" r="50000" b="50000"/>
+          </a:path>
+        </a:gradFill>
+      </a:bgFillStyleLst>
+    </a:fmtScheme>
+  </a:themeElements>
+  <a:objectDefaults/>
+  <a:extraClrSchemeLst/>
+</a:theme>
 </file>
</xml_diff>

<commit_message>
basic case + casewindow creation capability
</commit_message>
<xml_diff>
--- a/resource/samnt.pptx
+++ b/resource/samnt.pptx
@@ -290,7 +290,7 @@
           <a:p>
             <a:fld id="{5EBFDE7A-2F88-4186-BBAC-CFFB1713D382}" type="datetimeFigureOut">
               <a:rPr lang="en-US" smtClean="0"/>
-              <a:t>9/20/2013</a:t>
+              <a:t>10/18/2013</a:t>
             </a:fld>
             <a:endParaRPr lang="en-US"/>
           </a:p>
@@ -460,7 +460,7 @@
           <a:p>
             <a:fld id="{5EBFDE7A-2F88-4186-BBAC-CFFB1713D382}" type="datetimeFigureOut">
               <a:rPr lang="en-US" smtClean="0"/>
-              <a:t>9/20/2013</a:t>
+              <a:t>10/18/2013</a:t>
             </a:fld>
             <a:endParaRPr lang="en-US"/>
           </a:p>
@@ -640,7 +640,7 @@
           <a:p>
             <a:fld id="{5EBFDE7A-2F88-4186-BBAC-CFFB1713D382}" type="datetimeFigureOut">
               <a:rPr lang="en-US" smtClean="0"/>
-              <a:t>9/20/2013</a:t>
+              <a:t>10/18/2013</a:t>
             </a:fld>
             <a:endParaRPr lang="en-US"/>
           </a:p>
@@ -889,7 +889,7 @@
                 </a:solidFill>
               </a:rPr>
               <a:pPr/>
-              <a:t>9/20/2013</a:t>
+              <a:t>10/18/2013</a:t>
             </a:fld>
             <a:endParaRPr lang="en-US">
               <a:solidFill>
@@ -1091,7 +1091,7 @@
                 </a:solidFill>
               </a:rPr>
               <a:pPr/>
-              <a:t>9/20/2013</a:t>
+              <a:t>10/18/2013</a:t>
             </a:fld>
             <a:endParaRPr lang="en-US">
               <a:solidFill>
@@ -1369,7 +1369,7 @@
                 </a:solidFill>
               </a:rPr>
               <a:pPr/>
-              <a:t>9/20/2013</a:t>
+              <a:t>10/18/2013</a:t>
             </a:fld>
             <a:endParaRPr lang="en-US">
               <a:solidFill>
@@ -1689,7 +1689,7 @@
                 </a:solidFill>
               </a:rPr>
               <a:pPr/>
-              <a:t>9/20/2013</a:t>
+              <a:t>10/18/2013</a:t>
             </a:fld>
             <a:endParaRPr lang="en-US">
               <a:solidFill>
@@ -2143,7 +2143,7 @@
                 </a:solidFill>
               </a:rPr>
               <a:pPr/>
-              <a:t>9/20/2013</a:t>
+              <a:t>10/18/2013</a:t>
             </a:fld>
             <a:endParaRPr lang="en-US">
               <a:solidFill>
@@ -2293,7 +2293,7 @@
                 </a:solidFill>
               </a:rPr>
               <a:pPr/>
-              <a:t>9/20/2013</a:t>
+              <a:t>10/18/2013</a:t>
             </a:fld>
             <a:endParaRPr lang="en-US">
               <a:solidFill>
@@ -2420,7 +2420,7 @@
                 </a:solidFill>
               </a:rPr>
               <a:pPr/>
-              <a:t>9/20/2013</a:t>
+              <a:t>10/18/2013</a:t>
             </a:fld>
             <a:endParaRPr lang="en-US">
               <a:solidFill>
@@ -2729,7 +2729,7 @@
                 </a:solidFill>
               </a:rPr>
               <a:pPr/>
-              <a:t>9/20/2013</a:t>
+              <a:t>10/18/2013</a:t>
             </a:fld>
             <a:endParaRPr lang="en-US">
               <a:solidFill>
@@ -2924,7 +2924,7 @@
           <a:p>
             <a:fld id="{5EBFDE7A-2F88-4186-BBAC-CFFB1713D382}" type="datetimeFigureOut">
               <a:rPr lang="en-US" smtClean="0"/>
-              <a:t>9/20/2013</a:t>
+              <a:t>10/18/2013</a:t>
             </a:fld>
             <a:endParaRPr lang="en-US"/>
           </a:p>
@@ -3184,7 +3184,7 @@
                 </a:solidFill>
               </a:rPr>
               <a:pPr/>
-              <a:t>9/20/2013</a:t>
+              <a:t>10/18/2013</a:t>
             </a:fld>
             <a:endParaRPr lang="en-US">
               <a:solidFill>
@@ -3386,7 +3386,7 @@
                 </a:solidFill>
               </a:rPr>
               <a:pPr/>
-              <a:t>9/20/2013</a:t>
+              <a:t>10/18/2013</a:t>
             </a:fld>
             <a:endParaRPr lang="en-US">
               <a:solidFill>
@@ -3598,7 +3598,7 @@
                 </a:solidFill>
               </a:rPr>
               <a:pPr/>
-              <a:t>9/20/2013</a:t>
+              <a:t>10/18/2013</a:t>
             </a:fld>
             <a:endParaRPr lang="en-US">
               <a:solidFill>
@@ -3869,7 +3869,7 @@
           <a:p>
             <a:fld id="{5EBFDE7A-2F88-4186-BBAC-CFFB1713D382}" type="datetimeFigureOut">
               <a:rPr lang="en-US" smtClean="0"/>
-              <a:t>9/20/2013</a:t>
+              <a:t>10/18/2013</a:t>
             </a:fld>
             <a:endParaRPr lang="en-US"/>
           </a:p>
@@ -4157,7 +4157,7 @@
           <a:p>
             <a:fld id="{5EBFDE7A-2F88-4186-BBAC-CFFB1713D382}" type="datetimeFigureOut">
               <a:rPr lang="en-US" smtClean="0"/>
-              <a:t>9/20/2013</a:t>
+              <a:t>10/18/2013</a:t>
             </a:fld>
             <a:endParaRPr lang="en-US"/>
           </a:p>
@@ -4579,7 +4579,7 @@
           <a:p>
             <a:fld id="{5EBFDE7A-2F88-4186-BBAC-CFFB1713D382}" type="datetimeFigureOut">
               <a:rPr lang="en-US" smtClean="0"/>
-              <a:t>9/20/2013</a:t>
+              <a:t>10/18/2013</a:t>
             </a:fld>
             <a:endParaRPr lang="en-US"/>
           </a:p>
@@ -4697,7 +4697,7 @@
           <a:p>
             <a:fld id="{5EBFDE7A-2F88-4186-BBAC-CFFB1713D382}" type="datetimeFigureOut">
               <a:rPr lang="en-US" smtClean="0"/>
-              <a:t>9/20/2013</a:t>
+              <a:t>10/18/2013</a:t>
             </a:fld>
             <a:endParaRPr lang="en-US"/>
           </a:p>
@@ -4792,7 +4792,7 @@
           <a:p>
             <a:fld id="{5EBFDE7A-2F88-4186-BBAC-CFFB1713D382}" type="datetimeFigureOut">
               <a:rPr lang="en-US" smtClean="0"/>
-              <a:t>9/20/2013</a:t>
+              <a:t>10/18/2013</a:t>
             </a:fld>
             <a:endParaRPr lang="en-US"/>
           </a:p>
@@ -5069,7 +5069,7 @@
           <a:p>
             <a:fld id="{5EBFDE7A-2F88-4186-BBAC-CFFB1713D382}" type="datetimeFigureOut">
               <a:rPr lang="en-US" smtClean="0"/>
-              <a:t>9/20/2013</a:t>
+              <a:t>10/18/2013</a:t>
             </a:fld>
             <a:endParaRPr lang="en-US"/>
           </a:p>
@@ -5322,7 +5322,7 @@
           <a:p>
             <a:fld id="{5EBFDE7A-2F88-4186-BBAC-CFFB1713D382}" type="datetimeFigureOut">
               <a:rPr lang="en-US" smtClean="0"/>
-              <a:t>9/20/2013</a:t>
+              <a:t>10/18/2013</a:t>
             </a:fld>
             <a:endParaRPr lang="en-US"/>
           </a:p>
@@ -5535,7 +5535,7 @@
           <a:p>
             <a:fld id="{5EBFDE7A-2F88-4186-BBAC-CFFB1713D382}" type="datetimeFigureOut">
               <a:rPr lang="en-US" smtClean="0"/>
-              <a:t>9/20/2013</a:t>
+              <a:t>10/18/2013</a:t>
             </a:fld>
             <a:endParaRPr lang="en-US"/>
           </a:p>
@@ -6052,7 +6052,7 @@
                 </a:solidFill>
               </a:rPr>
               <a:pPr/>
-              <a:t>9/20/2013</a:t>
+              <a:t>10/18/2013</a:t>
             </a:fld>
             <a:endParaRPr lang="en-US" smtClean="0">
               <a:solidFill>
@@ -7178,6 +7178,283 @@
           </a:p>
         </p:txBody>
       </p:sp>
+      <p:grpSp>
+        <p:nvGrpSpPr>
+          <p:cNvPr id="31" name="Group 30"/>
+          <p:cNvGrpSpPr/>
+          <p:nvPr/>
+        </p:nvGrpSpPr>
+        <p:grpSpPr>
+          <a:xfrm>
+            <a:off x="2971800" y="4497457"/>
+            <a:ext cx="304800" cy="296353"/>
+            <a:chOff x="2971800" y="4497457"/>
+            <a:chExt cx="304800" cy="296353"/>
+          </a:xfrm>
+        </p:grpSpPr>
+        <p:cxnSp>
+          <p:nvCxnSpPr>
+            <p:cNvPr id="8" name="Straight Connector 7"/>
+            <p:cNvCxnSpPr/>
+            <p:nvPr/>
+          </p:nvCxnSpPr>
+          <p:spPr>
+            <a:xfrm>
+              <a:off x="2971800" y="4786699"/>
+              <a:ext cx="304800" cy="320"/>
+            </a:xfrm>
+            <a:prstGeom prst="line">
+              <a:avLst/>
+            </a:prstGeom>
+            <a:ln w="28575">
+              <a:solidFill>
+                <a:schemeClr val="bg1"/>
+              </a:solidFill>
+            </a:ln>
+          </p:spPr>
+          <p:style>
+            <a:lnRef idx="1">
+              <a:schemeClr val="accent1"/>
+            </a:lnRef>
+            <a:fillRef idx="0">
+              <a:schemeClr val="accent1"/>
+            </a:fillRef>
+            <a:effectRef idx="0">
+              <a:schemeClr val="accent1"/>
+            </a:effectRef>
+            <a:fontRef idx="minor">
+              <a:schemeClr val="tx1"/>
+            </a:fontRef>
+          </p:style>
+        </p:cxnSp>
+        <p:sp>
+          <p:nvSpPr>
+            <p:cNvPr id="21" name="Rectangle 20"/>
+            <p:cNvSpPr/>
+            <p:nvPr/>
+          </p:nvSpPr>
+          <p:spPr>
+            <a:xfrm>
+              <a:off x="3032762" y="4701765"/>
+              <a:ext cx="45719" cy="76200"/>
+            </a:xfrm>
+            <a:prstGeom prst="rect">
+              <a:avLst/>
+            </a:prstGeom>
+            <a:solidFill>
+              <a:schemeClr val="bg1"/>
+            </a:solidFill>
+            <a:ln w="3175">
+              <a:solidFill>
+                <a:schemeClr val="bg1"/>
+              </a:solidFill>
+            </a:ln>
+          </p:spPr>
+          <p:style>
+            <a:lnRef idx="2">
+              <a:schemeClr val="accent1">
+                <a:shade val="50000"/>
+              </a:schemeClr>
+            </a:lnRef>
+            <a:fillRef idx="1">
+              <a:schemeClr val="accent1"/>
+            </a:fillRef>
+            <a:effectRef idx="0">
+              <a:schemeClr val="accent1"/>
+            </a:effectRef>
+            <a:fontRef idx="minor">
+              <a:schemeClr val="lt1"/>
+            </a:fontRef>
+          </p:style>
+          <p:txBody>
+            <a:bodyPr rtlCol="0" anchor="ctr"/>
+            <a:lstStyle/>
+            <a:p>
+              <a:pPr algn="ctr"/>
+              <a:endParaRPr lang="en-US"/>
+            </a:p>
+          </p:txBody>
+        </p:sp>
+        <p:sp>
+          <p:nvSpPr>
+            <p:cNvPr id="22" name="Rectangle 21"/>
+            <p:cNvSpPr/>
+            <p:nvPr/>
+          </p:nvSpPr>
+          <p:spPr>
+            <a:xfrm>
+              <a:off x="3078481" y="4634619"/>
+              <a:ext cx="45719" cy="152400"/>
+            </a:xfrm>
+            <a:prstGeom prst="rect">
+              <a:avLst/>
+            </a:prstGeom>
+            <a:solidFill>
+              <a:schemeClr val="bg1"/>
+            </a:solidFill>
+            <a:ln w="3175">
+              <a:solidFill>
+                <a:schemeClr val="bg1"/>
+              </a:solidFill>
+            </a:ln>
+          </p:spPr>
+          <p:style>
+            <a:lnRef idx="2">
+              <a:schemeClr val="accent1">
+                <a:shade val="50000"/>
+              </a:schemeClr>
+            </a:lnRef>
+            <a:fillRef idx="1">
+              <a:schemeClr val="accent1"/>
+            </a:fillRef>
+            <a:effectRef idx="0">
+              <a:schemeClr val="accent1"/>
+            </a:effectRef>
+            <a:fontRef idx="minor">
+              <a:schemeClr val="lt1"/>
+            </a:fontRef>
+          </p:style>
+          <p:txBody>
+            <a:bodyPr rtlCol="0" anchor="ctr"/>
+            <a:lstStyle/>
+            <a:p>
+              <a:pPr algn="ctr"/>
+              <a:endParaRPr lang="en-US"/>
+            </a:p>
+          </p:txBody>
+        </p:sp>
+        <p:sp>
+          <p:nvSpPr>
+            <p:cNvPr id="23" name="Rectangle 22"/>
+            <p:cNvSpPr/>
+            <p:nvPr/>
+          </p:nvSpPr>
+          <p:spPr>
+            <a:xfrm>
+              <a:off x="3127746" y="4576527"/>
+              <a:ext cx="45719" cy="194270"/>
+            </a:xfrm>
+            <a:prstGeom prst="rect">
+              <a:avLst/>
+            </a:prstGeom>
+            <a:solidFill>
+              <a:schemeClr val="bg1"/>
+            </a:solidFill>
+            <a:ln w="3175">
+              <a:solidFill>
+                <a:schemeClr val="bg1"/>
+              </a:solidFill>
+            </a:ln>
+          </p:spPr>
+          <p:style>
+            <a:lnRef idx="2">
+              <a:schemeClr val="accent1">
+                <a:shade val="50000"/>
+              </a:schemeClr>
+            </a:lnRef>
+            <a:fillRef idx="1">
+              <a:schemeClr val="accent1"/>
+            </a:fillRef>
+            <a:effectRef idx="0">
+              <a:schemeClr val="accent1"/>
+            </a:effectRef>
+            <a:fontRef idx="minor">
+              <a:schemeClr val="lt1"/>
+            </a:fontRef>
+          </p:style>
+          <p:txBody>
+            <a:bodyPr rtlCol="0" anchor="ctr"/>
+            <a:lstStyle/>
+            <a:p>
+              <a:pPr algn="ctr"/>
+              <a:endParaRPr lang="en-US"/>
+            </a:p>
+          </p:txBody>
+        </p:sp>
+        <p:sp>
+          <p:nvSpPr>
+            <p:cNvPr id="25" name="Rectangle 24"/>
+            <p:cNvSpPr/>
+            <p:nvPr/>
+          </p:nvSpPr>
+          <p:spPr>
+            <a:xfrm>
+              <a:off x="3176108" y="4706292"/>
+              <a:ext cx="45719" cy="76200"/>
+            </a:xfrm>
+            <a:prstGeom prst="rect">
+              <a:avLst/>
+            </a:prstGeom>
+            <a:solidFill>
+              <a:schemeClr val="bg1"/>
+            </a:solidFill>
+            <a:ln w="3175">
+              <a:solidFill>
+                <a:schemeClr val="bg1"/>
+              </a:solidFill>
+            </a:ln>
+          </p:spPr>
+          <p:style>
+            <a:lnRef idx="2">
+              <a:schemeClr val="accent1">
+                <a:shade val="50000"/>
+              </a:schemeClr>
+            </a:lnRef>
+            <a:fillRef idx="1">
+              <a:schemeClr val="accent1"/>
+            </a:fillRef>
+            <a:effectRef idx="0">
+              <a:schemeClr val="accent1"/>
+            </a:effectRef>
+            <a:fontRef idx="minor">
+              <a:schemeClr val="lt1"/>
+            </a:fontRef>
+          </p:style>
+          <p:txBody>
+            <a:bodyPr rtlCol="0" anchor="ctr"/>
+            <a:lstStyle/>
+            <a:p>
+              <a:pPr algn="ctr"/>
+              <a:endParaRPr lang="en-US"/>
+            </a:p>
+          </p:txBody>
+        </p:sp>
+        <p:cxnSp>
+          <p:nvCxnSpPr>
+            <p:cNvPr id="26" name="Straight Connector 25"/>
+            <p:cNvCxnSpPr/>
+            <p:nvPr/>
+          </p:nvCxnSpPr>
+          <p:spPr>
+            <a:xfrm flipV="1">
+              <a:off x="2985381" y="4497457"/>
+              <a:ext cx="0" cy="296353"/>
+            </a:xfrm>
+            <a:prstGeom prst="line">
+              <a:avLst/>
+            </a:prstGeom>
+            <a:ln w="28575">
+              <a:solidFill>
+                <a:schemeClr val="bg1"/>
+              </a:solidFill>
+            </a:ln>
+          </p:spPr>
+          <p:style>
+            <a:lnRef idx="1">
+              <a:schemeClr val="accent1"/>
+            </a:lnRef>
+            <a:fillRef idx="0">
+              <a:schemeClr val="accent1"/>
+            </a:fillRef>
+            <a:effectRef idx="0">
+              <a:schemeClr val="accent1"/>
+            </a:effectRef>
+            <a:fontRef idx="minor">
+              <a:schemeClr val="tx1"/>
+            </a:fontRef>
+          </p:style>
+        </p:cxnSp>
+      </p:grpSp>
     </p:spTree>
     <p:extLst>
       <p:ext uri="{BB962C8B-B14F-4D97-AF65-F5344CB8AC3E}">

</xml_diff>

<commit_message>
new SAM icon option added.
</commit_message>
<xml_diff>
--- a/resource/samnt.pptx
+++ b/resource/samnt.pptx
@@ -106,6 +106,22 @@
       </a:defRPr>
     </a:lvl9pPr>
   </p:defaultTextStyle>
+  <p:extLst>
+    <p:ext uri="{EFAFB233-063F-42B5-8137-9DF3F51BA10A}">
+      <p15:sldGuideLst xmlns:p15="http://schemas.microsoft.com/office/powerpoint/2012/main">
+        <p15:guide id="1" orient="horz" pos="2160">
+          <p15:clr>
+            <a:srgbClr val="A4A3A4"/>
+          </p15:clr>
+        </p15:guide>
+        <p15:guide id="2" pos="2880">
+          <p15:clr>
+            <a:srgbClr val="A4A3A4"/>
+          </p15:clr>
+        </p15:guide>
+      </p15:sldGuideLst>
+    </p:ext>
+  </p:extLst>
 </p:presentation>
 </file>
 
@@ -290,7 +306,7 @@
           <a:p>
             <a:fld id="{5EBFDE7A-2F88-4186-BBAC-CFFB1713D382}" type="datetimeFigureOut">
               <a:rPr lang="en-US" smtClean="0"/>
-              <a:t>3/6/2014</a:t>
+              <a:t>7/10/2014</a:t>
             </a:fld>
             <a:endParaRPr lang="en-US"/>
           </a:p>
@@ -460,7 +476,7 @@
           <a:p>
             <a:fld id="{5EBFDE7A-2F88-4186-BBAC-CFFB1713D382}" type="datetimeFigureOut">
               <a:rPr lang="en-US" smtClean="0"/>
-              <a:t>3/6/2014</a:t>
+              <a:t>7/10/2014</a:t>
             </a:fld>
             <a:endParaRPr lang="en-US"/>
           </a:p>
@@ -640,7 +656,7 @@
           <a:p>
             <a:fld id="{5EBFDE7A-2F88-4186-BBAC-CFFB1713D382}" type="datetimeFigureOut">
               <a:rPr lang="en-US" smtClean="0"/>
-              <a:t>3/6/2014</a:t>
+              <a:t>7/10/2014</a:t>
             </a:fld>
             <a:endParaRPr lang="en-US"/>
           </a:p>
@@ -889,7 +905,7 @@
                 </a:solidFill>
               </a:rPr>
               <a:pPr/>
-              <a:t>3/6/2014</a:t>
+              <a:t>7/10/2014</a:t>
             </a:fld>
             <a:endParaRPr lang="en-US">
               <a:solidFill>
@@ -1091,7 +1107,7 @@
                 </a:solidFill>
               </a:rPr>
               <a:pPr/>
-              <a:t>3/6/2014</a:t>
+              <a:t>7/10/2014</a:t>
             </a:fld>
             <a:endParaRPr lang="en-US">
               <a:solidFill>
@@ -1369,7 +1385,7 @@
                 </a:solidFill>
               </a:rPr>
               <a:pPr/>
-              <a:t>3/6/2014</a:t>
+              <a:t>7/10/2014</a:t>
             </a:fld>
             <a:endParaRPr lang="en-US">
               <a:solidFill>
@@ -1689,7 +1705,7 @@
                 </a:solidFill>
               </a:rPr>
               <a:pPr/>
-              <a:t>3/6/2014</a:t>
+              <a:t>7/10/2014</a:t>
             </a:fld>
             <a:endParaRPr lang="en-US">
               <a:solidFill>
@@ -2143,7 +2159,7 @@
                 </a:solidFill>
               </a:rPr>
               <a:pPr/>
-              <a:t>3/6/2014</a:t>
+              <a:t>7/10/2014</a:t>
             </a:fld>
             <a:endParaRPr lang="en-US">
               <a:solidFill>
@@ -2293,7 +2309,7 @@
                 </a:solidFill>
               </a:rPr>
               <a:pPr/>
-              <a:t>3/6/2014</a:t>
+              <a:t>7/10/2014</a:t>
             </a:fld>
             <a:endParaRPr lang="en-US">
               <a:solidFill>
@@ -2420,7 +2436,7 @@
                 </a:solidFill>
               </a:rPr>
               <a:pPr/>
-              <a:t>3/6/2014</a:t>
+              <a:t>7/10/2014</a:t>
             </a:fld>
             <a:endParaRPr lang="en-US">
               <a:solidFill>
@@ -2729,7 +2745,7 @@
                 </a:solidFill>
               </a:rPr>
               <a:pPr/>
-              <a:t>3/6/2014</a:t>
+              <a:t>7/10/2014</a:t>
             </a:fld>
             <a:endParaRPr lang="en-US">
               <a:solidFill>
@@ -2924,7 +2940,7 @@
           <a:p>
             <a:fld id="{5EBFDE7A-2F88-4186-BBAC-CFFB1713D382}" type="datetimeFigureOut">
               <a:rPr lang="en-US" smtClean="0"/>
-              <a:t>3/6/2014</a:t>
+              <a:t>7/10/2014</a:t>
             </a:fld>
             <a:endParaRPr lang="en-US"/>
           </a:p>
@@ -3184,7 +3200,7 @@
                 </a:solidFill>
               </a:rPr>
               <a:pPr/>
-              <a:t>3/6/2014</a:t>
+              <a:t>7/10/2014</a:t>
             </a:fld>
             <a:endParaRPr lang="en-US">
               <a:solidFill>
@@ -3386,7 +3402,7 @@
                 </a:solidFill>
               </a:rPr>
               <a:pPr/>
-              <a:t>3/6/2014</a:t>
+              <a:t>7/10/2014</a:t>
             </a:fld>
             <a:endParaRPr lang="en-US">
               <a:solidFill>
@@ -3598,7 +3614,7 @@
                 </a:solidFill>
               </a:rPr>
               <a:pPr/>
-              <a:t>3/6/2014</a:t>
+              <a:t>7/10/2014</a:t>
             </a:fld>
             <a:endParaRPr lang="en-US">
               <a:solidFill>
@@ -3869,7 +3885,7 @@
           <a:p>
             <a:fld id="{5EBFDE7A-2F88-4186-BBAC-CFFB1713D382}" type="datetimeFigureOut">
               <a:rPr lang="en-US" smtClean="0"/>
-              <a:t>3/6/2014</a:t>
+              <a:t>7/10/2014</a:t>
             </a:fld>
             <a:endParaRPr lang="en-US"/>
           </a:p>
@@ -4157,7 +4173,7 @@
           <a:p>
             <a:fld id="{5EBFDE7A-2F88-4186-BBAC-CFFB1713D382}" type="datetimeFigureOut">
               <a:rPr lang="en-US" smtClean="0"/>
-              <a:t>3/6/2014</a:t>
+              <a:t>7/10/2014</a:t>
             </a:fld>
             <a:endParaRPr lang="en-US"/>
           </a:p>
@@ -4579,7 +4595,7 @@
           <a:p>
             <a:fld id="{5EBFDE7A-2F88-4186-BBAC-CFFB1713D382}" type="datetimeFigureOut">
               <a:rPr lang="en-US" smtClean="0"/>
-              <a:t>3/6/2014</a:t>
+              <a:t>7/10/2014</a:t>
             </a:fld>
             <a:endParaRPr lang="en-US"/>
           </a:p>
@@ -4697,7 +4713,7 @@
           <a:p>
             <a:fld id="{5EBFDE7A-2F88-4186-BBAC-CFFB1713D382}" type="datetimeFigureOut">
               <a:rPr lang="en-US" smtClean="0"/>
-              <a:t>3/6/2014</a:t>
+              <a:t>7/10/2014</a:t>
             </a:fld>
             <a:endParaRPr lang="en-US"/>
           </a:p>
@@ -4792,7 +4808,7 @@
           <a:p>
             <a:fld id="{5EBFDE7A-2F88-4186-BBAC-CFFB1713D382}" type="datetimeFigureOut">
               <a:rPr lang="en-US" smtClean="0"/>
-              <a:t>3/6/2014</a:t>
+              <a:t>7/10/2014</a:t>
             </a:fld>
             <a:endParaRPr lang="en-US"/>
           </a:p>
@@ -5069,7 +5085,7 @@
           <a:p>
             <a:fld id="{5EBFDE7A-2F88-4186-BBAC-CFFB1713D382}" type="datetimeFigureOut">
               <a:rPr lang="en-US" smtClean="0"/>
-              <a:t>3/6/2014</a:t>
+              <a:t>7/10/2014</a:t>
             </a:fld>
             <a:endParaRPr lang="en-US"/>
           </a:p>
@@ -5322,7 +5338,7 @@
           <a:p>
             <a:fld id="{5EBFDE7A-2F88-4186-BBAC-CFFB1713D382}" type="datetimeFigureOut">
               <a:rPr lang="en-US" smtClean="0"/>
-              <a:t>3/6/2014</a:t>
+              <a:t>7/10/2014</a:t>
             </a:fld>
             <a:endParaRPr lang="en-US"/>
           </a:p>
@@ -5535,7 +5551,7 @@
           <a:p>
             <a:fld id="{5EBFDE7A-2F88-4186-BBAC-CFFB1713D382}" type="datetimeFigureOut">
               <a:rPr lang="en-US" smtClean="0"/>
-              <a:t>3/6/2014</a:t>
+              <a:t>7/10/2014</a:t>
             </a:fld>
             <a:endParaRPr lang="en-US"/>
           </a:p>
@@ -6052,7 +6068,7 @@
                 </a:solidFill>
               </a:rPr>
               <a:pPr/>
-              <a:t>3/6/2014</a:t>
+              <a:t>7/10/2014</a:t>
             </a:fld>
             <a:endParaRPr lang="en-US" smtClean="0">
               <a:solidFill>
@@ -7771,6 +7787,148 @@
           </a:fillRef>
           <a:effectRef idx="0">
             <a:schemeClr val="accent6"/>
+          </a:effectRef>
+          <a:fontRef idx="minor">
+            <a:schemeClr val="lt1"/>
+          </a:fontRef>
+        </p:style>
+        <p:txBody>
+          <a:bodyPr rtlCol="0" anchor="ctr"/>
+          <a:lstStyle/>
+          <a:p>
+            <a:pPr algn="ctr"/>
+            <a:endParaRPr lang="en-US"/>
+          </a:p>
+        </p:txBody>
+      </p:sp>
+      <p:sp>
+        <p:nvSpPr>
+          <p:cNvPr id="28" name="TextBox 27"/>
+          <p:cNvSpPr txBox="1"/>
+          <p:nvPr/>
+        </p:nvSpPr>
+        <p:spPr>
+          <a:xfrm>
+            <a:off x="782782" y="750960"/>
+            <a:ext cx="1958861" cy="707886"/>
+          </a:xfrm>
+          <a:prstGeom prst="rect">
+            <a:avLst/>
+          </a:prstGeom>
+          <a:noFill/>
+        </p:spPr>
+        <p:txBody>
+          <a:bodyPr wrap="square" rtlCol="0">
+            <a:spAutoFit/>
+          </a:bodyPr>
+          <a:lstStyle/>
+          <a:p>
+            <a:r>
+              <a:rPr lang="en-US" sz="4000" dirty="0" smtClean="0">
+                <a:solidFill>
+                  <a:schemeClr val="accent1">
+                    <a:lumMod val="75000"/>
+                  </a:schemeClr>
+                </a:solidFill>
+                <a:latin typeface="Segoe UI Light" panose="020B0502040204020203" pitchFamily="34" charset="0"/>
+                <a:cs typeface="Segoe UI Light" panose="020B0502040204020203" pitchFamily="34" charset="0"/>
+              </a:rPr>
+              <a:t>SAM</a:t>
+            </a:r>
+            <a:endParaRPr lang="en-US" sz="4000" dirty="0">
+              <a:solidFill>
+                <a:schemeClr val="accent1">
+                  <a:lumMod val="75000"/>
+                </a:schemeClr>
+              </a:solidFill>
+              <a:latin typeface="Segoe UI Light" panose="020B0502040204020203" pitchFamily="34" charset="0"/>
+              <a:cs typeface="Segoe UI Light" panose="020B0502040204020203" pitchFamily="34" charset="0"/>
+            </a:endParaRPr>
+          </a:p>
+        </p:txBody>
+      </p:sp>
+      <p:sp>
+        <p:nvSpPr>
+          <p:cNvPr id="35" name="Flowchart: Connector 34"/>
+          <p:cNvSpPr/>
+          <p:nvPr/>
+        </p:nvSpPr>
+        <p:spPr>
+          <a:xfrm>
+            <a:off x="1143000" y="1219202"/>
+            <a:ext cx="457200" cy="457200"/>
+          </a:xfrm>
+          <a:prstGeom prst="flowChartConnector">
+            <a:avLst/>
+          </a:prstGeom>
+          <a:solidFill>
+            <a:srgbClr val="FF9400"/>
+          </a:solidFill>
+          <a:ln w="19050">
+            <a:solidFill>
+              <a:schemeClr val="bg1"/>
+            </a:solidFill>
+          </a:ln>
+        </p:spPr>
+        <p:style>
+          <a:lnRef idx="2">
+            <a:schemeClr val="accent6">
+              <a:shade val="50000"/>
+            </a:schemeClr>
+          </a:lnRef>
+          <a:fillRef idx="1">
+            <a:schemeClr val="accent6"/>
+          </a:fillRef>
+          <a:effectRef idx="0">
+            <a:schemeClr val="accent6"/>
+          </a:effectRef>
+          <a:fontRef idx="minor">
+            <a:schemeClr val="lt1"/>
+          </a:fontRef>
+        </p:style>
+        <p:txBody>
+          <a:bodyPr rtlCol="0" anchor="ctr"/>
+          <a:lstStyle/>
+          <a:p>
+            <a:pPr algn="ctr"/>
+            <a:endParaRPr lang="en-US"/>
+          </a:p>
+        </p:txBody>
+      </p:sp>
+      <p:sp>
+        <p:nvSpPr>
+          <p:cNvPr id="36" name="Rectangle 35"/>
+          <p:cNvSpPr/>
+          <p:nvPr/>
+        </p:nvSpPr>
+        <p:spPr>
+          <a:xfrm>
+            <a:off x="678286" y="1374128"/>
+            <a:ext cx="1826827" cy="685800"/>
+          </a:xfrm>
+          <a:prstGeom prst="rect">
+            <a:avLst/>
+          </a:prstGeom>
+          <a:solidFill>
+            <a:schemeClr val="bg1"/>
+          </a:solidFill>
+          <a:ln>
+            <a:solidFill>
+              <a:schemeClr val="bg1"/>
+            </a:solidFill>
+          </a:ln>
+        </p:spPr>
+        <p:style>
+          <a:lnRef idx="2">
+            <a:schemeClr val="accent1">
+              <a:shade val="50000"/>
+            </a:schemeClr>
+          </a:lnRef>
+          <a:fillRef idx="1">
+            <a:schemeClr val="accent1"/>
+          </a:fillRef>
+          <a:effectRef idx="0">
+            <a:schemeClr val="accent1"/>
           </a:effectRef>
           <a:fontRef idx="minor">
             <a:schemeClr val="lt1"/>

</xml_diff>

<commit_message>
reworked loading of default values. fixed issue with switching variable data types when changing configurations in a case. updated issue with progress reporting in simulation dialog
</commit_message>
<xml_diff>
--- a/resource/samnt.pptx
+++ b/resource/samnt.pptx
@@ -108,7 +108,7 @@
   </p:defaultTextStyle>
   <p:extLst>
     <p:ext uri="{EFAFB233-063F-42B5-8137-9DF3F51BA10A}">
-      <p15:sldGuideLst xmlns:p15="http://schemas.microsoft.com/office/powerpoint/2012/main">
+      <p15:sldGuideLst xmlns:p15="http://schemas.microsoft.com/office/powerpoint/2012/main" xmlns="">
         <p15:guide id="1" orient="horz" pos="2160">
           <p15:clr>
             <a:srgbClr val="A4A3A4"/>
@@ -306,7 +306,7 @@
           <a:p>
             <a:fld id="{5EBFDE7A-2F88-4186-BBAC-CFFB1713D382}" type="datetimeFigureOut">
               <a:rPr lang="en-US" smtClean="0"/>
-              <a:t>7/10/2014</a:t>
+              <a:t>7/21/2014</a:t>
             </a:fld>
             <a:endParaRPr lang="en-US"/>
           </a:p>
@@ -476,7 +476,7 @@
           <a:p>
             <a:fld id="{5EBFDE7A-2F88-4186-BBAC-CFFB1713D382}" type="datetimeFigureOut">
               <a:rPr lang="en-US" smtClean="0"/>
-              <a:t>7/10/2014</a:t>
+              <a:t>7/21/2014</a:t>
             </a:fld>
             <a:endParaRPr lang="en-US"/>
           </a:p>
@@ -656,7 +656,7 @@
           <a:p>
             <a:fld id="{5EBFDE7A-2F88-4186-BBAC-CFFB1713D382}" type="datetimeFigureOut">
               <a:rPr lang="en-US" smtClean="0"/>
-              <a:t>7/10/2014</a:t>
+              <a:t>7/21/2014</a:t>
             </a:fld>
             <a:endParaRPr lang="en-US"/>
           </a:p>
@@ -905,7 +905,7 @@
                 </a:solidFill>
               </a:rPr>
               <a:pPr/>
-              <a:t>7/10/2014</a:t>
+              <a:t>7/21/2014</a:t>
             </a:fld>
             <a:endParaRPr lang="en-US">
               <a:solidFill>
@@ -1107,7 +1107,7 @@
                 </a:solidFill>
               </a:rPr>
               <a:pPr/>
-              <a:t>7/10/2014</a:t>
+              <a:t>7/21/2014</a:t>
             </a:fld>
             <a:endParaRPr lang="en-US">
               <a:solidFill>
@@ -1385,7 +1385,7 @@
                 </a:solidFill>
               </a:rPr>
               <a:pPr/>
-              <a:t>7/10/2014</a:t>
+              <a:t>7/21/2014</a:t>
             </a:fld>
             <a:endParaRPr lang="en-US">
               <a:solidFill>
@@ -1705,7 +1705,7 @@
                 </a:solidFill>
               </a:rPr>
               <a:pPr/>
-              <a:t>7/10/2014</a:t>
+              <a:t>7/21/2014</a:t>
             </a:fld>
             <a:endParaRPr lang="en-US">
               <a:solidFill>
@@ -2159,7 +2159,7 @@
                 </a:solidFill>
               </a:rPr>
               <a:pPr/>
-              <a:t>7/10/2014</a:t>
+              <a:t>7/21/2014</a:t>
             </a:fld>
             <a:endParaRPr lang="en-US">
               <a:solidFill>
@@ -2309,7 +2309,7 @@
                 </a:solidFill>
               </a:rPr>
               <a:pPr/>
-              <a:t>7/10/2014</a:t>
+              <a:t>7/21/2014</a:t>
             </a:fld>
             <a:endParaRPr lang="en-US">
               <a:solidFill>
@@ -2436,7 +2436,7 @@
                 </a:solidFill>
               </a:rPr>
               <a:pPr/>
-              <a:t>7/10/2014</a:t>
+              <a:t>7/21/2014</a:t>
             </a:fld>
             <a:endParaRPr lang="en-US">
               <a:solidFill>
@@ -2745,7 +2745,7 @@
                 </a:solidFill>
               </a:rPr>
               <a:pPr/>
-              <a:t>7/10/2014</a:t>
+              <a:t>7/21/2014</a:t>
             </a:fld>
             <a:endParaRPr lang="en-US">
               <a:solidFill>
@@ -2940,7 +2940,7 @@
           <a:p>
             <a:fld id="{5EBFDE7A-2F88-4186-BBAC-CFFB1713D382}" type="datetimeFigureOut">
               <a:rPr lang="en-US" smtClean="0"/>
-              <a:t>7/10/2014</a:t>
+              <a:t>7/21/2014</a:t>
             </a:fld>
             <a:endParaRPr lang="en-US"/>
           </a:p>
@@ -3200,7 +3200,7 @@
                 </a:solidFill>
               </a:rPr>
               <a:pPr/>
-              <a:t>7/10/2014</a:t>
+              <a:t>7/21/2014</a:t>
             </a:fld>
             <a:endParaRPr lang="en-US">
               <a:solidFill>
@@ -3402,7 +3402,7 @@
                 </a:solidFill>
               </a:rPr>
               <a:pPr/>
-              <a:t>7/10/2014</a:t>
+              <a:t>7/21/2014</a:t>
             </a:fld>
             <a:endParaRPr lang="en-US">
               <a:solidFill>
@@ -3614,7 +3614,7 @@
                 </a:solidFill>
               </a:rPr>
               <a:pPr/>
-              <a:t>7/10/2014</a:t>
+              <a:t>7/21/2014</a:t>
             </a:fld>
             <a:endParaRPr lang="en-US">
               <a:solidFill>
@@ -3885,7 +3885,7 @@
           <a:p>
             <a:fld id="{5EBFDE7A-2F88-4186-BBAC-CFFB1713D382}" type="datetimeFigureOut">
               <a:rPr lang="en-US" smtClean="0"/>
-              <a:t>7/10/2014</a:t>
+              <a:t>7/21/2014</a:t>
             </a:fld>
             <a:endParaRPr lang="en-US"/>
           </a:p>
@@ -4173,7 +4173,7 @@
           <a:p>
             <a:fld id="{5EBFDE7A-2F88-4186-BBAC-CFFB1713D382}" type="datetimeFigureOut">
               <a:rPr lang="en-US" smtClean="0"/>
-              <a:t>7/10/2014</a:t>
+              <a:t>7/21/2014</a:t>
             </a:fld>
             <a:endParaRPr lang="en-US"/>
           </a:p>
@@ -4595,7 +4595,7 @@
           <a:p>
             <a:fld id="{5EBFDE7A-2F88-4186-BBAC-CFFB1713D382}" type="datetimeFigureOut">
               <a:rPr lang="en-US" smtClean="0"/>
-              <a:t>7/10/2014</a:t>
+              <a:t>7/21/2014</a:t>
             </a:fld>
             <a:endParaRPr lang="en-US"/>
           </a:p>
@@ -4713,7 +4713,7 @@
           <a:p>
             <a:fld id="{5EBFDE7A-2F88-4186-BBAC-CFFB1713D382}" type="datetimeFigureOut">
               <a:rPr lang="en-US" smtClean="0"/>
-              <a:t>7/10/2014</a:t>
+              <a:t>7/21/2014</a:t>
             </a:fld>
             <a:endParaRPr lang="en-US"/>
           </a:p>
@@ -4808,7 +4808,7 @@
           <a:p>
             <a:fld id="{5EBFDE7A-2F88-4186-BBAC-CFFB1713D382}" type="datetimeFigureOut">
               <a:rPr lang="en-US" smtClean="0"/>
-              <a:t>7/10/2014</a:t>
+              <a:t>7/21/2014</a:t>
             </a:fld>
             <a:endParaRPr lang="en-US"/>
           </a:p>
@@ -5085,7 +5085,7 @@
           <a:p>
             <a:fld id="{5EBFDE7A-2F88-4186-BBAC-CFFB1713D382}" type="datetimeFigureOut">
               <a:rPr lang="en-US" smtClean="0"/>
-              <a:t>7/10/2014</a:t>
+              <a:t>7/21/2014</a:t>
             </a:fld>
             <a:endParaRPr lang="en-US"/>
           </a:p>
@@ -5338,7 +5338,7 @@
           <a:p>
             <a:fld id="{5EBFDE7A-2F88-4186-BBAC-CFFB1713D382}" type="datetimeFigureOut">
               <a:rPr lang="en-US" smtClean="0"/>
-              <a:t>7/10/2014</a:t>
+              <a:t>7/21/2014</a:t>
             </a:fld>
             <a:endParaRPr lang="en-US"/>
           </a:p>
@@ -5551,7 +5551,7 @@
           <a:p>
             <a:fld id="{5EBFDE7A-2F88-4186-BBAC-CFFB1713D382}" type="datetimeFigureOut">
               <a:rPr lang="en-US" smtClean="0"/>
-              <a:t>7/10/2014</a:t>
+              <a:t>7/21/2014</a:t>
             </a:fld>
             <a:endParaRPr lang="en-US"/>
           </a:p>
@@ -6068,7 +6068,7 @@
                 </a:solidFill>
               </a:rPr>
               <a:pPr/>
-              <a:t>7/10/2014</a:t>
+              <a:t>7/21/2014</a:t>
             </a:fld>
             <a:endParaRPr lang="en-US" smtClean="0">
               <a:solidFill>
@@ -7943,6 +7943,207 @@
           </a:p>
         </p:txBody>
       </p:sp>
+      <p:grpSp>
+        <p:nvGrpSpPr>
+          <p:cNvPr id="42" name="Group 41"/>
+          <p:cNvGrpSpPr/>
+          <p:nvPr/>
+        </p:nvGrpSpPr>
+        <p:grpSpPr>
+          <a:xfrm>
+            <a:off x="415391" y="1856290"/>
+            <a:ext cx="904788" cy="876915"/>
+            <a:chOff x="547818" y="2590800"/>
+            <a:chExt cx="904788" cy="876915"/>
+          </a:xfrm>
+        </p:grpSpPr>
+        <p:sp>
+          <p:nvSpPr>
+            <p:cNvPr id="37" name="Flowchart: Connector 36"/>
+            <p:cNvSpPr/>
+            <p:nvPr/>
+          </p:nvSpPr>
+          <p:spPr>
+            <a:xfrm>
+              <a:off x="547818" y="2590800"/>
+              <a:ext cx="904788" cy="876915"/>
+            </a:xfrm>
+            <a:prstGeom prst="flowChartConnector">
+              <a:avLst/>
+            </a:prstGeom>
+            <a:solidFill>
+              <a:srgbClr val="FF9400"/>
+            </a:solidFill>
+            <a:ln w="19050">
+              <a:solidFill>
+                <a:schemeClr val="bg1"/>
+              </a:solidFill>
+            </a:ln>
+          </p:spPr>
+          <p:style>
+            <a:lnRef idx="2">
+              <a:schemeClr val="accent6">
+                <a:shade val="50000"/>
+              </a:schemeClr>
+            </a:lnRef>
+            <a:fillRef idx="1">
+              <a:schemeClr val="accent6"/>
+            </a:fillRef>
+            <a:effectRef idx="0">
+              <a:schemeClr val="accent6"/>
+            </a:effectRef>
+            <a:fontRef idx="minor">
+              <a:schemeClr val="lt1"/>
+            </a:fontRef>
+          </p:style>
+          <p:txBody>
+            <a:bodyPr rtlCol="0" anchor="ctr"/>
+            <a:lstStyle/>
+            <a:p>
+              <a:pPr algn="ctr"/>
+              <a:endParaRPr lang="en-US"/>
+            </a:p>
+          </p:txBody>
+        </p:sp>
+        <p:sp>
+          <p:nvSpPr>
+            <p:cNvPr id="30" name="Sun 29"/>
+            <p:cNvSpPr/>
+            <p:nvPr/>
+          </p:nvSpPr>
+          <p:spPr>
+            <a:xfrm>
+              <a:off x="678286" y="2810646"/>
+              <a:ext cx="647738" cy="568809"/>
+            </a:xfrm>
+            <a:prstGeom prst="sun">
+              <a:avLst/>
+            </a:prstGeom>
+            <a:solidFill>
+              <a:schemeClr val="bg1"/>
+            </a:solidFill>
+            <a:ln>
+              <a:noFill/>
+            </a:ln>
+          </p:spPr>
+          <p:style>
+            <a:lnRef idx="2">
+              <a:schemeClr val="accent1">
+                <a:shade val="50000"/>
+              </a:schemeClr>
+            </a:lnRef>
+            <a:fillRef idx="1">
+              <a:schemeClr val="accent1"/>
+            </a:fillRef>
+            <a:effectRef idx="0">
+              <a:schemeClr val="accent1"/>
+            </a:effectRef>
+            <a:fontRef idx="minor">
+              <a:schemeClr val="lt1"/>
+            </a:fontRef>
+          </p:style>
+          <p:txBody>
+            <a:bodyPr rtlCol="0" anchor="ctr"/>
+            <a:lstStyle/>
+            <a:p>
+              <a:pPr algn="ctr"/>
+              <a:endParaRPr lang="en-US"/>
+            </a:p>
+          </p:txBody>
+        </p:sp>
+        <p:sp>
+          <p:nvSpPr>
+            <p:cNvPr id="40" name="Rectangle 39"/>
+            <p:cNvSpPr/>
+            <p:nvPr/>
+          </p:nvSpPr>
+          <p:spPr>
+            <a:xfrm>
+              <a:off x="746255" y="3146889"/>
+              <a:ext cx="507914" cy="173080"/>
+            </a:xfrm>
+            <a:prstGeom prst="rect">
+              <a:avLst/>
+            </a:prstGeom>
+            <a:solidFill>
+              <a:srgbClr val="FF9400"/>
+            </a:solidFill>
+            <a:ln>
+              <a:noFill/>
+            </a:ln>
+          </p:spPr>
+          <p:style>
+            <a:lnRef idx="2">
+              <a:schemeClr val="accent1">
+                <a:shade val="50000"/>
+              </a:schemeClr>
+            </a:lnRef>
+            <a:fillRef idx="1">
+              <a:schemeClr val="accent1"/>
+            </a:fillRef>
+            <a:effectRef idx="0">
+              <a:schemeClr val="accent1"/>
+            </a:effectRef>
+            <a:fontRef idx="minor">
+              <a:schemeClr val="lt1"/>
+            </a:fontRef>
+          </p:style>
+          <p:txBody>
+            <a:bodyPr rtlCol="0" anchor="ctr"/>
+            <a:lstStyle/>
+            <a:p>
+              <a:pPr algn="ctr"/>
+              <a:endParaRPr lang="en-US"/>
+            </a:p>
+          </p:txBody>
+        </p:sp>
+        <p:sp>
+          <p:nvSpPr>
+            <p:cNvPr id="41" name="Rectangle 40"/>
+            <p:cNvSpPr/>
+            <p:nvPr/>
+          </p:nvSpPr>
+          <p:spPr>
+            <a:xfrm>
+              <a:off x="914400" y="3255920"/>
+              <a:ext cx="168145" cy="173080"/>
+            </a:xfrm>
+            <a:prstGeom prst="rect">
+              <a:avLst/>
+            </a:prstGeom>
+            <a:solidFill>
+              <a:srgbClr val="FF9400"/>
+            </a:solidFill>
+            <a:ln>
+              <a:noFill/>
+            </a:ln>
+          </p:spPr>
+          <p:style>
+            <a:lnRef idx="2">
+              <a:schemeClr val="accent1">
+                <a:shade val="50000"/>
+              </a:schemeClr>
+            </a:lnRef>
+            <a:fillRef idx="1">
+              <a:schemeClr val="accent1"/>
+            </a:fillRef>
+            <a:effectRef idx="0">
+              <a:schemeClr val="accent1"/>
+            </a:effectRef>
+            <a:fontRef idx="minor">
+              <a:schemeClr val="lt1"/>
+            </a:fontRef>
+          </p:style>
+          <p:txBody>
+            <a:bodyPr rtlCol="0" anchor="ctr"/>
+            <a:lstStyle/>
+            <a:p>
+              <a:pPr algn="ctr"/>
+              <a:endParaRPr lang="en-US"/>
+            </a:p>
+          </p:txBody>
+        </p:sp>
+      </p:grpSp>
     </p:spTree>
     <p:extLst>
       <p:ext uri="{BB962C8B-B14F-4D97-AF65-F5344CB8AC3E}">

</xml_diff>

<commit_message>
updated icon with windows 8 feel started work on defaults manager in IDE.  query and remove probably working
</commit_message>
<xml_diff>
--- a/resource/samnt.pptx
+++ b/resource/samnt.pptx
@@ -7,7 +7,8 @@
   </p:sldMasterIdLst>
   <p:sldIdLst>
     <p:sldId id="256" r:id="rId3"/>
-    <p:sldId id="257" r:id="rId4"/>
+    <p:sldId id="258" r:id="rId4"/>
+    <p:sldId id="257" r:id="rId5"/>
   </p:sldIdLst>
   <p:sldSz cx="9144000" cy="6858000" type="screen4x3"/>
   <p:notesSz cx="6858000" cy="9144000"/>
@@ -306,7 +307,7 @@
           <a:p>
             <a:fld id="{5EBFDE7A-2F88-4186-BBAC-CFFB1713D382}" type="datetimeFigureOut">
               <a:rPr lang="en-US" smtClean="0"/>
-              <a:t>7/21/2014</a:t>
+              <a:t>8/8/2014</a:t>
             </a:fld>
             <a:endParaRPr lang="en-US"/>
           </a:p>
@@ -476,7 +477,7 @@
           <a:p>
             <a:fld id="{5EBFDE7A-2F88-4186-BBAC-CFFB1713D382}" type="datetimeFigureOut">
               <a:rPr lang="en-US" smtClean="0"/>
-              <a:t>7/21/2014</a:t>
+              <a:t>8/8/2014</a:t>
             </a:fld>
             <a:endParaRPr lang="en-US"/>
           </a:p>
@@ -656,7 +657,7 @@
           <a:p>
             <a:fld id="{5EBFDE7A-2F88-4186-BBAC-CFFB1713D382}" type="datetimeFigureOut">
               <a:rPr lang="en-US" smtClean="0"/>
-              <a:t>7/21/2014</a:t>
+              <a:t>8/8/2014</a:t>
             </a:fld>
             <a:endParaRPr lang="en-US"/>
           </a:p>
@@ -905,7 +906,7 @@
                 </a:solidFill>
               </a:rPr>
               <a:pPr/>
-              <a:t>7/21/2014</a:t>
+              <a:t>8/8/2014</a:t>
             </a:fld>
             <a:endParaRPr lang="en-US">
               <a:solidFill>
@@ -1107,7 +1108,7 @@
                 </a:solidFill>
               </a:rPr>
               <a:pPr/>
-              <a:t>7/21/2014</a:t>
+              <a:t>8/8/2014</a:t>
             </a:fld>
             <a:endParaRPr lang="en-US">
               <a:solidFill>
@@ -1385,7 +1386,7 @@
                 </a:solidFill>
               </a:rPr>
               <a:pPr/>
-              <a:t>7/21/2014</a:t>
+              <a:t>8/8/2014</a:t>
             </a:fld>
             <a:endParaRPr lang="en-US">
               <a:solidFill>
@@ -1705,7 +1706,7 @@
                 </a:solidFill>
               </a:rPr>
               <a:pPr/>
-              <a:t>7/21/2014</a:t>
+              <a:t>8/8/2014</a:t>
             </a:fld>
             <a:endParaRPr lang="en-US">
               <a:solidFill>
@@ -2159,7 +2160,7 @@
                 </a:solidFill>
               </a:rPr>
               <a:pPr/>
-              <a:t>7/21/2014</a:t>
+              <a:t>8/8/2014</a:t>
             </a:fld>
             <a:endParaRPr lang="en-US">
               <a:solidFill>
@@ -2309,7 +2310,7 @@
                 </a:solidFill>
               </a:rPr>
               <a:pPr/>
-              <a:t>7/21/2014</a:t>
+              <a:t>8/8/2014</a:t>
             </a:fld>
             <a:endParaRPr lang="en-US">
               <a:solidFill>
@@ -2436,7 +2437,7 @@
                 </a:solidFill>
               </a:rPr>
               <a:pPr/>
-              <a:t>7/21/2014</a:t>
+              <a:t>8/8/2014</a:t>
             </a:fld>
             <a:endParaRPr lang="en-US">
               <a:solidFill>
@@ -2745,7 +2746,7 @@
                 </a:solidFill>
               </a:rPr>
               <a:pPr/>
-              <a:t>7/21/2014</a:t>
+              <a:t>8/8/2014</a:t>
             </a:fld>
             <a:endParaRPr lang="en-US">
               <a:solidFill>
@@ -2940,7 +2941,7 @@
           <a:p>
             <a:fld id="{5EBFDE7A-2F88-4186-BBAC-CFFB1713D382}" type="datetimeFigureOut">
               <a:rPr lang="en-US" smtClean="0"/>
-              <a:t>7/21/2014</a:t>
+              <a:t>8/8/2014</a:t>
             </a:fld>
             <a:endParaRPr lang="en-US"/>
           </a:p>
@@ -3200,7 +3201,7 @@
                 </a:solidFill>
               </a:rPr>
               <a:pPr/>
-              <a:t>7/21/2014</a:t>
+              <a:t>8/8/2014</a:t>
             </a:fld>
             <a:endParaRPr lang="en-US">
               <a:solidFill>
@@ -3402,7 +3403,7 @@
                 </a:solidFill>
               </a:rPr>
               <a:pPr/>
-              <a:t>7/21/2014</a:t>
+              <a:t>8/8/2014</a:t>
             </a:fld>
             <a:endParaRPr lang="en-US">
               <a:solidFill>
@@ -3614,7 +3615,7 @@
                 </a:solidFill>
               </a:rPr>
               <a:pPr/>
-              <a:t>7/21/2014</a:t>
+              <a:t>8/8/2014</a:t>
             </a:fld>
             <a:endParaRPr lang="en-US">
               <a:solidFill>
@@ -3885,7 +3886,7 @@
           <a:p>
             <a:fld id="{5EBFDE7A-2F88-4186-BBAC-CFFB1713D382}" type="datetimeFigureOut">
               <a:rPr lang="en-US" smtClean="0"/>
-              <a:t>7/21/2014</a:t>
+              <a:t>8/8/2014</a:t>
             </a:fld>
             <a:endParaRPr lang="en-US"/>
           </a:p>
@@ -4173,7 +4174,7 @@
           <a:p>
             <a:fld id="{5EBFDE7A-2F88-4186-BBAC-CFFB1713D382}" type="datetimeFigureOut">
               <a:rPr lang="en-US" smtClean="0"/>
-              <a:t>7/21/2014</a:t>
+              <a:t>8/8/2014</a:t>
             </a:fld>
             <a:endParaRPr lang="en-US"/>
           </a:p>
@@ -4595,7 +4596,7 @@
           <a:p>
             <a:fld id="{5EBFDE7A-2F88-4186-BBAC-CFFB1713D382}" type="datetimeFigureOut">
               <a:rPr lang="en-US" smtClean="0"/>
-              <a:t>7/21/2014</a:t>
+              <a:t>8/8/2014</a:t>
             </a:fld>
             <a:endParaRPr lang="en-US"/>
           </a:p>
@@ -4713,7 +4714,7 @@
           <a:p>
             <a:fld id="{5EBFDE7A-2F88-4186-BBAC-CFFB1713D382}" type="datetimeFigureOut">
               <a:rPr lang="en-US" smtClean="0"/>
-              <a:t>7/21/2014</a:t>
+              <a:t>8/8/2014</a:t>
             </a:fld>
             <a:endParaRPr lang="en-US"/>
           </a:p>
@@ -4808,7 +4809,7 @@
           <a:p>
             <a:fld id="{5EBFDE7A-2F88-4186-BBAC-CFFB1713D382}" type="datetimeFigureOut">
               <a:rPr lang="en-US" smtClean="0"/>
-              <a:t>7/21/2014</a:t>
+              <a:t>8/8/2014</a:t>
             </a:fld>
             <a:endParaRPr lang="en-US"/>
           </a:p>
@@ -5085,7 +5086,7 @@
           <a:p>
             <a:fld id="{5EBFDE7A-2F88-4186-BBAC-CFFB1713D382}" type="datetimeFigureOut">
               <a:rPr lang="en-US" smtClean="0"/>
-              <a:t>7/21/2014</a:t>
+              <a:t>8/8/2014</a:t>
             </a:fld>
             <a:endParaRPr lang="en-US"/>
           </a:p>
@@ -5338,7 +5339,7 @@
           <a:p>
             <a:fld id="{5EBFDE7A-2F88-4186-BBAC-CFFB1713D382}" type="datetimeFigureOut">
               <a:rPr lang="en-US" smtClean="0"/>
-              <a:t>7/21/2014</a:t>
+              <a:t>8/8/2014</a:t>
             </a:fld>
             <a:endParaRPr lang="en-US"/>
           </a:p>
@@ -5551,7 +5552,7 @@
           <a:p>
             <a:fld id="{5EBFDE7A-2F88-4186-BBAC-CFFB1713D382}" type="datetimeFigureOut">
               <a:rPr lang="en-US" smtClean="0"/>
-              <a:t>7/21/2014</a:t>
+              <a:t>8/8/2014</a:t>
             </a:fld>
             <a:endParaRPr lang="en-US"/>
           </a:p>
@@ -6068,7 +6069,7 @@
                 </a:solidFill>
               </a:rPr>
               <a:pPr/>
-              <a:t>7/21/2014</a:t>
+              <a:t>8/8/2014</a:t>
             </a:fld>
             <a:endParaRPr lang="en-US" smtClean="0">
               <a:solidFill>
@@ -8144,6 +8145,146 @@
           </p:txBody>
         </p:sp>
       </p:grpSp>
+      <p:sp>
+        <p:nvSpPr>
+          <p:cNvPr id="32" name="Rectangle 31"/>
+          <p:cNvSpPr/>
+          <p:nvPr/>
+        </p:nvSpPr>
+        <p:spPr>
+          <a:xfrm>
+            <a:off x="1702740" y="1524000"/>
+            <a:ext cx="1371600" cy="1371600"/>
+          </a:xfrm>
+          <a:prstGeom prst="rect">
+            <a:avLst/>
+          </a:prstGeom>
+          <a:solidFill>
+            <a:srgbClr val="263A60"/>
+          </a:solidFill>
+          <a:ln>
+            <a:noFill/>
+          </a:ln>
+        </p:spPr>
+        <p:style>
+          <a:lnRef idx="2">
+            <a:schemeClr val="accent1">
+              <a:shade val="50000"/>
+            </a:schemeClr>
+          </a:lnRef>
+          <a:fillRef idx="1">
+            <a:schemeClr val="accent1"/>
+          </a:fillRef>
+          <a:effectRef idx="0">
+            <a:schemeClr val="accent1"/>
+          </a:effectRef>
+          <a:fontRef idx="minor">
+            <a:schemeClr val="lt1"/>
+          </a:fontRef>
+        </p:style>
+        <p:txBody>
+          <a:bodyPr rtlCol="0" anchor="ctr"/>
+          <a:lstStyle/>
+          <a:p>
+            <a:pPr algn="ctr"/>
+            <a:endParaRPr lang="en-US"/>
+          </a:p>
+        </p:txBody>
+      </p:sp>
+      <p:sp>
+        <p:nvSpPr>
+          <p:cNvPr id="43" name="Flowchart: Connector 42"/>
+          <p:cNvSpPr/>
+          <p:nvPr/>
+        </p:nvSpPr>
+        <p:spPr>
+          <a:xfrm>
+            <a:off x="2317200" y="293760"/>
+            <a:ext cx="457200" cy="457200"/>
+          </a:xfrm>
+          <a:prstGeom prst="flowChartConnector">
+            <a:avLst/>
+          </a:prstGeom>
+          <a:solidFill>
+            <a:schemeClr val="bg1"/>
+          </a:solidFill>
+          <a:ln w="19050">
+            <a:solidFill>
+              <a:schemeClr val="bg1"/>
+            </a:solidFill>
+          </a:ln>
+        </p:spPr>
+        <p:style>
+          <a:lnRef idx="2">
+            <a:schemeClr val="accent6">
+              <a:shade val="50000"/>
+            </a:schemeClr>
+          </a:lnRef>
+          <a:fillRef idx="1">
+            <a:schemeClr val="accent6"/>
+          </a:fillRef>
+          <a:effectRef idx="0">
+            <a:schemeClr val="accent6"/>
+          </a:effectRef>
+          <a:fontRef idx="minor">
+            <a:schemeClr val="lt1"/>
+          </a:fontRef>
+        </p:style>
+        <p:txBody>
+          <a:bodyPr rtlCol="0" anchor="ctr"/>
+          <a:lstStyle/>
+          <a:p>
+            <a:pPr algn="ctr"/>
+            <a:endParaRPr lang="en-US"/>
+          </a:p>
+        </p:txBody>
+      </p:sp>
+      <p:sp>
+        <p:nvSpPr>
+          <p:cNvPr id="38" name="Sun 37"/>
+          <p:cNvSpPr/>
+          <p:nvPr/>
+        </p:nvSpPr>
+        <p:spPr>
+          <a:xfrm>
+            <a:off x="1926600" y="1767000"/>
+            <a:ext cx="914400" cy="916060"/>
+          </a:xfrm>
+          <a:prstGeom prst="sun">
+            <a:avLst/>
+          </a:prstGeom>
+          <a:solidFill>
+            <a:schemeClr val="bg1"/>
+          </a:solidFill>
+          <a:ln>
+            <a:noFill/>
+          </a:ln>
+        </p:spPr>
+        <p:style>
+          <a:lnRef idx="2">
+            <a:schemeClr val="accent1">
+              <a:shade val="50000"/>
+            </a:schemeClr>
+          </a:lnRef>
+          <a:fillRef idx="1">
+            <a:schemeClr val="accent1"/>
+          </a:fillRef>
+          <a:effectRef idx="0">
+            <a:schemeClr val="accent1"/>
+          </a:effectRef>
+          <a:fontRef idx="minor">
+            <a:schemeClr val="lt1"/>
+          </a:fontRef>
+        </p:style>
+        <p:txBody>
+          <a:bodyPr rtlCol="0" anchor="ctr"/>
+          <a:lstStyle/>
+          <a:p>
+            <a:pPr algn="ctr"/>
+            <a:endParaRPr lang="en-US"/>
+          </a:p>
+        </p:txBody>
+      </p:sp>
     </p:spTree>
     <p:extLst>
       <p:ext uri="{BB962C8B-B14F-4D97-AF65-F5344CB8AC3E}">
@@ -8158,6 +8299,128 @@
 </file>
 
 <file path=ppt/slides/slide2.xml><?xml version="1.0" encoding="utf-8"?>
+<p:sld xmlns:a="http://schemas.openxmlformats.org/drawingml/2006/main" xmlns:r="http://schemas.openxmlformats.org/officeDocument/2006/relationships" xmlns:p="http://schemas.openxmlformats.org/presentationml/2006/main">
+  <p:cSld>
+    <p:spTree>
+      <p:nvGrpSpPr>
+        <p:cNvPr id="1" name=""/>
+        <p:cNvGrpSpPr/>
+        <p:nvPr/>
+      </p:nvGrpSpPr>
+      <p:grpSpPr>
+        <a:xfrm>
+          <a:off x="0" y="0"/>
+          <a:ext cx="0" cy="0"/>
+          <a:chOff x="0" y="0"/>
+          <a:chExt cx="0" cy="0"/>
+        </a:xfrm>
+      </p:grpSpPr>
+      <p:sp>
+        <p:nvSpPr>
+          <p:cNvPr id="4" name="Rectangle 3"/>
+          <p:cNvSpPr/>
+          <p:nvPr/>
+        </p:nvSpPr>
+        <p:spPr>
+          <a:xfrm>
+            <a:off x="1702740" y="1524000"/>
+            <a:ext cx="1371600" cy="1371600"/>
+          </a:xfrm>
+          <a:prstGeom prst="rect">
+            <a:avLst/>
+          </a:prstGeom>
+          <a:solidFill>
+            <a:srgbClr val="263A60"/>
+          </a:solidFill>
+          <a:ln>
+            <a:noFill/>
+          </a:ln>
+        </p:spPr>
+        <p:style>
+          <a:lnRef idx="2">
+            <a:schemeClr val="accent1">
+              <a:shade val="50000"/>
+            </a:schemeClr>
+          </a:lnRef>
+          <a:fillRef idx="1">
+            <a:schemeClr val="accent1"/>
+          </a:fillRef>
+          <a:effectRef idx="0">
+            <a:schemeClr val="accent1"/>
+          </a:effectRef>
+          <a:fontRef idx="minor">
+            <a:schemeClr val="lt1"/>
+          </a:fontRef>
+        </p:style>
+        <p:txBody>
+          <a:bodyPr rtlCol="0" anchor="ctr"/>
+          <a:lstStyle/>
+          <a:p>
+            <a:pPr algn="ctr"/>
+            <a:endParaRPr lang="en-US"/>
+          </a:p>
+        </p:txBody>
+      </p:sp>
+      <p:sp>
+        <p:nvSpPr>
+          <p:cNvPr id="5" name="Sun 4"/>
+          <p:cNvSpPr/>
+          <p:nvPr/>
+        </p:nvSpPr>
+        <p:spPr>
+          <a:xfrm>
+            <a:off x="1926600" y="1767000"/>
+            <a:ext cx="914400" cy="916060"/>
+          </a:xfrm>
+          <a:prstGeom prst="sun">
+            <a:avLst/>
+          </a:prstGeom>
+          <a:solidFill>
+            <a:schemeClr val="bg1"/>
+          </a:solidFill>
+          <a:ln>
+            <a:noFill/>
+          </a:ln>
+        </p:spPr>
+        <p:style>
+          <a:lnRef idx="2">
+            <a:schemeClr val="accent1">
+              <a:shade val="50000"/>
+            </a:schemeClr>
+          </a:lnRef>
+          <a:fillRef idx="1">
+            <a:schemeClr val="accent1"/>
+          </a:fillRef>
+          <a:effectRef idx="0">
+            <a:schemeClr val="accent1"/>
+          </a:effectRef>
+          <a:fontRef idx="minor">
+            <a:schemeClr val="lt1"/>
+          </a:fontRef>
+        </p:style>
+        <p:txBody>
+          <a:bodyPr rtlCol="0" anchor="ctr"/>
+          <a:lstStyle/>
+          <a:p>
+            <a:pPr algn="ctr"/>
+            <a:endParaRPr lang="en-US"/>
+          </a:p>
+        </p:txBody>
+      </p:sp>
+    </p:spTree>
+    <p:extLst>
+      <p:ext uri="{BB962C8B-B14F-4D97-AF65-F5344CB8AC3E}">
+        <p14:creationId xmlns:p14="http://schemas.microsoft.com/office/powerpoint/2010/main" val="133864698"/>
+      </p:ext>
+    </p:extLst>
+  </p:cSld>
+  <p:clrMapOvr>
+    <a:masterClrMapping/>
+  </p:clrMapOvr>
+</p:sld>
+</file>
+
+<file path=ppt/slides/slide3.xml><?xml version="1.0" encoding="utf-8"?>
 <p:sld xmlns:a="http://schemas.openxmlformats.org/drawingml/2006/main" xmlns:r="http://schemas.openxmlformats.org/officeDocument/2006/relationships" xmlns:p="http://schemas.openxmlformats.org/presentationml/2006/main">
   <p:cSld>
     <p:bg>

</xml_diff>

<commit_message>
add 256px icon for YouTube
</commit_message>
<xml_diff>
--- a/resource/samnt.pptx
+++ b/resource/samnt.pptx
@@ -8,7 +8,8 @@
   <p:sldIdLst>
     <p:sldId id="256" r:id="rId3"/>
     <p:sldId id="258" r:id="rId4"/>
-    <p:sldId id="257" r:id="rId5"/>
+    <p:sldId id="259" r:id="rId5"/>
+    <p:sldId id="257" r:id="rId6"/>
   </p:sldIdLst>
   <p:sldSz cx="9144000" cy="6858000" type="screen4x3"/>
   <p:notesSz cx="6858000" cy="9144000"/>
@@ -109,7 +110,7 @@
   </p:defaultTextStyle>
   <p:extLst>
     <p:ext uri="{EFAFB233-063F-42B5-8137-9DF3F51BA10A}">
-      <p15:sldGuideLst xmlns:p15="http://schemas.microsoft.com/office/powerpoint/2012/main" xmlns="">
+      <p15:sldGuideLst xmlns="" xmlns:p15="http://schemas.microsoft.com/office/powerpoint/2012/main">
         <p15:guide id="1" orient="horz" pos="2160">
           <p15:clr>
             <a:srgbClr val="A4A3A4"/>
@@ -307,7 +308,7 @@
           <a:p>
             <a:fld id="{5EBFDE7A-2F88-4186-BBAC-CFFB1713D382}" type="datetimeFigureOut">
               <a:rPr lang="en-US" smtClean="0"/>
-              <a:t>8/8/2014</a:t>
+              <a:t>11/25/2014</a:t>
             </a:fld>
             <a:endParaRPr lang="en-US"/>
           </a:p>
@@ -477,7 +478,7 @@
           <a:p>
             <a:fld id="{5EBFDE7A-2F88-4186-BBAC-CFFB1713D382}" type="datetimeFigureOut">
               <a:rPr lang="en-US" smtClean="0"/>
-              <a:t>8/8/2014</a:t>
+              <a:t>11/25/2014</a:t>
             </a:fld>
             <a:endParaRPr lang="en-US"/>
           </a:p>
@@ -657,7 +658,7 @@
           <a:p>
             <a:fld id="{5EBFDE7A-2F88-4186-BBAC-CFFB1713D382}" type="datetimeFigureOut">
               <a:rPr lang="en-US" smtClean="0"/>
-              <a:t>8/8/2014</a:t>
+              <a:t>11/25/2014</a:t>
             </a:fld>
             <a:endParaRPr lang="en-US"/>
           </a:p>
@@ -906,7 +907,7 @@
                 </a:solidFill>
               </a:rPr>
               <a:pPr/>
-              <a:t>8/8/2014</a:t>
+              <a:t>11/25/2014</a:t>
             </a:fld>
             <a:endParaRPr lang="en-US">
               <a:solidFill>
@@ -1108,7 +1109,7 @@
                 </a:solidFill>
               </a:rPr>
               <a:pPr/>
-              <a:t>8/8/2014</a:t>
+              <a:t>11/25/2014</a:t>
             </a:fld>
             <a:endParaRPr lang="en-US">
               <a:solidFill>
@@ -1386,7 +1387,7 @@
                 </a:solidFill>
               </a:rPr>
               <a:pPr/>
-              <a:t>8/8/2014</a:t>
+              <a:t>11/25/2014</a:t>
             </a:fld>
             <a:endParaRPr lang="en-US">
               <a:solidFill>
@@ -1706,7 +1707,7 @@
                 </a:solidFill>
               </a:rPr>
               <a:pPr/>
-              <a:t>8/8/2014</a:t>
+              <a:t>11/25/2014</a:t>
             </a:fld>
             <a:endParaRPr lang="en-US">
               <a:solidFill>
@@ -2160,7 +2161,7 @@
                 </a:solidFill>
               </a:rPr>
               <a:pPr/>
-              <a:t>8/8/2014</a:t>
+              <a:t>11/25/2014</a:t>
             </a:fld>
             <a:endParaRPr lang="en-US">
               <a:solidFill>
@@ -2310,7 +2311,7 @@
                 </a:solidFill>
               </a:rPr>
               <a:pPr/>
-              <a:t>8/8/2014</a:t>
+              <a:t>11/25/2014</a:t>
             </a:fld>
             <a:endParaRPr lang="en-US">
               <a:solidFill>
@@ -2437,7 +2438,7 @@
                 </a:solidFill>
               </a:rPr>
               <a:pPr/>
-              <a:t>8/8/2014</a:t>
+              <a:t>11/25/2014</a:t>
             </a:fld>
             <a:endParaRPr lang="en-US">
               <a:solidFill>
@@ -2746,7 +2747,7 @@
                 </a:solidFill>
               </a:rPr>
               <a:pPr/>
-              <a:t>8/8/2014</a:t>
+              <a:t>11/25/2014</a:t>
             </a:fld>
             <a:endParaRPr lang="en-US">
               <a:solidFill>
@@ -2941,7 +2942,7 @@
           <a:p>
             <a:fld id="{5EBFDE7A-2F88-4186-BBAC-CFFB1713D382}" type="datetimeFigureOut">
               <a:rPr lang="en-US" smtClean="0"/>
-              <a:t>8/8/2014</a:t>
+              <a:t>11/25/2014</a:t>
             </a:fld>
             <a:endParaRPr lang="en-US"/>
           </a:p>
@@ -3201,7 +3202,7 @@
                 </a:solidFill>
               </a:rPr>
               <a:pPr/>
-              <a:t>8/8/2014</a:t>
+              <a:t>11/25/2014</a:t>
             </a:fld>
             <a:endParaRPr lang="en-US">
               <a:solidFill>
@@ -3403,7 +3404,7 @@
                 </a:solidFill>
               </a:rPr>
               <a:pPr/>
-              <a:t>8/8/2014</a:t>
+              <a:t>11/25/2014</a:t>
             </a:fld>
             <a:endParaRPr lang="en-US">
               <a:solidFill>
@@ -3615,7 +3616,7 @@
                 </a:solidFill>
               </a:rPr>
               <a:pPr/>
-              <a:t>8/8/2014</a:t>
+              <a:t>11/25/2014</a:t>
             </a:fld>
             <a:endParaRPr lang="en-US">
               <a:solidFill>
@@ -3886,7 +3887,7 @@
           <a:p>
             <a:fld id="{5EBFDE7A-2F88-4186-BBAC-CFFB1713D382}" type="datetimeFigureOut">
               <a:rPr lang="en-US" smtClean="0"/>
-              <a:t>8/8/2014</a:t>
+              <a:t>11/25/2014</a:t>
             </a:fld>
             <a:endParaRPr lang="en-US"/>
           </a:p>
@@ -4174,7 +4175,7 @@
           <a:p>
             <a:fld id="{5EBFDE7A-2F88-4186-BBAC-CFFB1713D382}" type="datetimeFigureOut">
               <a:rPr lang="en-US" smtClean="0"/>
-              <a:t>8/8/2014</a:t>
+              <a:t>11/25/2014</a:t>
             </a:fld>
             <a:endParaRPr lang="en-US"/>
           </a:p>
@@ -4596,7 +4597,7 @@
           <a:p>
             <a:fld id="{5EBFDE7A-2F88-4186-BBAC-CFFB1713D382}" type="datetimeFigureOut">
               <a:rPr lang="en-US" smtClean="0"/>
-              <a:t>8/8/2014</a:t>
+              <a:t>11/25/2014</a:t>
             </a:fld>
             <a:endParaRPr lang="en-US"/>
           </a:p>
@@ -4714,7 +4715,7 @@
           <a:p>
             <a:fld id="{5EBFDE7A-2F88-4186-BBAC-CFFB1713D382}" type="datetimeFigureOut">
               <a:rPr lang="en-US" smtClean="0"/>
-              <a:t>8/8/2014</a:t>
+              <a:t>11/25/2014</a:t>
             </a:fld>
             <a:endParaRPr lang="en-US"/>
           </a:p>
@@ -4809,7 +4810,7 @@
           <a:p>
             <a:fld id="{5EBFDE7A-2F88-4186-BBAC-CFFB1713D382}" type="datetimeFigureOut">
               <a:rPr lang="en-US" smtClean="0"/>
-              <a:t>8/8/2014</a:t>
+              <a:t>11/25/2014</a:t>
             </a:fld>
             <a:endParaRPr lang="en-US"/>
           </a:p>
@@ -5086,7 +5087,7 @@
           <a:p>
             <a:fld id="{5EBFDE7A-2F88-4186-BBAC-CFFB1713D382}" type="datetimeFigureOut">
               <a:rPr lang="en-US" smtClean="0"/>
-              <a:t>8/8/2014</a:t>
+              <a:t>11/25/2014</a:t>
             </a:fld>
             <a:endParaRPr lang="en-US"/>
           </a:p>
@@ -5339,7 +5340,7 @@
           <a:p>
             <a:fld id="{5EBFDE7A-2F88-4186-BBAC-CFFB1713D382}" type="datetimeFigureOut">
               <a:rPr lang="en-US" smtClean="0"/>
-              <a:t>8/8/2014</a:t>
+              <a:t>11/25/2014</a:t>
             </a:fld>
             <a:endParaRPr lang="en-US"/>
           </a:p>
@@ -5552,7 +5553,7 @@
           <a:p>
             <a:fld id="{5EBFDE7A-2F88-4186-BBAC-CFFB1713D382}" type="datetimeFigureOut">
               <a:rPr lang="en-US" smtClean="0"/>
-              <a:t>8/8/2014</a:t>
+              <a:t>11/25/2014</a:t>
             </a:fld>
             <a:endParaRPr lang="en-US"/>
           </a:p>
@@ -6069,7 +6070,7 @@
                 </a:solidFill>
               </a:rPr>
               <a:pPr/>
-              <a:t>8/8/2014</a:t>
+              <a:t>11/25/2014</a:t>
             </a:fld>
             <a:endParaRPr lang="en-US" smtClean="0">
               <a:solidFill>
@@ -8421,6 +8422,162 @@
 </file>
 
 <file path=ppt/slides/slide3.xml><?xml version="1.0" encoding="utf-8"?>
+<p:sld xmlns:a="http://schemas.openxmlformats.org/drawingml/2006/main" xmlns:r="http://schemas.openxmlformats.org/officeDocument/2006/relationships" xmlns:p="http://schemas.openxmlformats.org/presentationml/2006/main">
+  <p:cSld>
+    <p:spTree>
+      <p:nvGrpSpPr>
+        <p:cNvPr id="1" name=""/>
+        <p:cNvGrpSpPr/>
+        <p:nvPr/>
+      </p:nvGrpSpPr>
+      <p:grpSpPr>
+        <a:xfrm>
+          <a:off x="0" y="0"/>
+          <a:ext cx="0" cy="0"/>
+          <a:chOff x="0" y="0"/>
+          <a:chExt cx="0" cy="0"/>
+        </a:xfrm>
+      </p:grpSpPr>
+      <p:sp>
+        <p:nvSpPr>
+          <p:cNvPr id="4" name="Rectangle 3"/>
+          <p:cNvSpPr>
+            <a:spLocks noChangeAspect="1"/>
+          </p:cNvSpPr>
+          <p:nvPr/>
+        </p:nvSpPr>
+        <p:spPr>
+          <a:xfrm>
+            <a:off x="1611300" y="1415563"/>
+            <a:ext cx="2253082" cy="2254435"/>
+          </a:xfrm>
+          <a:prstGeom prst="rect">
+            <a:avLst/>
+          </a:prstGeom>
+          <a:solidFill>
+            <a:srgbClr val="263A60"/>
+          </a:solidFill>
+          <a:ln>
+            <a:noFill/>
+          </a:ln>
+        </p:spPr>
+        <p:style>
+          <a:lnRef idx="2">
+            <a:schemeClr val="accent1">
+              <a:shade val="50000"/>
+            </a:schemeClr>
+          </a:lnRef>
+          <a:fillRef idx="1">
+            <a:schemeClr val="accent1"/>
+          </a:fillRef>
+          <a:effectRef idx="0">
+            <a:schemeClr val="accent1"/>
+          </a:effectRef>
+          <a:fontRef idx="minor">
+            <a:schemeClr val="lt1"/>
+          </a:fontRef>
+        </p:style>
+        <p:txBody>
+          <a:bodyPr rtlCol="0" anchor="ctr"/>
+          <a:lstStyle/>
+          <a:p>
+            <a:pPr algn="ctr"/>
+            <a:endParaRPr lang="en-US"/>
+          </a:p>
+        </p:txBody>
+      </p:sp>
+      <p:sp>
+        <p:nvSpPr>
+          <p:cNvPr id="5" name="Sun 4"/>
+          <p:cNvSpPr>
+            <a:spLocks/>
+          </p:cNvSpPr>
+          <p:nvPr/>
+        </p:nvSpPr>
+        <p:spPr>
+          <a:xfrm>
+            <a:off x="1851745" y="1719164"/>
+            <a:ext cx="1772192" cy="1647231"/>
+          </a:xfrm>
+          <a:prstGeom prst="sun">
+            <a:avLst/>
+          </a:prstGeom>
+          <a:solidFill>
+            <a:schemeClr val="bg1"/>
+          </a:solidFill>
+          <a:ln>
+            <a:noFill/>
+          </a:ln>
+        </p:spPr>
+        <p:style>
+          <a:lnRef idx="2">
+            <a:schemeClr val="accent1">
+              <a:shade val="50000"/>
+            </a:schemeClr>
+          </a:lnRef>
+          <a:fillRef idx="1">
+            <a:schemeClr val="accent1"/>
+          </a:fillRef>
+          <a:effectRef idx="0">
+            <a:schemeClr val="accent1"/>
+          </a:effectRef>
+          <a:fontRef idx="minor">
+            <a:schemeClr val="lt1"/>
+          </a:fontRef>
+        </p:style>
+        <p:txBody>
+          <a:bodyPr rtlCol="0" anchor="ctr"/>
+          <a:lstStyle/>
+          <a:p>
+            <a:pPr algn="ctr"/>
+            <a:endParaRPr lang="en-US"/>
+          </a:p>
+        </p:txBody>
+      </p:sp>
+      <p:sp>
+        <p:nvSpPr>
+          <p:cNvPr id="2" name="TextBox 1"/>
+          <p:cNvSpPr txBox="1"/>
+          <p:nvPr/>
+        </p:nvSpPr>
+        <p:spPr>
+          <a:xfrm>
+            <a:off x="6248400" y="2667000"/>
+            <a:ext cx="2286000" cy="369332"/>
+          </a:xfrm>
+          <a:prstGeom prst="rect">
+            <a:avLst/>
+          </a:prstGeom>
+          <a:noFill/>
+        </p:spPr>
+        <p:txBody>
+          <a:bodyPr wrap="square" rtlCol="0">
+            <a:spAutoFit/>
+          </a:bodyPr>
+          <a:lstStyle/>
+          <a:p>
+            <a:r>
+              <a:rPr lang="en-US" dirty="0" smtClean="0"/>
+              <a:t>256px for YouTube</a:t>
+            </a:r>
+            <a:endParaRPr lang="en-US" dirty="0"/>
+          </a:p>
+        </p:txBody>
+      </p:sp>
+    </p:spTree>
+    <p:extLst>
+      <p:ext uri="{BB962C8B-B14F-4D97-AF65-F5344CB8AC3E}">
+        <p14:creationId xmlns:p14="http://schemas.microsoft.com/office/powerpoint/2010/main" val="529099135"/>
+      </p:ext>
+    </p:extLst>
+  </p:cSld>
+  <p:clrMapOvr>
+    <a:masterClrMapping/>
+  </p:clrMapOvr>
+</p:sld>
+</file>
+
+<file path=ppt/slides/slide4.xml><?xml version="1.0" encoding="utf-8"?>
 <p:sld xmlns:a="http://schemas.openxmlformats.org/drawingml/2006/main" xmlns:r="http://schemas.openxmlformats.org/officeDocument/2006/relationships" xmlns:p="http://schemas.openxmlformats.org/presentationml/2006/main">
   <p:cSld>
     <p:bg>

</xml_diff>

<commit_message>
update menu icon - mimic menu icon on mobile websites.
</commit_message>
<xml_diff>
--- a/resource/samnt.pptx
+++ b/resource/samnt.pptx
@@ -110,7 +110,7 @@
   </p:defaultTextStyle>
   <p:extLst>
     <p:ext uri="{EFAFB233-063F-42B5-8137-9DF3F51BA10A}">
-      <p15:sldGuideLst xmlns="" xmlns:p15="http://schemas.microsoft.com/office/powerpoint/2012/main">
+      <p15:sldGuideLst xmlns:p15="http://schemas.microsoft.com/office/powerpoint/2012/main" xmlns="">
         <p15:guide id="1" orient="horz" pos="2160">
           <p15:clr>
             <a:srgbClr val="A4A3A4"/>
@@ -308,7 +308,7 @@
           <a:p>
             <a:fld id="{5EBFDE7A-2F88-4186-BBAC-CFFB1713D382}" type="datetimeFigureOut">
               <a:rPr lang="en-US" smtClean="0"/>
-              <a:t>11/25/2014</a:t>
+              <a:t>5/14/2015</a:t>
             </a:fld>
             <a:endParaRPr lang="en-US"/>
           </a:p>
@@ -478,7 +478,7 @@
           <a:p>
             <a:fld id="{5EBFDE7A-2F88-4186-BBAC-CFFB1713D382}" type="datetimeFigureOut">
               <a:rPr lang="en-US" smtClean="0"/>
-              <a:t>11/25/2014</a:t>
+              <a:t>5/14/2015</a:t>
             </a:fld>
             <a:endParaRPr lang="en-US"/>
           </a:p>
@@ -658,7 +658,7 @@
           <a:p>
             <a:fld id="{5EBFDE7A-2F88-4186-BBAC-CFFB1713D382}" type="datetimeFigureOut">
               <a:rPr lang="en-US" smtClean="0"/>
-              <a:t>11/25/2014</a:t>
+              <a:t>5/14/2015</a:t>
             </a:fld>
             <a:endParaRPr lang="en-US"/>
           </a:p>
@@ -907,7 +907,7 @@
                 </a:solidFill>
               </a:rPr>
               <a:pPr/>
-              <a:t>11/25/2014</a:t>
+              <a:t>5/14/2015</a:t>
             </a:fld>
             <a:endParaRPr lang="en-US">
               <a:solidFill>
@@ -1109,7 +1109,7 @@
                 </a:solidFill>
               </a:rPr>
               <a:pPr/>
-              <a:t>11/25/2014</a:t>
+              <a:t>5/14/2015</a:t>
             </a:fld>
             <a:endParaRPr lang="en-US">
               <a:solidFill>
@@ -1387,7 +1387,7 @@
                 </a:solidFill>
               </a:rPr>
               <a:pPr/>
-              <a:t>11/25/2014</a:t>
+              <a:t>5/14/2015</a:t>
             </a:fld>
             <a:endParaRPr lang="en-US">
               <a:solidFill>
@@ -1707,7 +1707,7 @@
                 </a:solidFill>
               </a:rPr>
               <a:pPr/>
-              <a:t>11/25/2014</a:t>
+              <a:t>5/14/2015</a:t>
             </a:fld>
             <a:endParaRPr lang="en-US">
               <a:solidFill>
@@ -2161,7 +2161,7 @@
                 </a:solidFill>
               </a:rPr>
               <a:pPr/>
-              <a:t>11/25/2014</a:t>
+              <a:t>5/14/2015</a:t>
             </a:fld>
             <a:endParaRPr lang="en-US">
               <a:solidFill>
@@ -2311,7 +2311,7 @@
                 </a:solidFill>
               </a:rPr>
               <a:pPr/>
-              <a:t>11/25/2014</a:t>
+              <a:t>5/14/2015</a:t>
             </a:fld>
             <a:endParaRPr lang="en-US">
               <a:solidFill>
@@ -2438,7 +2438,7 @@
                 </a:solidFill>
               </a:rPr>
               <a:pPr/>
-              <a:t>11/25/2014</a:t>
+              <a:t>5/14/2015</a:t>
             </a:fld>
             <a:endParaRPr lang="en-US">
               <a:solidFill>
@@ -2747,7 +2747,7 @@
                 </a:solidFill>
               </a:rPr>
               <a:pPr/>
-              <a:t>11/25/2014</a:t>
+              <a:t>5/14/2015</a:t>
             </a:fld>
             <a:endParaRPr lang="en-US">
               <a:solidFill>
@@ -2942,7 +2942,7 @@
           <a:p>
             <a:fld id="{5EBFDE7A-2F88-4186-BBAC-CFFB1713D382}" type="datetimeFigureOut">
               <a:rPr lang="en-US" smtClean="0"/>
-              <a:t>11/25/2014</a:t>
+              <a:t>5/14/2015</a:t>
             </a:fld>
             <a:endParaRPr lang="en-US"/>
           </a:p>
@@ -3202,7 +3202,7 @@
                 </a:solidFill>
               </a:rPr>
               <a:pPr/>
-              <a:t>11/25/2014</a:t>
+              <a:t>5/14/2015</a:t>
             </a:fld>
             <a:endParaRPr lang="en-US">
               <a:solidFill>
@@ -3404,7 +3404,7 @@
                 </a:solidFill>
               </a:rPr>
               <a:pPr/>
-              <a:t>11/25/2014</a:t>
+              <a:t>5/14/2015</a:t>
             </a:fld>
             <a:endParaRPr lang="en-US">
               <a:solidFill>
@@ -3616,7 +3616,7 @@
                 </a:solidFill>
               </a:rPr>
               <a:pPr/>
-              <a:t>11/25/2014</a:t>
+              <a:t>5/14/2015</a:t>
             </a:fld>
             <a:endParaRPr lang="en-US">
               <a:solidFill>
@@ -3887,7 +3887,7 @@
           <a:p>
             <a:fld id="{5EBFDE7A-2F88-4186-BBAC-CFFB1713D382}" type="datetimeFigureOut">
               <a:rPr lang="en-US" smtClean="0"/>
-              <a:t>11/25/2014</a:t>
+              <a:t>5/14/2015</a:t>
             </a:fld>
             <a:endParaRPr lang="en-US"/>
           </a:p>
@@ -4175,7 +4175,7 @@
           <a:p>
             <a:fld id="{5EBFDE7A-2F88-4186-BBAC-CFFB1713D382}" type="datetimeFigureOut">
               <a:rPr lang="en-US" smtClean="0"/>
-              <a:t>11/25/2014</a:t>
+              <a:t>5/14/2015</a:t>
             </a:fld>
             <a:endParaRPr lang="en-US"/>
           </a:p>
@@ -4597,7 +4597,7 @@
           <a:p>
             <a:fld id="{5EBFDE7A-2F88-4186-BBAC-CFFB1713D382}" type="datetimeFigureOut">
               <a:rPr lang="en-US" smtClean="0"/>
-              <a:t>11/25/2014</a:t>
+              <a:t>5/14/2015</a:t>
             </a:fld>
             <a:endParaRPr lang="en-US"/>
           </a:p>
@@ -4715,7 +4715,7 @@
           <a:p>
             <a:fld id="{5EBFDE7A-2F88-4186-BBAC-CFFB1713D382}" type="datetimeFigureOut">
               <a:rPr lang="en-US" smtClean="0"/>
-              <a:t>11/25/2014</a:t>
+              <a:t>5/14/2015</a:t>
             </a:fld>
             <a:endParaRPr lang="en-US"/>
           </a:p>
@@ -4810,7 +4810,7 @@
           <a:p>
             <a:fld id="{5EBFDE7A-2F88-4186-BBAC-CFFB1713D382}" type="datetimeFigureOut">
               <a:rPr lang="en-US" smtClean="0"/>
-              <a:t>11/25/2014</a:t>
+              <a:t>5/14/2015</a:t>
             </a:fld>
             <a:endParaRPr lang="en-US"/>
           </a:p>
@@ -5087,7 +5087,7 @@
           <a:p>
             <a:fld id="{5EBFDE7A-2F88-4186-BBAC-CFFB1713D382}" type="datetimeFigureOut">
               <a:rPr lang="en-US" smtClean="0"/>
-              <a:t>11/25/2014</a:t>
+              <a:t>5/14/2015</a:t>
             </a:fld>
             <a:endParaRPr lang="en-US"/>
           </a:p>
@@ -5340,7 +5340,7 @@
           <a:p>
             <a:fld id="{5EBFDE7A-2F88-4186-BBAC-CFFB1713D382}" type="datetimeFigureOut">
               <a:rPr lang="en-US" smtClean="0"/>
-              <a:t>11/25/2014</a:t>
+              <a:t>5/14/2015</a:t>
             </a:fld>
             <a:endParaRPr lang="en-US"/>
           </a:p>
@@ -5553,7 +5553,7 @@
           <a:p>
             <a:fld id="{5EBFDE7A-2F88-4186-BBAC-CFFB1713D382}" type="datetimeFigureOut">
               <a:rPr lang="en-US" smtClean="0"/>
-              <a:t>11/25/2014</a:t>
+              <a:t>5/14/2015</a:t>
             </a:fld>
             <a:endParaRPr lang="en-US"/>
           </a:p>
@@ -6070,7 +6070,7 @@
                 </a:solidFill>
               </a:rPr>
               <a:pPr/>
-              <a:t>11/25/2014</a:t>
+              <a:t>5/14/2015</a:t>
             </a:fld>
             <a:endParaRPr lang="en-US" smtClean="0">
               <a:solidFill>
@@ -8286,6 +8286,181 @@
           </a:p>
         </p:txBody>
       </p:sp>
+      <p:cxnSp>
+        <p:nvCxnSpPr>
+          <p:cNvPr id="44" name="Straight Connector 43"/>
+          <p:cNvCxnSpPr/>
+          <p:nvPr/>
+        </p:nvCxnSpPr>
+        <p:spPr>
+          <a:xfrm>
+            <a:off x="3924300" y="4916961"/>
+            <a:ext cx="190500" cy="0"/>
+          </a:xfrm>
+          <a:prstGeom prst="line">
+            <a:avLst/>
+          </a:prstGeom>
+          <a:ln w="28575">
+            <a:solidFill>
+              <a:schemeClr val="bg1"/>
+            </a:solidFill>
+          </a:ln>
+        </p:spPr>
+        <p:style>
+          <a:lnRef idx="1">
+            <a:schemeClr val="accent1"/>
+          </a:lnRef>
+          <a:fillRef idx="0">
+            <a:schemeClr val="accent1"/>
+          </a:fillRef>
+          <a:effectRef idx="0">
+            <a:schemeClr val="accent1"/>
+          </a:effectRef>
+          <a:fontRef idx="minor">
+            <a:schemeClr val="tx1"/>
+          </a:fontRef>
+        </p:style>
+      </p:cxnSp>
+      <p:cxnSp>
+        <p:nvCxnSpPr>
+          <p:cNvPr id="45" name="Straight Connector 44"/>
+          <p:cNvCxnSpPr/>
+          <p:nvPr/>
+        </p:nvCxnSpPr>
+        <p:spPr>
+          <a:xfrm>
+            <a:off x="3924300" y="4988010"/>
+            <a:ext cx="190500" cy="0"/>
+          </a:xfrm>
+          <a:prstGeom prst="line">
+            <a:avLst/>
+          </a:prstGeom>
+          <a:ln w="28575">
+            <a:solidFill>
+              <a:schemeClr val="bg1"/>
+            </a:solidFill>
+          </a:ln>
+        </p:spPr>
+        <p:style>
+          <a:lnRef idx="1">
+            <a:schemeClr val="accent1"/>
+          </a:lnRef>
+          <a:fillRef idx="0">
+            <a:schemeClr val="accent1"/>
+          </a:fillRef>
+          <a:effectRef idx="0">
+            <a:schemeClr val="accent1"/>
+          </a:effectRef>
+          <a:fontRef idx="minor">
+            <a:schemeClr val="tx1"/>
+          </a:fontRef>
+        </p:style>
+      </p:cxnSp>
+      <p:cxnSp>
+        <p:nvCxnSpPr>
+          <p:cNvPr id="46" name="Straight Connector 45"/>
+          <p:cNvCxnSpPr/>
+          <p:nvPr/>
+        </p:nvCxnSpPr>
+        <p:spPr>
+          <a:xfrm>
+            <a:off x="4388924" y="5062149"/>
+            <a:ext cx="266700" cy="0"/>
+          </a:xfrm>
+          <a:prstGeom prst="line">
+            <a:avLst/>
+          </a:prstGeom>
+          <a:ln w="38100">
+            <a:solidFill>
+              <a:schemeClr val="bg1"/>
+            </a:solidFill>
+          </a:ln>
+        </p:spPr>
+        <p:style>
+          <a:lnRef idx="1">
+            <a:schemeClr val="accent1"/>
+          </a:lnRef>
+          <a:fillRef idx="0">
+            <a:schemeClr val="accent1"/>
+          </a:fillRef>
+          <a:effectRef idx="0">
+            <a:schemeClr val="accent1"/>
+          </a:effectRef>
+          <a:fontRef idx="minor">
+            <a:schemeClr val="tx1"/>
+          </a:fontRef>
+        </p:style>
+      </p:cxnSp>
+      <p:cxnSp>
+        <p:nvCxnSpPr>
+          <p:cNvPr id="51" name="Straight Connector 50"/>
+          <p:cNvCxnSpPr/>
+          <p:nvPr/>
+        </p:nvCxnSpPr>
+        <p:spPr>
+          <a:xfrm>
+            <a:off x="4388924" y="5148648"/>
+            <a:ext cx="266700" cy="0"/>
+          </a:xfrm>
+          <a:prstGeom prst="line">
+            <a:avLst/>
+          </a:prstGeom>
+          <a:ln w="38100">
+            <a:solidFill>
+              <a:schemeClr val="bg1"/>
+            </a:solidFill>
+          </a:ln>
+        </p:spPr>
+        <p:style>
+          <a:lnRef idx="1">
+            <a:schemeClr val="accent1"/>
+          </a:lnRef>
+          <a:fillRef idx="0">
+            <a:schemeClr val="accent1"/>
+          </a:fillRef>
+          <a:effectRef idx="0">
+            <a:schemeClr val="accent1"/>
+          </a:effectRef>
+          <a:fontRef idx="minor">
+            <a:schemeClr val="tx1"/>
+          </a:fontRef>
+        </p:style>
+      </p:cxnSp>
+      <p:cxnSp>
+        <p:nvCxnSpPr>
+          <p:cNvPr id="52" name="Straight Connector 51"/>
+          <p:cNvCxnSpPr/>
+          <p:nvPr/>
+        </p:nvCxnSpPr>
+        <p:spPr>
+          <a:xfrm>
+            <a:off x="4388924" y="5243382"/>
+            <a:ext cx="266700" cy="0"/>
+          </a:xfrm>
+          <a:prstGeom prst="line">
+            <a:avLst/>
+          </a:prstGeom>
+          <a:ln w="38100">
+            <a:solidFill>
+              <a:schemeClr val="bg1"/>
+            </a:solidFill>
+          </a:ln>
+        </p:spPr>
+        <p:style>
+          <a:lnRef idx="1">
+            <a:schemeClr val="accent1"/>
+          </a:lnRef>
+          <a:fillRef idx="0">
+            <a:schemeClr val="accent1"/>
+          </a:fillRef>
+          <a:effectRef idx="0">
+            <a:schemeClr val="accent1"/>
+          </a:effectRef>
+          <a:fontRef idx="minor">
+            <a:schemeClr val="tx1"/>
+          </a:fontRef>
+        </p:style>
+      </p:cxnSp>
     </p:spTree>
     <p:extLst>
       <p:ext uri="{BB962C8B-B14F-4D97-AF65-F5344CB8AC3E}">

</xml_diff>